<commit_message>
add 1 idea recovery USB tool
</commit_message>
<xml_diff>
--- a/2021_Summer/jp.hong/Project_BnD_jph.pptx
+++ b/2021_Summer/jp.hong/Project_BnD_jph.pptx
@@ -6060,14 +6060,15 @@
         </p:nvGraphicFramePr>
         <p:xfrm>
           <a:off x="503364" y="957263"/>
-          <a:ext cx="11083799" cy="4605660"/>
+          <a:ext cx="11084719" cy="4605660"/>
         </p:xfrm>
         <a:graphic>
           <a:graphicData uri="http://schemas.openxmlformats.org/drawingml/2006/table">
             <a:tbl>
+              <a:tblPr firstRow="1" bandRow="1"/>
               <a:tblGrid>
                 <a:gridCol w="1291114"/>
-                <a:gridCol w="1191610"/>
+                <a:gridCol w="1192530"/>
                 <a:gridCol w="3386137"/>
                 <a:gridCol w="5214938"/>
               </a:tblGrid>
@@ -6469,7 +6470,7 @@
                           <a:latin typeface="+mj-lt"/>
                           <a:ea typeface="함초롬바탕"/>
                         </a:rPr>
-                        <a:t>1</a:t>
+                        <a:t>5</a:t>
                       </a:r>
                       <a:r>
                         <a:rPr lang="ko-KR" altLang="en-US" sz="1800" b="0" kern="0" spc="-60">
@@ -6488,6 +6489,7 @@
                         </a:solidFill>
                         <a:effectLst/>
                         <a:latin typeface="+mj-lt"/>
+                        <a:ea typeface="함초롬바탕"/>
                       </a:endParaRPr>
                     </a:p>
                   </a:txBody>
@@ -6621,993 +6623,7 @@
                         </a:spcAft>
                         <a:defRPr/>
                       </a:pPr>
-                      <a:r>
-                        <a:rPr lang="ko-KR" altLang="en-US" sz="1800" b="0" kern="0" spc="-60">
-                          <a:solidFill>
-                            <a:srgbClr val="000000"/>
-                          </a:solidFill>
-                          <a:effectLst/>
-                          <a:latin typeface="+mj-lt"/>
-                        </a:rPr>
-                        <a:t>차량 관리 </a:t>
-                      </a:r>
-                      <a:r>
-                        <a:rPr lang="en-US" altLang="ko-KR" sz="1800" b="0" kern="0" spc="-60">
-                          <a:solidFill>
-                            <a:srgbClr val="000000"/>
-                          </a:solidFill>
-                          <a:effectLst/>
-                          <a:latin typeface="+mj-lt"/>
-                        </a:rPr>
-                        <a:t>APP</a:t>
-                      </a:r>
                       <a:endParaRPr lang="en-US" altLang="ko-KR" sz="1800" b="0" kern="0" spc="-60">
-                        <a:solidFill>
-                          <a:srgbClr val="000000"/>
-                        </a:solidFill>
-                        <a:effectLst/>
-                        <a:latin typeface="+mj-lt"/>
-                      </a:endParaRPr>
-                    </a:p>
-                  </a:txBody>
-                  <a:tcPr marL="91440" marR="91440" anchor="ctr">
-                    <a:lnL w="3556" cap="flat" cmpd="sng" algn="ctr">
-                      <a:solidFill>
-                        <a:srgbClr val="000000"/>
-                      </a:solidFill>
-                      <a:prstDash val="solid"/>
-                      <a:round/>
-                      <a:headEnd w="med" len="med"/>
-                      <a:tailEnd w="med" len="med"/>
-                    </a:lnL>
-                    <a:lnR w="3556" cap="flat" cmpd="sng" algn="ctr">
-                      <a:solidFill>
-                        <a:srgbClr val="000000"/>
-                      </a:solidFill>
-                      <a:prstDash val="solid"/>
-                      <a:round/>
-                      <a:headEnd w="med" len="med"/>
-                      <a:tailEnd w="med" len="med"/>
-                    </a:lnR>
-                    <a:lnT w="3556" cap="flat" cmpd="sng" algn="ctr">
-                      <a:solidFill>
-                        <a:srgbClr val="000000"/>
-                      </a:solidFill>
-                      <a:prstDash val="solid"/>
-                      <a:round/>
-                      <a:headEnd w="med" len="med"/>
-                      <a:tailEnd w="med" len="med"/>
-                    </a:lnT>
-                    <a:lnB w="3556" cap="flat" cmpd="sng" algn="ctr">
-                      <a:solidFill>
-                        <a:srgbClr val="000000"/>
-                      </a:solidFill>
-                      <a:prstDash val="solid"/>
-                      <a:round/>
-                      <a:headEnd w="med" len="med"/>
-                      <a:tailEnd w="med" len="med"/>
-                    </a:lnB>
-                  </a:tcPr>
-                </a:tc>
-              </a:tr>
-              <a:tr h="511740">
-                <a:tc vMerge="1">
-                  <a:txBody>
-                    <a:bodyPr/>
-                    <a:p>
-                      <a:pPr latinLnBrk="1">
-                        <a:defRPr/>
-                      </a:pPr>
-                      <a:endParaRPr lang="ko-KR" altLang="en-US"/>
-                    </a:p>
-                  </a:txBody>
-                  <a:tcPr marL="91440" marR="91440"/>
-                </a:tc>
-                <a:tc>
-                  <a:txBody>
-                    <a:bodyPr vert="horz" lIns="91440" tIns="45720" rIns="91440" bIns="45720" anchor="ctr" anchorCtr="0"/>
-                    <a:p>
-                      <a:pPr marL="0" marR="0" indent="0" algn="ctr" latinLnBrk="0">
-                        <a:lnSpc>
-                          <a:spcPct val="130000"/>
-                        </a:lnSpc>
-                        <a:spcBef>
-                          <a:spcPts val="0"/>
-                        </a:spcBef>
-                        <a:spcAft>
-                          <a:spcPts val="0"/>
-                        </a:spcAft>
-                        <a:defRPr/>
-                      </a:pPr>
-                      <a:r>
-                        <a:rPr lang="en-US" altLang="ko-KR" sz="1800" b="0" kern="0" spc="-60">
-                          <a:solidFill>
-                            <a:srgbClr val="000000"/>
-                          </a:solidFill>
-                          <a:effectLst/>
-                          <a:latin typeface="+mj-lt"/>
-                          <a:ea typeface="함초롬바탕"/>
-                        </a:rPr>
-                        <a:t>2</a:t>
-                      </a:r>
-                      <a:r>
-                        <a:rPr lang="ko-KR" altLang="en-US" sz="1800" b="0" kern="0" spc="-60">
-                          <a:solidFill>
-                            <a:srgbClr val="000000"/>
-                          </a:solidFill>
-                          <a:effectLst/>
-                          <a:latin typeface="+mj-lt"/>
-                          <a:ea typeface="함초롬바탕"/>
-                        </a:rPr>
-                        <a:t>주차</a:t>
-                      </a:r>
-                      <a:endParaRPr lang="ko-KR" altLang="en-US" sz="1800" b="0" kern="0" spc="-60">
-                        <a:solidFill>
-                          <a:srgbClr val="000000"/>
-                        </a:solidFill>
-                        <a:effectLst/>
-                        <a:latin typeface="+mj-lt"/>
-                      </a:endParaRPr>
-                    </a:p>
-                  </a:txBody>
-                  <a:tcPr marL="91440" marR="91440" anchor="ctr">
-                    <a:lnL w="3556" cap="flat" cmpd="sng" algn="ctr">
-                      <a:solidFill>
-                        <a:srgbClr val="000000"/>
-                      </a:solidFill>
-                      <a:prstDash val="solid"/>
-                      <a:round/>
-                      <a:headEnd w="med" len="med"/>
-                      <a:tailEnd w="med" len="med"/>
-                    </a:lnL>
-                    <a:lnR w="3556" cap="flat" cmpd="sng" algn="ctr">
-                      <a:solidFill>
-                        <a:srgbClr val="000000"/>
-                      </a:solidFill>
-                      <a:prstDash val="solid"/>
-                      <a:round/>
-                      <a:headEnd w="med" len="med"/>
-                      <a:tailEnd w="med" len="med"/>
-                    </a:lnR>
-                    <a:lnT w="3556" cap="flat" cmpd="sng" algn="ctr">
-                      <a:solidFill>
-                        <a:srgbClr val="000000"/>
-                      </a:solidFill>
-                      <a:prstDash val="solid"/>
-                      <a:round/>
-                      <a:headEnd w="med" len="med"/>
-                      <a:tailEnd w="med" len="med"/>
-                    </a:lnT>
-                    <a:lnB w="3556" cap="flat" cmpd="sng" algn="ctr">
-                      <a:solidFill>
-                        <a:srgbClr val="000000"/>
-                      </a:solidFill>
-                      <a:prstDash val="solid"/>
-                      <a:round/>
-                      <a:headEnd w="med" len="med"/>
-                      <a:tailEnd w="med" len="med"/>
-                    </a:lnB>
-                  </a:tcPr>
-                </a:tc>
-                <a:tc>
-                  <a:txBody>
-                    <a:bodyPr vert="horz" lIns="91440" tIns="45720" rIns="91440" bIns="45720" anchor="ctr" anchorCtr="0"/>
-                    <a:p>
-                      <a:pPr marL="0" marR="0" indent="0" algn="ctr" latinLnBrk="0">
-                        <a:lnSpc>
-                          <a:spcPct val="130000"/>
-                        </a:lnSpc>
-                        <a:spcBef>
-                          <a:spcPts val="0"/>
-                        </a:spcBef>
-                        <a:spcAft>
-                          <a:spcPts val="0"/>
-                        </a:spcAft>
-                        <a:defRPr/>
-                      </a:pPr>
-                      <a:r>
-                        <a:rPr lang="ko-KR" altLang="en-US" sz="1800" b="0" kern="0" spc="-60">
-                          <a:solidFill>
-                            <a:srgbClr val="000000"/>
-                          </a:solidFill>
-                          <a:effectLst/>
-                          <a:latin typeface="+mj-lt"/>
-                          <a:ea typeface="함초롬바탕"/>
-                        </a:rPr>
-                        <a:t>계획 및 일정 수립</a:t>
-                      </a:r>
-                      <a:endParaRPr lang="ko-KR" altLang="en-US" sz="1800" b="0" kern="0" spc="-60">
-                        <a:solidFill>
-                          <a:srgbClr val="000000"/>
-                        </a:solidFill>
-                        <a:effectLst/>
-                        <a:latin typeface="+mj-lt"/>
-                      </a:endParaRPr>
-                    </a:p>
-                  </a:txBody>
-                  <a:tcPr marL="91440" marR="91440" anchor="ctr">
-                    <a:lnL w="3556" cap="flat" cmpd="sng" algn="ctr">
-                      <a:solidFill>
-                        <a:srgbClr val="000000"/>
-                      </a:solidFill>
-                      <a:prstDash val="solid"/>
-                      <a:round/>
-                      <a:headEnd w="med" len="med"/>
-                      <a:tailEnd w="med" len="med"/>
-                    </a:lnL>
-                    <a:lnR w="3556" cap="flat" cmpd="sng" algn="ctr">
-                      <a:solidFill>
-                        <a:srgbClr val="000000"/>
-                      </a:solidFill>
-                      <a:prstDash val="solid"/>
-                      <a:round/>
-                      <a:headEnd w="med" len="med"/>
-                      <a:tailEnd w="med" len="med"/>
-                    </a:lnR>
-                    <a:lnT w="3556" cap="flat" cmpd="sng" algn="ctr">
-                      <a:solidFill>
-                        <a:srgbClr val="000000"/>
-                      </a:solidFill>
-                      <a:prstDash val="solid"/>
-                      <a:round/>
-                      <a:headEnd w="med" len="med"/>
-                      <a:tailEnd w="med" len="med"/>
-                    </a:lnT>
-                    <a:lnB w="3556" cap="flat" cmpd="sng" algn="ctr">
-                      <a:solidFill>
-                        <a:srgbClr val="000000"/>
-                      </a:solidFill>
-                      <a:prstDash val="solid"/>
-                      <a:round/>
-                      <a:headEnd w="med" len="med"/>
-                      <a:tailEnd w="med" len="med"/>
-                    </a:lnB>
-                  </a:tcPr>
-                </a:tc>
-                <a:tc>
-                  <a:txBody>
-                    <a:bodyPr vert="horz" lIns="91440" tIns="45720" rIns="91440" bIns="45720" anchor="ctr" anchorCtr="0"/>
-                    <a:p>
-                      <a:pPr marL="0" marR="0" indent="0" algn="ctr" latinLnBrk="0">
-                        <a:lnSpc>
-                          <a:spcPct val="130000"/>
-                        </a:lnSpc>
-                        <a:spcBef>
-                          <a:spcPts val="0"/>
-                        </a:spcBef>
-                        <a:spcAft>
-                          <a:spcPts val="0"/>
-                        </a:spcAft>
-                        <a:defRPr/>
-                      </a:pPr>
-                      <a:r>
-                        <a:rPr lang="ko-KR" altLang="en-US" sz="1800" b="0" kern="0" spc="-60">
-                          <a:solidFill>
-                            <a:srgbClr val="000000"/>
-                          </a:solidFill>
-                          <a:effectLst/>
-                          <a:latin typeface="+mj-lt"/>
-                        </a:rPr>
-                        <a:t>요구사항 정의 및 문서화</a:t>
-                      </a:r>
-                      <a:endParaRPr lang="ko-KR" altLang="en-US" sz="1800" b="0" kern="0" spc="-60">
-                        <a:solidFill>
-                          <a:srgbClr val="000000"/>
-                        </a:solidFill>
-                        <a:effectLst/>
-                        <a:latin typeface="+mj-lt"/>
-                      </a:endParaRPr>
-                    </a:p>
-                  </a:txBody>
-                  <a:tcPr marL="91440" marR="91440" anchor="ctr">
-                    <a:lnL w="3556" cap="flat" cmpd="sng" algn="ctr">
-                      <a:solidFill>
-                        <a:srgbClr val="000000"/>
-                      </a:solidFill>
-                      <a:prstDash val="solid"/>
-                      <a:round/>
-                      <a:headEnd w="med" len="med"/>
-                      <a:tailEnd w="med" len="med"/>
-                    </a:lnL>
-                    <a:lnR w="3556" cap="flat" cmpd="sng" algn="ctr">
-                      <a:solidFill>
-                        <a:srgbClr val="000000"/>
-                      </a:solidFill>
-                      <a:prstDash val="solid"/>
-                      <a:round/>
-                      <a:headEnd w="med" len="med"/>
-                      <a:tailEnd w="med" len="med"/>
-                    </a:lnR>
-                    <a:lnT w="3556" cap="flat" cmpd="sng" algn="ctr">
-                      <a:solidFill>
-                        <a:srgbClr val="000000"/>
-                      </a:solidFill>
-                      <a:prstDash val="solid"/>
-                      <a:round/>
-                      <a:headEnd w="med" len="med"/>
-                      <a:tailEnd w="med" len="med"/>
-                    </a:lnT>
-                    <a:lnB w="3556" cap="flat" cmpd="sng" algn="ctr">
-                      <a:solidFill>
-                        <a:srgbClr val="000000"/>
-                      </a:solidFill>
-                      <a:prstDash val="solid"/>
-                      <a:round/>
-                      <a:headEnd w="med" len="med"/>
-                      <a:tailEnd w="med" len="med"/>
-                    </a:lnB>
-                  </a:tcPr>
-                </a:tc>
-              </a:tr>
-              <a:tr h="511740">
-                <a:tc vMerge="1">
-                  <a:txBody>
-                    <a:bodyPr/>
-                    <a:p>
-                      <a:pPr latinLnBrk="1">
-                        <a:defRPr/>
-                      </a:pPr>
-                      <a:endParaRPr lang="ko-KR" altLang="en-US"/>
-                    </a:p>
-                  </a:txBody>
-                  <a:tcPr marL="91440" marR="91440"/>
-                </a:tc>
-                <a:tc>
-                  <a:txBody>
-                    <a:bodyPr vert="horz" lIns="91440" tIns="45720" rIns="91440" bIns="45720" anchor="ctr" anchorCtr="0"/>
-                    <a:p>
-                      <a:pPr marL="0" marR="0" indent="0" algn="ctr" latinLnBrk="0">
-                        <a:lnSpc>
-                          <a:spcPct val="130000"/>
-                        </a:lnSpc>
-                        <a:spcBef>
-                          <a:spcPts val="0"/>
-                        </a:spcBef>
-                        <a:spcAft>
-                          <a:spcPts val="0"/>
-                        </a:spcAft>
-                        <a:defRPr/>
-                      </a:pPr>
-                      <a:r>
-                        <a:rPr lang="en-US" altLang="ko-KR" sz="1800" b="0" kern="0" spc="-60">
-                          <a:solidFill>
-                            <a:srgbClr val="000000"/>
-                          </a:solidFill>
-                          <a:effectLst/>
-                          <a:latin typeface="+mj-lt"/>
-                          <a:ea typeface="함초롬바탕"/>
-                        </a:rPr>
-                        <a:t>3</a:t>
-                      </a:r>
-                      <a:r>
-                        <a:rPr lang="ko-KR" altLang="en-US" sz="1800" b="0" kern="0" spc="-60">
-                          <a:solidFill>
-                            <a:srgbClr val="000000"/>
-                          </a:solidFill>
-                          <a:effectLst/>
-                          <a:latin typeface="+mj-lt"/>
-                          <a:ea typeface="함초롬바탕"/>
-                        </a:rPr>
-                        <a:t>주차</a:t>
-                      </a:r>
-                      <a:endParaRPr lang="ko-KR" altLang="en-US" sz="1800" b="0" kern="0" spc="-60">
-                        <a:solidFill>
-                          <a:srgbClr val="000000"/>
-                        </a:solidFill>
-                        <a:effectLst/>
-                        <a:latin typeface="+mj-lt"/>
-                      </a:endParaRPr>
-                    </a:p>
-                  </a:txBody>
-                  <a:tcPr marL="91440" marR="91440" anchor="ctr">
-                    <a:lnL w="3556" cap="flat" cmpd="sng" algn="ctr">
-                      <a:solidFill>
-                        <a:srgbClr val="000000"/>
-                      </a:solidFill>
-                      <a:prstDash val="solid"/>
-                      <a:round/>
-                      <a:headEnd w="med" len="med"/>
-                      <a:tailEnd w="med" len="med"/>
-                    </a:lnL>
-                    <a:lnR w="3556" cap="flat" cmpd="sng" algn="ctr">
-                      <a:solidFill>
-                        <a:srgbClr val="000000"/>
-                      </a:solidFill>
-                      <a:prstDash val="solid"/>
-                      <a:round/>
-                      <a:headEnd w="med" len="med"/>
-                      <a:tailEnd w="med" len="med"/>
-                    </a:lnR>
-                    <a:lnT w="3556" cap="flat" cmpd="sng" algn="ctr">
-                      <a:solidFill>
-                        <a:srgbClr val="000000"/>
-                      </a:solidFill>
-                      <a:prstDash val="solid"/>
-                      <a:round/>
-                      <a:headEnd w="med" len="med"/>
-                      <a:tailEnd w="med" len="med"/>
-                    </a:lnT>
-                    <a:lnB w="3556" cap="flat" cmpd="sng" algn="ctr">
-                      <a:solidFill>
-                        <a:srgbClr val="000000"/>
-                      </a:solidFill>
-                      <a:prstDash val="solid"/>
-                      <a:round/>
-                      <a:headEnd w="med" len="med"/>
-                      <a:tailEnd w="med" len="med"/>
-                    </a:lnB>
-                  </a:tcPr>
-                </a:tc>
-                <a:tc>
-                  <a:txBody>
-                    <a:bodyPr vert="horz" lIns="91440" tIns="45720" rIns="91440" bIns="45720" anchor="ctr" anchorCtr="0"/>
-                    <a:p>
-                      <a:pPr marL="0" marR="0" indent="0" algn="ctr" latinLnBrk="0">
-                        <a:lnSpc>
-                          <a:spcPct val="130000"/>
-                        </a:lnSpc>
-                        <a:spcBef>
-                          <a:spcPts val="0"/>
-                        </a:spcBef>
-                        <a:spcAft>
-                          <a:spcPts val="0"/>
-                        </a:spcAft>
-                        <a:defRPr/>
-                      </a:pPr>
-                      <a:r>
-                        <a:rPr lang="ko-KR" altLang="en-US" sz="1800" b="0" kern="0" spc="-60">
-                          <a:solidFill>
-                            <a:srgbClr val="000000"/>
-                          </a:solidFill>
-                          <a:effectLst/>
-                          <a:latin typeface="+mj-lt"/>
-                          <a:ea typeface="함초롬바탕"/>
-                        </a:rPr>
-                        <a:t>제품 기획</a:t>
-                      </a:r>
-                      <a:endParaRPr lang="ko-KR" altLang="en-US" sz="1800" b="0" kern="0" spc="-60">
-                        <a:solidFill>
-                          <a:srgbClr val="000000"/>
-                        </a:solidFill>
-                        <a:effectLst/>
-                        <a:latin typeface="+mj-lt"/>
-                      </a:endParaRPr>
-                    </a:p>
-                  </a:txBody>
-                  <a:tcPr marL="91440" marR="91440" anchor="ctr">
-                    <a:lnL w="3556" cap="flat" cmpd="sng" algn="ctr">
-                      <a:solidFill>
-                        <a:srgbClr val="000000"/>
-                      </a:solidFill>
-                      <a:prstDash val="solid"/>
-                      <a:round/>
-                      <a:headEnd w="med" len="med"/>
-                      <a:tailEnd w="med" len="med"/>
-                    </a:lnL>
-                    <a:lnR w="3556" cap="flat" cmpd="sng" algn="ctr">
-                      <a:solidFill>
-                        <a:srgbClr val="000000"/>
-                      </a:solidFill>
-                      <a:prstDash val="solid"/>
-                      <a:round/>
-                      <a:headEnd w="med" len="med"/>
-                      <a:tailEnd w="med" len="med"/>
-                    </a:lnR>
-                    <a:lnT w="3556" cap="flat" cmpd="sng" algn="ctr">
-                      <a:solidFill>
-                        <a:srgbClr val="000000"/>
-                      </a:solidFill>
-                      <a:prstDash val="solid"/>
-                      <a:round/>
-                      <a:headEnd w="med" len="med"/>
-                      <a:tailEnd w="med" len="med"/>
-                    </a:lnT>
-                    <a:lnB w="3556" cap="flat" cmpd="sng" algn="ctr">
-                      <a:solidFill>
-                        <a:srgbClr val="000000"/>
-                      </a:solidFill>
-                      <a:prstDash val="solid"/>
-                      <a:round/>
-                      <a:headEnd w="med" len="med"/>
-                      <a:tailEnd w="med" len="med"/>
-                    </a:lnB>
-                  </a:tcPr>
-                </a:tc>
-                <a:tc>
-                  <a:txBody>
-                    <a:bodyPr vert="horz" lIns="91440" tIns="45720" rIns="91440" bIns="45720" anchor="ctr" anchorCtr="0"/>
-                    <a:p>
-                      <a:pPr marL="0" marR="0" indent="0" algn="ctr" latinLnBrk="0">
-                        <a:lnSpc>
-                          <a:spcPct val="130000"/>
-                        </a:lnSpc>
-                        <a:spcBef>
-                          <a:spcPts val="0"/>
-                        </a:spcBef>
-                        <a:spcAft>
-                          <a:spcPts val="0"/>
-                        </a:spcAft>
-                        <a:defRPr/>
-                      </a:pPr>
-                      <a:endParaRPr lang="ko-KR" altLang="en-US" sz="1800" b="0" kern="0" spc="-60">
-                        <a:solidFill>
-                          <a:srgbClr val="000000"/>
-                        </a:solidFill>
-                        <a:effectLst/>
-                        <a:latin typeface="+mj-lt"/>
-                      </a:endParaRPr>
-                    </a:p>
-                  </a:txBody>
-                  <a:tcPr marL="91440" marR="91440" anchor="ctr">
-                    <a:lnL w="3556" cap="flat" cmpd="sng" algn="ctr">
-                      <a:solidFill>
-                        <a:srgbClr val="000000"/>
-                      </a:solidFill>
-                      <a:prstDash val="solid"/>
-                      <a:round/>
-                      <a:headEnd w="med" len="med"/>
-                      <a:tailEnd w="med" len="med"/>
-                    </a:lnL>
-                    <a:lnR w="3556" cap="flat" cmpd="sng" algn="ctr">
-                      <a:solidFill>
-                        <a:srgbClr val="000000"/>
-                      </a:solidFill>
-                      <a:prstDash val="solid"/>
-                      <a:round/>
-                      <a:headEnd w="med" len="med"/>
-                      <a:tailEnd w="med" len="med"/>
-                    </a:lnR>
-                    <a:lnT w="3556" cap="flat" cmpd="sng" algn="ctr">
-                      <a:solidFill>
-                        <a:srgbClr val="000000"/>
-                      </a:solidFill>
-                      <a:prstDash val="solid"/>
-                      <a:round/>
-                      <a:headEnd w="med" len="med"/>
-                      <a:tailEnd w="med" len="med"/>
-                    </a:lnT>
-                    <a:lnB w="3556" cap="flat" cmpd="sng" algn="ctr">
-                      <a:solidFill>
-                        <a:srgbClr val="000000"/>
-                      </a:solidFill>
-                      <a:prstDash val="solid"/>
-                      <a:round/>
-                      <a:headEnd w="med" len="med"/>
-                      <a:tailEnd w="med" len="med"/>
-                    </a:lnB>
-                  </a:tcPr>
-                </a:tc>
-              </a:tr>
-              <a:tr h="511740">
-                <a:tc vMerge="1">
-                  <a:txBody>
-                    <a:bodyPr/>
-                    <a:p>
-                      <a:pPr latinLnBrk="1">
-                        <a:defRPr/>
-                      </a:pPr>
-                      <a:endParaRPr lang="ko-KR" altLang="en-US"/>
-                    </a:p>
-                  </a:txBody>
-                  <a:tcPr marL="91440" marR="91440"/>
-                </a:tc>
-                <a:tc>
-                  <a:txBody>
-                    <a:bodyPr vert="horz" lIns="91440" tIns="45720" rIns="91440" bIns="45720" anchor="ctr" anchorCtr="0"/>
-                    <a:p>
-                      <a:pPr marL="0" marR="0" indent="0" algn="ctr" latinLnBrk="0">
-                        <a:lnSpc>
-                          <a:spcPct val="130000"/>
-                        </a:lnSpc>
-                        <a:spcBef>
-                          <a:spcPts val="0"/>
-                        </a:spcBef>
-                        <a:spcAft>
-                          <a:spcPts val="0"/>
-                        </a:spcAft>
-                        <a:defRPr/>
-                      </a:pPr>
-                      <a:r>
-                        <a:rPr lang="en-US" altLang="ko-KR" sz="1800" b="0" kern="0" spc="-60">
-                          <a:solidFill>
-                            <a:srgbClr val="000000"/>
-                          </a:solidFill>
-                          <a:effectLst/>
-                          <a:latin typeface="+mj-lt"/>
-                          <a:ea typeface="함초롬바탕"/>
-                        </a:rPr>
-                        <a:t>4</a:t>
-                      </a:r>
-                      <a:r>
-                        <a:rPr lang="ko-KR" altLang="en-US" sz="1800" b="0" kern="0" spc="-60">
-                          <a:solidFill>
-                            <a:srgbClr val="000000"/>
-                          </a:solidFill>
-                          <a:effectLst/>
-                          <a:latin typeface="+mj-lt"/>
-                          <a:ea typeface="함초롬바탕"/>
-                        </a:rPr>
-                        <a:t>주차</a:t>
-                      </a:r>
-                      <a:endParaRPr lang="ko-KR" altLang="en-US" sz="1800" b="0" kern="0" spc="-60">
-                        <a:solidFill>
-                          <a:srgbClr val="000000"/>
-                        </a:solidFill>
-                        <a:effectLst/>
-                        <a:latin typeface="+mj-lt"/>
-                      </a:endParaRPr>
-                    </a:p>
-                  </a:txBody>
-                  <a:tcPr marL="91440" marR="91440" anchor="ctr">
-                    <a:lnL w="3556" cap="flat" cmpd="sng" algn="ctr">
-                      <a:solidFill>
-                        <a:srgbClr val="000000"/>
-                      </a:solidFill>
-                      <a:prstDash val="solid"/>
-                      <a:round/>
-                      <a:headEnd w="med" len="med"/>
-                      <a:tailEnd w="med" len="med"/>
-                    </a:lnL>
-                    <a:lnR w="3556" cap="flat" cmpd="sng" algn="ctr">
-                      <a:solidFill>
-                        <a:srgbClr val="000000"/>
-                      </a:solidFill>
-                      <a:prstDash val="solid"/>
-                      <a:round/>
-                      <a:headEnd w="med" len="med"/>
-                      <a:tailEnd w="med" len="med"/>
-                    </a:lnR>
-                    <a:lnT w="3556" cap="flat" cmpd="sng" algn="ctr">
-                      <a:solidFill>
-                        <a:srgbClr val="000000"/>
-                      </a:solidFill>
-                      <a:prstDash val="solid"/>
-                      <a:round/>
-                      <a:headEnd w="med" len="med"/>
-                      <a:tailEnd w="med" len="med"/>
-                    </a:lnT>
-                    <a:lnB w="3556" cap="flat" cmpd="sng" algn="ctr">
-                      <a:solidFill>
-                        <a:srgbClr val="000000"/>
-                      </a:solidFill>
-                      <a:prstDash val="solid"/>
-                      <a:round/>
-                      <a:headEnd w="med" len="med"/>
-                      <a:tailEnd w="med" len="med"/>
-                    </a:lnB>
-                  </a:tcPr>
-                </a:tc>
-                <a:tc>
-                  <a:txBody>
-                    <a:bodyPr vert="horz" lIns="91440" tIns="45720" rIns="91440" bIns="45720" anchor="ctr" anchorCtr="0"/>
-                    <a:p>
-                      <a:pPr marL="0" marR="0" indent="0" algn="ctr" latinLnBrk="0">
-                        <a:lnSpc>
-                          <a:spcPct val="130000"/>
-                        </a:lnSpc>
-                        <a:spcBef>
-                          <a:spcPts val="0"/>
-                        </a:spcBef>
-                        <a:spcAft>
-                          <a:spcPts val="0"/>
-                        </a:spcAft>
-                        <a:defRPr/>
-                      </a:pPr>
-                      <a:r>
-                        <a:rPr lang="ko-KR" altLang="en-US" sz="1800" b="0" kern="0" spc="-60">
-                          <a:solidFill>
-                            <a:srgbClr val="000000"/>
-                          </a:solidFill>
-                          <a:effectLst/>
-                          <a:latin typeface="+mj-lt"/>
-                          <a:ea typeface="함초롬바탕"/>
-                        </a:rPr>
-                        <a:t>제품 개발 기획</a:t>
-                      </a:r>
-                      <a:endParaRPr lang="ko-KR" altLang="en-US" sz="1800" b="0" kern="0" spc="-60">
-                        <a:solidFill>
-                          <a:srgbClr val="000000"/>
-                        </a:solidFill>
-                        <a:effectLst/>
-                        <a:latin typeface="+mj-lt"/>
-                      </a:endParaRPr>
-                    </a:p>
-                  </a:txBody>
-                  <a:tcPr marL="91440" marR="91440" anchor="ctr">
-                    <a:lnL w="3556" cap="flat" cmpd="sng" algn="ctr">
-                      <a:solidFill>
-                        <a:srgbClr val="000000"/>
-                      </a:solidFill>
-                      <a:prstDash val="solid"/>
-                      <a:round/>
-                      <a:headEnd w="med" len="med"/>
-                      <a:tailEnd w="med" len="med"/>
-                    </a:lnL>
-                    <a:lnR w="3556" cap="flat" cmpd="sng" algn="ctr">
-                      <a:solidFill>
-                        <a:srgbClr val="000000"/>
-                      </a:solidFill>
-                      <a:prstDash val="solid"/>
-                      <a:round/>
-                      <a:headEnd w="med" len="med"/>
-                      <a:tailEnd w="med" len="med"/>
-                    </a:lnR>
-                    <a:lnT w="3556" cap="flat" cmpd="sng" algn="ctr">
-                      <a:solidFill>
-                        <a:srgbClr val="000000"/>
-                      </a:solidFill>
-                      <a:prstDash val="solid"/>
-                      <a:round/>
-                      <a:headEnd w="med" len="med"/>
-                      <a:tailEnd w="med" len="med"/>
-                    </a:lnT>
-                    <a:lnB w="3556" cap="flat" cmpd="sng" algn="ctr">
-                      <a:solidFill>
-                        <a:srgbClr val="000000"/>
-                      </a:solidFill>
-                      <a:prstDash val="solid"/>
-                      <a:round/>
-                      <a:headEnd w="med" len="med"/>
-                      <a:tailEnd w="med" len="med"/>
-                    </a:lnB>
-                  </a:tcPr>
-                </a:tc>
-                <a:tc>
-                  <a:txBody>
-                    <a:bodyPr vert="horz" lIns="91440" tIns="45720" rIns="91440" bIns="45720" anchor="ctr" anchorCtr="0"/>
-                    <a:p>
-                      <a:pPr marL="0" marR="0" indent="0" algn="ctr" latinLnBrk="0">
-                        <a:lnSpc>
-                          <a:spcPct val="130000"/>
-                        </a:lnSpc>
-                        <a:spcBef>
-                          <a:spcPts val="0"/>
-                        </a:spcBef>
-                        <a:spcAft>
-                          <a:spcPts val="0"/>
-                        </a:spcAft>
-                        <a:defRPr/>
-                      </a:pPr>
-                      <a:endParaRPr lang="ko-KR" altLang="en-US" sz="1800" b="0" kern="0" spc="-60">
-                        <a:solidFill>
-                          <a:srgbClr val="000000"/>
-                        </a:solidFill>
-                        <a:effectLst/>
-                        <a:latin typeface="+mj-lt"/>
-                      </a:endParaRPr>
-                    </a:p>
-                  </a:txBody>
-                  <a:tcPr marL="91440" marR="91440" anchor="ctr">
-                    <a:lnL w="3556" cap="flat" cmpd="sng" algn="ctr">
-                      <a:solidFill>
-                        <a:srgbClr val="000000"/>
-                      </a:solidFill>
-                      <a:prstDash val="solid"/>
-                      <a:round/>
-                      <a:headEnd w="med" len="med"/>
-                      <a:tailEnd w="med" len="med"/>
-                    </a:lnL>
-                    <a:lnR w="3556" cap="flat" cmpd="sng" algn="ctr">
-                      <a:solidFill>
-                        <a:srgbClr val="000000"/>
-                      </a:solidFill>
-                      <a:prstDash val="solid"/>
-                      <a:round/>
-                      <a:headEnd w="med" len="med"/>
-                      <a:tailEnd w="med" len="med"/>
-                    </a:lnR>
-                    <a:lnT w="3556" cap="flat" cmpd="sng" algn="ctr">
-                      <a:solidFill>
-                        <a:srgbClr val="000000"/>
-                      </a:solidFill>
-                      <a:prstDash val="solid"/>
-                      <a:round/>
-                      <a:headEnd w="med" len="med"/>
-                      <a:tailEnd w="med" len="med"/>
-                    </a:lnT>
-                    <a:lnB w="3556" cap="flat" cmpd="sng" algn="ctr">
-                      <a:solidFill>
-                        <a:srgbClr val="000000"/>
-                      </a:solidFill>
-                      <a:prstDash val="solid"/>
-                      <a:round/>
-                      <a:headEnd w="med" len="med"/>
-                      <a:tailEnd w="med" len="med"/>
-                    </a:lnB>
-                  </a:tcPr>
-                </a:tc>
-              </a:tr>
-              <a:tr h="511740">
-                <a:tc vMerge="1">
-                  <a:txBody>
-                    <a:bodyPr/>
-                    <a:p>
-                      <a:pPr latinLnBrk="1">
-                        <a:defRPr/>
-                      </a:pPr>
-                      <a:endParaRPr lang="ko-KR" altLang="en-US"/>
-                    </a:p>
-                  </a:txBody>
-                  <a:tcPr marL="91440" marR="91440"/>
-                </a:tc>
-                <a:tc>
-                  <a:txBody>
-                    <a:bodyPr vert="horz" lIns="91440" tIns="45720" rIns="91440" bIns="45720" anchor="ctr" anchorCtr="0"/>
-                    <a:p>
-                      <a:pPr marL="0" marR="0" indent="0" algn="ctr" latinLnBrk="0">
-                        <a:lnSpc>
-                          <a:spcPct val="130000"/>
-                        </a:lnSpc>
-                        <a:spcBef>
-                          <a:spcPts val="0"/>
-                        </a:spcBef>
-                        <a:spcAft>
-                          <a:spcPts val="0"/>
-                        </a:spcAft>
-                        <a:defRPr/>
-                      </a:pPr>
-                      <a:r>
-                        <a:rPr lang="en-US" altLang="ko-KR" sz="1800" b="0" kern="0" spc="-60">
-                          <a:solidFill>
-                            <a:srgbClr val="000000"/>
-                          </a:solidFill>
-                          <a:effectLst/>
-                          <a:latin typeface="+mj-lt"/>
-                          <a:ea typeface="함초롬바탕"/>
-                        </a:rPr>
-                        <a:t>5</a:t>
-                      </a:r>
-                      <a:r>
-                        <a:rPr lang="ko-KR" altLang="en-US" sz="1800" b="0" kern="0" spc="-60">
-                          <a:solidFill>
-                            <a:srgbClr val="000000"/>
-                          </a:solidFill>
-                          <a:effectLst/>
-                          <a:latin typeface="+mj-lt"/>
-                          <a:ea typeface="함초롬바탕"/>
-                        </a:rPr>
-                        <a:t>주차</a:t>
-                      </a:r>
-                      <a:endParaRPr lang="ko-KR" altLang="en-US" sz="1800" b="0" kern="0" spc="-60">
-                        <a:solidFill>
-                          <a:srgbClr val="000000"/>
-                        </a:solidFill>
-                        <a:effectLst/>
-                        <a:latin typeface="+mj-lt"/>
-                      </a:endParaRPr>
-                    </a:p>
-                  </a:txBody>
-                  <a:tcPr marL="91440" marR="91440" anchor="ctr">
-                    <a:lnL w="3556" cap="flat" cmpd="sng" algn="ctr">
-                      <a:solidFill>
-                        <a:srgbClr val="000000"/>
-                      </a:solidFill>
-                      <a:prstDash val="solid"/>
-                      <a:round/>
-                      <a:headEnd w="med" len="med"/>
-                      <a:tailEnd w="med" len="med"/>
-                    </a:lnL>
-                    <a:lnR w="3556" cap="flat" cmpd="sng" algn="ctr">
-                      <a:solidFill>
-                        <a:srgbClr val="000000"/>
-                      </a:solidFill>
-                      <a:prstDash val="solid"/>
-                      <a:round/>
-                      <a:headEnd w="med" len="med"/>
-                      <a:tailEnd w="med" len="med"/>
-                    </a:lnR>
-                    <a:lnT w="3556" cap="flat" cmpd="sng" algn="ctr">
-                      <a:solidFill>
-                        <a:srgbClr val="000000"/>
-                      </a:solidFill>
-                      <a:prstDash val="solid"/>
-                      <a:round/>
-                      <a:headEnd w="med" len="med"/>
-                      <a:tailEnd w="med" len="med"/>
-                    </a:lnT>
-                    <a:lnB w="3556" cap="flat" cmpd="sng" algn="ctr">
-                      <a:solidFill>
-                        <a:srgbClr val="000000"/>
-                      </a:solidFill>
-                      <a:prstDash val="solid"/>
-                      <a:round/>
-                      <a:headEnd w="med" len="med"/>
-                      <a:tailEnd w="med" len="med"/>
-                    </a:lnB>
-                  </a:tcPr>
-                </a:tc>
-                <a:tc>
-                  <a:txBody>
-                    <a:bodyPr vert="horz" lIns="91440" tIns="45720" rIns="91440" bIns="45720" anchor="ctr" anchorCtr="0"/>
-                    <a:p>
-                      <a:pPr marL="0" marR="0" indent="0" algn="ctr" latinLnBrk="0">
-                        <a:lnSpc>
-                          <a:spcPct val="130000"/>
-                        </a:lnSpc>
-                        <a:spcBef>
-                          <a:spcPts val="0"/>
-                        </a:spcBef>
-                        <a:spcAft>
-                          <a:spcPts val="0"/>
-                        </a:spcAft>
-                        <a:defRPr/>
-                      </a:pPr>
-                      <a:r>
-                        <a:rPr lang="ko-KR" altLang="en-US" sz="1800" b="0" kern="0" spc="-60">
-                          <a:solidFill>
-                            <a:srgbClr val="000000"/>
-                          </a:solidFill>
-                          <a:effectLst/>
-                          <a:latin typeface="+mj-lt"/>
-                          <a:ea typeface="함초롬바탕"/>
-                        </a:rPr>
-                        <a:t>제품 개발 설계</a:t>
-                      </a:r>
-                      <a:endParaRPr lang="ko-KR" altLang="en-US" sz="1800" b="0" kern="0" spc="-60">
-                        <a:solidFill>
-                          <a:srgbClr val="000000"/>
-                        </a:solidFill>
-                        <a:effectLst/>
-                        <a:latin typeface="+mj-lt"/>
-                      </a:endParaRPr>
-                    </a:p>
-                  </a:txBody>
-                  <a:tcPr marL="91440" marR="91440" anchor="ctr">
-                    <a:lnL w="3556" cap="flat" cmpd="sng" algn="ctr">
-                      <a:solidFill>
-                        <a:srgbClr val="000000"/>
-                      </a:solidFill>
-                      <a:prstDash val="solid"/>
-                      <a:round/>
-                      <a:headEnd w="med" len="med"/>
-                      <a:tailEnd w="med" len="med"/>
-                    </a:lnL>
-                    <a:lnR w="3556" cap="flat" cmpd="sng" algn="ctr">
-                      <a:solidFill>
-                        <a:srgbClr val="000000"/>
-                      </a:solidFill>
-                      <a:prstDash val="solid"/>
-                      <a:round/>
-                      <a:headEnd w="med" len="med"/>
-                      <a:tailEnd w="med" len="med"/>
-                    </a:lnR>
-                    <a:lnT w="3556" cap="flat" cmpd="sng" algn="ctr">
-                      <a:solidFill>
-                        <a:srgbClr val="000000"/>
-                      </a:solidFill>
-                      <a:prstDash val="solid"/>
-                      <a:round/>
-                      <a:headEnd w="med" len="med"/>
-                      <a:tailEnd w="med" len="med"/>
-                    </a:lnT>
-                    <a:lnB w="3556" cap="flat" cmpd="sng" algn="ctr">
-                      <a:solidFill>
-                        <a:srgbClr val="000000"/>
-                      </a:solidFill>
-                      <a:prstDash val="solid"/>
-                      <a:round/>
-                      <a:headEnd w="med" len="med"/>
-                      <a:tailEnd w="med" len="med"/>
-                    </a:lnB>
-                  </a:tcPr>
-                </a:tc>
-                <a:tc>
-                  <a:txBody>
-                    <a:bodyPr vert="horz" lIns="91440" tIns="45720" rIns="91440" bIns="45720" anchor="ctr" anchorCtr="0"/>
-                    <a:p>
-                      <a:pPr marL="0" marR="0" indent="0" algn="ctr" latinLnBrk="0">
-                        <a:lnSpc>
-                          <a:spcPct val="130000"/>
-                        </a:lnSpc>
-                        <a:spcBef>
-                          <a:spcPts val="0"/>
-                        </a:spcBef>
-                        <a:spcAft>
-                          <a:spcPts val="0"/>
-                        </a:spcAft>
-                        <a:defRPr/>
-                      </a:pPr>
-                      <a:endParaRPr lang="ko-KR" altLang="en-US" sz="1800" b="0" kern="0" spc="-60">
                         <a:solidFill>
                           <a:srgbClr val="000000"/>
                         </a:solidFill>
@@ -7713,6 +6729,7 @@
                         </a:solidFill>
                         <a:effectLst/>
                         <a:latin typeface="+mj-lt"/>
+                        <a:ea typeface="함초롬바탕"/>
                       </a:endParaRPr>
                     </a:p>
                   </a:txBody>
@@ -7780,7 +6797,7 @@
                           <a:latin typeface="+mj-lt"/>
                           <a:ea typeface="함초롬바탕"/>
                         </a:rPr>
-                        <a:t>제품 개발 프로그래밍</a:t>
+                        <a:t>계획 및 일정 수립</a:t>
                       </a:r>
                       <a:endParaRPr lang="ko-KR" altLang="en-US" sz="1800" b="0" kern="0" spc="-60">
                         <a:solidFill>
@@ -7952,6 +6969,7 @@
                         </a:solidFill>
                         <a:effectLst/>
                         <a:latin typeface="+mj-lt"/>
+                        <a:ea typeface="함초롬바탕"/>
                       </a:endParaRPr>
                     </a:p>
                   </a:txBody>
@@ -8019,7 +7037,7 @@
                           <a:latin typeface="+mj-lt"/>
                           <a:ea typeface="함초롬바탕"/>
                         </a:rPr>
-                        <a:t>검증 및 토의</a:t>
+                        <a:t>제품 기획</a:t>
                       </a:r>
                       <a:endParaRPr lang="ko-KR" altLang="en-US" sz="1800" b="0" kern="0" spc="-60">
                         <a:solidFill>
@@ -8191,7 +7209,858 @@
                         </a:solidFill>
                         <a:effectLst/>
                         <a:latin typeface="+mj-lt"/>
+                        <a:ea typeface="함초롬바탕"/>
                       </a:endParaRPr>
+                    </a:p>
+                  </a:txBody>
+                  <a:tcPr marL="91440" marR="91440" anchor="ctr">
+                    <a:lnL w="3556" cap="flat" cmpd="sng" algn="ctr">
+                      <a:solidFill>
+                        <a:srgbClr val="000000"/>
+                      </a:solidFill>
+                      <a:prstDash val="solid"/>
+                      <a:round/>
+                      <a:headEnd w="med" len="med"/>
+                      <a:tailEnd w="med" len="med"/>
+                    </a:lnL>
+                    <a:lnR w="3556" cap="flat" cmpd="sng" algn="ctr">
+                      <a:solidFill>
+                        <a:srgbClr val="000000"/>
+                      </a:solidFill>
+                      <a:prstDash val="solid"/>
+                      <a:round/>
+                      <a:headEnd w="med" len="med"/>
+                      <a:tailEnd w="med" len="med"/>
+                    </a:lnR>
+                    <a:lnT w="3556" cap="flat" cmpd="sng" algn="ctr">
+                      <a:solidFill>
+                        <a:srgbClr val="000000"/>
+                      </a:solidFill>
+                      <a:prstDash val="solid"/>
+                      <a:round/>
+                      <a:headEnd w="med" len="med"/>
+                      <a:tailEnd w="med" len="med"/>
+                    </a:lnT>
+                    <a:lnB w="3556" cap="flat" cmpd="sng" algn="ctr">
+                      <a:solidFill>
+                        <a:srgbClr val="000000"/>
+                      </a:solidFill>
+                      <a:prstDash val="solid"/>
+                      <a:round/>
+                      <a:headEnd w="med" len="med"/>
+                      <a:tailEnd w="med" len="med"/>
+                    </a:lnB>
+                  </a:tcPr>
+                </a:tc>
+                <a:tc>
+                  <a:txBody>
+                    <a:bodyPr vert="horz" lIns="91440" tIns="45720" rIns="91440" bIns="45720" anchor="ctr" anchorCtr="0"/>
+                    <a:p>
+                      <a:pPr marL="0" marR="0" indent="0" algn="ctr" latinLnBrk="0">
+                        <a:lnSpc>
+                          <a:spcPct val="130000"/>
+                        </a:lnSpc>
+                        <a:spcBef>
+                          <a:spcPts val="0"/>
+                        </a:spcBef>
+                        <a:spcAft>
+                          <a:spcPts val="0"/>
+                        </a:spcAft>
+                        <a:defRPr/>
+                      </a:pPr>
+                      <a:r>
+                        <a:rPr lang="ko-KR" altLang="en-US" sz="1800" b="0" kern="0" spc="-60">
+                          <a:solidFill>
+                            <a:srgbClr val="000000"/>
+                          </a:solidFill>
+                          <a:effectLst/>
+                          <a:latin typeface="+mj-lt"/>
+                          <a:ea typeface="함초롬바탕"/>
+                        </a:rPr>
+                        <a:t>제품 개발 기획</a:t>
+                      </a:r>
+                      <a:endParaRPr lang="ko-KR" altLang="en-US" sz="1800" b="0" kern="0" spc="-60">
+                        <a:solidFill>
+                          <a:srgbClr val="000000"/>
+                        </a:solidFill>
+                        <a:effectLst/>
+                        <a:latin typeface="+mj-lt"/>
+                      </a:endParaRPr>
+                    </a:p>
+                  </a:txBody>
+                  <a:tcPr marL="91440" marR="91440" anchor="ctr">
+                    <a:lnL w="3556" cap="flat" cmpd="sng" algn="ctr">
+                      <a:solidFill>
+                        <a:srgbClr val="000000"/>
+                      </a:solidFill>
+                      <a:prstDash val="solid"/>
+                      <a:round/>
+                      <a:headEnd w="med" len="med"/>
+                      <a:tailEnd w="med" len="med"/>
+                    </a:lnL>
+                    <a:lnR w="3556" cap="flat" cmpd="sng" algn="ctr">
+                      <a:solidFill>
+                        <a:srgbClr val="000000"/>
+                      </a:solidFill>
+                      <a:prstDash val="solid"/>
+                      <a:round/>
+                      <a:headEnd w="med" len="med"/>
+                      <a:tailEnd w="med" len="med"/>
+                    </a:lnR>
+                    <a:lnT w="3556" cap="flat" cmpd="sng" algn="ctr">
+                      <a:solidFill>
+                        <a:srgbClr val="000000"/>
+                      </a:solidFill>
+                      <a:prstDash val="solid"/>
+                      <a:round/>
+                      <a:headEnd w="med" len="med"/>
+                      <a:tailEnd w="med" len="med"/>
+                    </a:lnT>
+                    <a:lnB w="3556" cap="flat" cmpd="sng" algn="ctr">
+                      <a:solidFill>
+                        <a:srgbClr val="000000"/>
+                      </a:solidFill>
+                      <a:prstDash val="solid"/>
+                      <a:round/>
+                      <a:headEnd w="med" len="med"/>
+                      <a:tailEnd w="med" len="med"/>
+                    </a:lnB>
+                  </a:tcPr>
+                </a:tc>
+                <a:tc>
+                  <a:txBody>
+                    <a:bodyPr vert="horz" lIns="91440" tIns="45720" rIns="91440" bIns="45720" anchor="ctr" anchorCtr="0"/>
+                    <a:p>
+                      <a:pPr marL="0" marR="0" indent="0" algn="ctr" latinLnBrk="0">
+                        <a:lnSpc>
+                          <a:spcPct val="130000"/>
+                        </a:lnSpc>
+                        <a:spcBef>
+                          <a:spcPts val="0"/>
+                        </a:spcBef>
+                        <a:spcAft>
+                          <a:spcPts val="0"/>
+                        </a:spcAft>
+                        <a:defRPr/>
+                      </a:pPr>
+                      <a:endParaRPr lang="ko-KR" altLang="en-US" sz="1800" b="0" kern="0" spc="-60">
+                        <a:solidFill>
+                          <a:srgbClr val="000000"/>
+                        </a:solidFill>
+                        <a:effectLst/>
+                        <a:latin typeface="+mj-lt"/>
+                      </a:endParaRPr>
+                    </a:p>
+                  </a:txBody>
+                  <a:tcPr marL="91440" marR="91440" anchor="ctr">
+                    <a:lnL w="3556" cap="flat" cmpd="sng" algn="ctr">
+                      <a:solidFill>
+                        <a:srgbClr val="000000"/>
+                      </a:solidFill>
+                      <a:prstDash val="solid"/>
+                      <a:round/>
+                      <a:headEnd w="med" len="med"/>
+                      <a:tailEnd w="med" len="med"/>
+                    </a:lnL>
+                    <a:lnR w="3556" cap="flat" cmpd="sng" algn="ctr">
+                      <a:solidFill>
+                        <a:srgbClr val="000000"/>
+                      </a:solidFill>
+                      <a:prstDash val="solid"/>
+                      <a:round/>
+                      <a:headEnd w="med" len="med"/>
+                      <a:tailEnd w="med" len="med"/>
+                    </a:lnR>
+                    <a:lnT w="3556" cap="flat" cmpd="sng" algn="ctr">
+                      <a:solidFill>
+                        <a:srgbClr val="000000"/>
+                      </a:solidFill>
+                      <a:prstDash val="solid"/>
+                      <a:round/>
+                      <a:headEnd w="med" len="med"/>
+                      <a:tailEnd w="med" len="med"/>
+                    </a:lnT>
+                    <a:lnB w="3556" cap="flat" cmpd="sng" algn="ctr">
+                      <a:solidFill>
+                        <a:srgbClr val="000000"/>
+                      </a:solidFill>
+                      <a:prstDash val="solid"/>
+                      <a:round/>
+                      <a:headEnd w="med" len="med"/>
+                      <a:tailEnd w="med" len="med"/>
+                    </a:lnB>
+                  </a:tcPr>
+                </a:tc>
+              </a:tr>
+              <a:tr h="511740">
+                <a:tc vMerge="1">
+                  <a:txBody>
+                    <a:bodyPr/>
+                    <a:p>
+                      <a:pPr latinLnBrk="1">
+                        <a:defRPr/>
+                      </a:pPr>
+                      <a:endParaRPr lang="ko-KR" altLang="en-US"/>
+                    </a:p>
+                  </a:txBody>
+                  <a:tcPr marL="91440" marR="91440"/>
+                </a:tc>
+                <a:tc>
+                  <a:txBody>
+                    <a:bodyPr vert="horz" lIns="91440" tIns="45720" rIns="91440" bIns="45720" anchor="ctr" anchorCtr="0"/>
+                    <a:p>
+                      <a:pPr marL="0" marR="0" indent="0" algn="ctr" latinLnBrk="0">
+                        <a:lnSpc>
+                          <a:spcPct val="130000"/>
+                        </a:lnSpc>
+                        <a:spcBef>
+                          <a:spcPts val="0"/>
+                        </a:spcBef>
+                        <a:spcAft>
+                          <a:spcPts val="0"/>
+                        </a:spcAft>
+                        <a:defRPr/>
+                      </a:pPr>
+                      <a:endParaRPr lang="ko-KR" altLang="en-US" sz="1800" b="0" kern="0" spc="-60">
+                        <a:solidFill>
+                          <a:srgbClr val="000000"/>
+                        </a:solidFill>
+                        <a:effectLst/>
+                        <a:latin typeface="+mj-lt"/>
+                      </a:endParaRPr>
+                    </a:p>
+                  </a:txBody>
+                  <a:tcPr marL="91440" marR="91440" anchor="ctr">
+                    <a:lnL w="3556" cap="flat" cmpd="sng" algn="ctr">
+                      <a:solidFill>
+                        <a:srgbClr val="000000"/>
+                      </a:solidFill>
+                      <a:prstDash val="solid"/>
+                      <a:round/>
+                      <a:headEnd w="med" len="med"/>
+                      <a:tailEnd w="med" len="med"/>
+                    </a:lnL>
+                    <a:lnR w="3556" cap="flat" cmpd="sng" algn="ctr">
+                      <a:solidFill>
+                        <a:srgbClr val="000000"/>
+                      </a:solidFill>
+                      <a:prstDash val="solid"/>
+                      <a:round/>
+                      <a:headEnd w="med" len="med"/>
+                      <a:tailEnd w="med" len="med"/>
+                    </a:lnR>
+                    <a:lnT w="3556" cap="flat" cmpd="sng" algn="ctr">
+                      <a:solidFill>
+                        <a:srgbClr val="000000"/>
+                      </a:solidFill>
+                      <a:prstDash val="solid"/>
+                      <a:round/>
+                      <a:headEnd w="med" len="med"/>
+                      <a:tailEnd w="med" len="med"/>
+                    </a:lnT>
+                    <a:lnB w="3556" cap="flat" cmpd="sng" algn="ctr">
+                      <a:solidFill>
+                        <a:srgbClr val="000000"/>
+                      </a:solidFill>
+                      <a:prstDash val="solid"/>
+                      <a:round/>
+                      <a:headEnd w="med" len="med"/>
+                      <a:tailEnd w="med" len="med"/>
+                    </a:lnB>
+                  </a:tcPr>
+                </a:tc>
+                <a:tc>
+                  <a:txBody>
+                    <a:bodyPr vert="horz" lIns="91440" tIns="45720" rIns="91440" bIns="45720" anchor="ctr" anchorCtr="0"/>
+                    <a:p>
+                      <a:pPr marL="0" marR="0" indent="0" algn="ctr" latinLnBrk="0">
+                        <a:lnSpc>
+                          <a:spcPct val="130000"/>
+                        </a:lnSpc>
+                        <a:spcBef>
+                          <a:spcPts val="0"/>
+                        </a:spcBef>
+                        <a:spcAft>
+                          <a:spcPts val="0"/>
+                        </a:spcAft>
+                        <a:defRPr/>
+                      </a:pPr>
+                      <a:r>
+                        <a:rPr lang="ko-KR" altLang="en-US" sz="1800" b="0" kern="0" spc="-60">
+                          <a:solidFill>
+                            <a:srgbClr val="000000"/>
+                          </a:solidFill>
+                          <a:effectLst/>
+                          <a:latin typeface="+mj-lt"/>
+                          <a:ea typeface="함초롬바탕"/>
+                        </a:rPr>
+                        <a:t>제품 개발 설계</a:t>
+                      </a:r>
+                      <a:endParaRPr lang="ko-KR" altLang="en-US" sz="1800" b="0" kern="0" spc="-60">
+                        <a:solidFill>
+                          <a:srgbClr val="000000"/>
+                        </a:solidFill>
+                        <a:effectLst/>
+                        <a:latin typeface="+mj-lt"/>
+                      </a:endParaRPr>
+                    </a:p>
+                  </a:txBody>
+                  <a:tcPr marL="91440" marR="91440" anchor="ctr">
+                    <a:lnL w="3556" cap="flat" cmpd="sng" algn="ctr">
+                      <a:solidFill>
+                        <a:srgbClr val="000000"/>
+                      </a:solidFill>
+                      <a:prstDash val="solid"/>
+                      <a:round/>
+                      <a:headEnd w="med" len="med"/>
+                      <a:tailEnd w="med" len="med"/>
+                    </a:lnL>
+                    <a:lnR w="3556" cap="flat" cmpd="sng" algn="ctr">
+                      <a:solidFill>
+                        <a:srgbClr val="000000"/>
+                      </a:solidFill>
+                      <a:prstDash val="solid"/>
+                      <a:round/>
+                      <a:headEnd w="med" len="med"/>
+                      <a:tailEnd w="med" len="med"/>
+                    </a:lnR>
+                    <a:lnT w="3556" cap="flat" cmpd="sng" algn="ctr">
+                      <a:solidFill>
+                        <a:srgbClr val="000000"/>
+                      </a:solidFill>
+                      <a:prstDash val="solid"/>
+                      <a:round/>
+                      <a:headEnd w="med" len="med"/>
+                      <a:tailEnd w="med" len="med"/>
+                    </a:lnT>
+                    <a:lnB w="3556" cap="flat" cmpd="sng" algn="ctr">
+                      <a:solidFill>
+                        <a:srgbClr val="000000"/>
+                      </a:solidFill>
+                      <a:prstDash val="solid"/>
+                      <a:round/>
+                      <a:headEnd w="med" len="med"/>
+                      <a:tailEnd w="med" len="med"/>
+                    </a:lnB>
+                  </a:tcPr>
+                </a:tc>
+                <a:tc>
+                  <a:txBody>
+                    <a:bodyPr vert="horz" lIns="91440" tIns="45720" rIns="91440" bIns="45720" anchor="ctr" anchorCtr="0"/>
+                    <a:p>
+                      <a:pPr marL="0" marR="0" indent="0" algn="ctr" latinLnBrk="0">
+                        <a:lnSpc>
+                          <a:spcPct val="130000"/>
+                        </a:lnSpc>
+                        <a:spcBef>
+                          <a:spcPts val="0"/>
+                        </a:spcBef>
+                        <a:spcAft>
+                          <a:spcPts val="0"/>
+                        </a:spcAft>
+                        <a:defRPr/>
+                      </a:pPr>
+                      <a:endParaRPr lang="ko-KR" altLang="en-US" sz="1800" b="0" kern="0" spc="-60">
+                        <a:solidFill>
+                          <a:srgbClr val="000000"/>
+                        </a:solidFill>
+                        <a:effectLst/>
+                        <a:latin typeface="+mj-lt"/>
+                      </a:endParaRPr>
+                    </a:p>
+                  </a:txBody>
+                  <a:tcPr marL="91440" marR="91440" anchor="ctr">
+                    <a:lnL w="3556" cap="flat" cmpd="sng" algn="ctr">
+                      <a:solidFill>
+                        <a:srgbClr val="000000"/>
+                      </a:solidFill>
+                      <a:prstDash val="solid"/>
+                      <a:round/>
+                      <a:headEnd w="med" len="med"/>
+                      <a:tailEnd w="med" len="med"/>
+                    </a:lnL>
+                    <a:lnR w="3556" cap="flat" cmpd="sng" algn="ctr">
+                      <a:solidFill>
+                        <a:srgbClr val="000000"/>
+                      </a:solidFill>
+                      <a:prstDash val="solid"/>
+                      <a:round/>
+                      <a:headEnd w="med" len="med"/>
+                      <a:tailEnd w="med" len="med"/>
+                    </a:lnR>
+                    <a:lnT w="3556" cap="flat" cmpd="sng" algn="ctr">
+                      <a:solidFill>
+                        <a:srgbClr val="000000"/>
+                      </a:solidFill>
+                      <a:prstDash val="solid"/>
+                      <a:round/>
+                      <a:headEnd w="med" len="med"/>
+                      <a:tailEnd w="med" len="med"/>
+                    </a:lnT>
+                    <a:lnB w="3556" cap="flat" cmpd="sng" algn="ctr">
+                      <a:solidFill>
+                        <a:srgbClr val="000000"/>
+                      </a:solidFill>
+                      <a:prstDash val="solid"/>
+                      <a:round/>
+                      <a:headEnd w="med" len="med"/>
+                      <a:tailEnd w="med" len="med"/>
+                    </a:lnB>
+                  </a:tcPr>
+                </a:tc>
+              </a:tr>
+              <a:tr h="511740">
+                <a:tc vMerge="1">
+                  <a:txBody>
+                    <a:bodyPr/>
+                    <a:p>
+                      <a:pPr latinLnBrk="1">
+                        <a:defRPr/>
+                      </a:pPr>
+                      <a:endParaRPr lang="ko-KR" altLang="en-US"/>
+                    </a:p>
+                  </a:txBody>
+                  <a:tcPr marL="91440" marR="91440"/>
+                </a:tc>
+                <a:tc>
+                  <a:txBody>
+                    <a:bodyPr vert="horz" lIns="91440" tIns="45720" rIns="91440" bIns="45720" anchor="ctr" anchorCtr="0"/>
+                    <a:p>
+                      <a:pPr marL="0" marR="0" indent="0" algn="ctr" latinLnBrk="0">
+                        <a:lnSpc>
+                          <a:spcPct val="130000"/>
+                        </a:lnSpc>
+                        <a:spcBef>
+                          <a:spcPts val="0"/>
+                        </a:spcBef>
+                        <a:spcAft>
+                          <a:spcPts val="0"/>
+                        </a:spcAft>
+                        <a:defRPr/>
+                      </a:pPr>
+                      <a:endParaRPr lang="ko-KR" altLang="en-US"/>
+                    </a:p>
+                  </a:txBody>
+                  <a:tcPr marL="91440" marR="91440" anchor="ctr">
+                    <a:lnL w="3556" cap="flat" cmpd="sng" algn="ctr">
+                      <a:solidFill>
+                        <a:srgbClr val="000000"/>
+                      </a:solidFill>
+                      <a:prstDash val="solid"/>
+                      <a:round/>
+                      <a:headEnd w="med" len="med"/>
+                      <a:tailEnd w="med" len="med"/>
+                    </a:lnL>
+                    <a:lnR w="3556" cap="flat" cmpd="sng" algn="ctr">
+                      <a:solidFill>
+                        <a:srgbClr val="000000"/>
+                      </a:solidFill>
+                      <a:prstDash val="solid"/>
+                      <a:round/>
+                      <a:headEnd w="med" len="med"/>
+                      <a:tailEnd w="med" len="med"/>
+                    </a:lnR>
+                    <a:lnT w="3556" cap="flat" cmpd="sng" algn="ctr">
+                      <a:solidFill>
+                        <a:srgbClr val="000000"/>
+                      </a:solidFill>
+                      <a:prstDash val="solid"/>
+                      <a:round/>
+                      <a:headEnd w="med" len="med"/>
+                      <a:tailEnd w="med" len="med"/>
+                    </a:lnT>
+                    <a:lnB w="3556" cap="flat" cmpd="sng" algn="ctr">
+                      <a:solidFill>
+                        <a:srgbClr val="000000"/>
+                      </a:solidFill>
+                      <a:prstDash val="solid"/>
+                      <a:round/>
+                      <a:headEnd w="med" len="med"/>
+                      <a:tailEnd w="med" len="med"/>
+                    </a:lnB>
+                  </a:tcPr>
+                </a:tc>
+                <a:tc>
+                  <a:txBody>
+                    <a:bodyPr vert="horz" lIns="91440" tIns="45720" rIns="91440" bIns="45720" anchor="ctr" anchorCtr="0"/>
+                    <a:p>
+                      <a:pPr marL="0" marR="0" indent="0" algn="ctr" latinLnBrk="0">
+                        <a:lnSpc>
+                          <a:spcPct val="130000"/>
+                        </a:lnSpc>
+                        <a:spcBef>
+                          <a:spcPts val="0"/>
+                        </a:spcBef>
+                        <a:spcAft>
+                          <a:spcPts val="0"/>
+                        </a:spcAft>
+                        <a:defRPr/>
+                      </a:pPr>
+                      <a:r>
+                        <a:rPr lang="ko-KR" altLang="en-US" sz="1800" b="0" kern="0" spc="-60">
+                          <a:solidFill>
+                            <a:srgbClr val="000000"/>
+                          </a:solidFill>
+                          <a:effectLst/>
+                          <a:latin typeface="+mj-lt"/>
+                          <a:ea typeface="함초롬바탕"/>
+                        </a:rPr>
+                        <a:t>제품 개발 프로그래밍</a:t>
+                      </a:r>
+                      <a:endParaRPr lang="ko-KR" altLang="en-US" sz="1800" b="0" kern="0" spc="-60">
+                        <a:solidFill>
+                          <a:srgbClr val="000000"/>
+                        </a:solidFill>
+                        <a:effectLst/>
+                        <a:latin typeface="+mj-lt"/>
+                      </a:endParaRPr>
+                    </a:p>
+                  </a:txBody>
+                  <a:tcPr marL="91440" marR="91440" anchor="ctr">
+                    <a:lnL w="3556" cap="flat" cmpd="sng" algn="ctr">
+                      <a:solidFill>
+                        <a:srgbClr val="000000"/>
+                      </a:solidFill>
+                      <a:prstDash val="solid"/>
+                      <a:round/>
+                      <a:headEnd w="med" len="med"/>
+                      <a:tailEnd w="med" len="med"/>
+                    </a:lnL>
+                    <a:lnR w="3556" cap="flat" cmpd="sng" algn="ctr">
+                      <a:solidFill>
+                        <a:srgbClr val="000000"/>
+                      </a:solidFill>
+                      <a:prstDash val="solid"/>
+                      <a:round/>
+                      <a:headEnd w="med" len="med"/>
+                      <a:tailEnd w="med" len="med"/>
+                    </a:lnR>
+                    <a:lnT w="3556" cap="flat" cmpd="sng" algn="ctr">
+                      <a:solidFill>
+                        <a:srgbClr val="000000"/>
+                      </a:solidFill>
+                      <a:prstDash val="solid"/>
+                      <a:round/>
+                      <a:headEnd w="med" len="med"/>
+                      <a:tailEnd w="med" len="med"/>
+                    </a:lnT>
+                    <a:lnB w="3556" cap="flat" cmpd="sng" algn="ctr">
+                      <a:solidFill>
+                        <a:srgbClr val="000000"/>
+                      </a:solidFill>
+                      <a:prstDash val="solid"/>
+                      <a:round/>
+                      <a:headEnd w="med" len="med"/>
+                      <a:tailEnd w="med" len="med"/>
+                    </a:lnB>
+                  </a:tcPr>
+                </a:tc>
+                <a:tc>
+                  <a:txBody>
+                    <a:bodyPr vert="horz" lIns="91440" tIns="45720" rIns="91440" bIns="45720" anchor="ctr" anchorCtr="0"/>
+                    <a:p>
+                      <a:pPr marL="0" marR="0" indent="0" algn="ctr" latinLnBrk="0">
+                        <a:lnSpc>
+                          <a:spcPct val="130000"/>
+                        </a:lnSpc>
+                        <a:spcBef>
+                          <a:spcPts val="0"/>
+                        </a:spcBef>
+                        <a:spcAft>
+                          <a:spcPts val="0"/>
+                        </a:spcAft>
+                        <a:defRPr/>
+                      </a:pPr>
+                      <a:endParaRPr lang="ko-KR" altLang="en-US" sz="1800" b="0" kern="0" spc="-60">
+                        <a:solidFill>
+                          <a:srgbClr val="000000"/>
+                        </a:solidFill>
+                        <a:effectLst/>
+                        <a:latin typeface="+mj-lt"/>
+                      </a:endParaRPr>
+                    </a:p>
+                  </a:txBody>
+                  <a:tcPr marL="91440" marR="91440" anchor="ctr">
+                    <a:lnL w="3556" cap="flat" cmpd="sng" algn="ctr">
+                      <a:solidFill>
+                        <a:srgbClr val="000000"/>
+                      </a:solidFill>
+                      <a:prstDash val="solid"/>
+                      <a:round/>
+                      <a:headEnd w="med" len="med"/>
+                      <a:tailEnd w="med" len="med"/>
+                    </a:lnL>
+                    <a:lnR w="3556" cap="flat" cmpd="sng" algn="ctr">
+                      <a:solidFill>
+                        <a:srgbClr val="000000"/>
+                      </a:solidFill>
+                      <a:prstDash val="solid"/>
+                      <a:round/>
+                      <a:headEnd w="med" len="med"/>
+                      <a:tailEnd w="med" len="med"/>
+                    </a:lnR>
+                    <a:lnT w="3556" cap="flat" cmpd="sng" algn="ctr">
+                      <a:solidFill>
+                        <a:srgbClr val="000000"/>
+                      </a:solidFill>
+                      <a:prstDash val="solid"/>
+                      <a:round/>
+                      <a:headEnd w="med" len="med"/>
+                      <a:tailEnd w="med" len="med"/>
+                    </a:lnT>
+                    <a:lnB w="3556" cap="flat" cmpd="sng" algn="ctr">
+                      <a:solidFill>
+                        <a:srgbClr val="000000"/>
+                      </a:solidFill>
+                      <a:prstDash val="solid"/>
+                      <a:round/>
+                      <a:headEnd w="med" len="med"/>
+                      <a:tailEnd w="med" len="med"/>
+                    </a:lnB>
+                  </a:tcPr>
+                </a:tc>
+              </a:tr>
+              <a:tr h="511740">
+                <a:tc vMerge="1">
+                  <a:txBody>
+                    <a:bodyPr/>
+                    <a:p>
+                      <a:pPr latinLnBrk="1">
+                        <a:defRPr/>
+                      </a:pPr>
+                      <a:endParaRPr lang="ko-KR" altLang="en-US"/>
+                    </a:p>
+                  </a:txBody>
+                  <a:tcPr marL="91440" marR="91440"/>
+                </a:tc>
+                <a:tc>
+                  <a:txBody>
+                    <a:bodyPr vert="horz" lIns="91440" tIns="45720" rIns="91440" bIns="45720" anchor="ctr" anchorCtr="0"/>
+                    <a:p>
+                      <a:pPr marL="0" marR="0" indent="0" algn="ctr" latinLnBrk="0">
+                        <a:lnSpc>
+                          <a:spcPct val="130000"/>
+                        </a:lnSpc>
+                        <a:spcBef>
+                          <a:spcPts val="0"/>
+                        </a:spcBef>
+                        <a:spcAft>
+                          <a:spcPts val="0"/>
+                        </a:spcAft>
+                        <a:defRPr/>
+                      </a:pPr>
+                      <a:endParaRPr lang="ko-KR" altLang="en-US"/>
+                    </a:p>
+                  </a:txBody>
+                  <a:tcPr marL="91440" marR="91440" anchor="ctr">
+                    <a:lnL w="3556" cap="flat" cmpd="sng" algn="ctr">
+                      <a:solidFill>
+                        <a:srgbClr val="000000"/>
+                      </a:solidFill>
+                      <a:prstDash val="solid"/>
+                      <a:round/>
+                      <a:headEnd w="med" len="med"/>
+                      <a:tailEnd w="med" len="med"/>
+                    </a:lnL>
+                    <a:lnR w="3556" cap="flat" cmpd="sng" algn="ctr">
+                      <a:solidFill>
+                        <a:srgbClr val="000000"/>
+                      </a:solidFill>
+                      <a:prstDash val="solid"/>
+                      <a:round/>
+                      <a:headEnd w="med" len="med"/>
+                      <a:tailEnd w="med" len="med"/>
+                    </a:lnR>
+                    <a:lnT w="3556" cap="flat" cmpd="sng" algn="ctr">
+                      <a:solidFill>
+                        <a:srgbClr val="000000"/>
+                      </a:solidFill>
+                      <a:prstDash val="solid"/>
+                      <a:round/>
+                      <a:headEnd w="med" len="med"/>
+                      <a:tailEnd w="med" len="med"/>
+                    </a:lnT>
+                    <a:lnB w="3556" cap="flat" cmpd="sng" algn="ctr">
+                      <a:solidFill>
+                        <a:srgbClr val="000000"/>
+                      </a:solidFill>
+                      <a:prstDash val="solid"/>
+                      <a:round/>
+                      <a:headEnd w="med" len="med"/>
+                      <a:tailEnd w="med" len="med"/>
+                    </a:lnB>
+                  </a:tcPr>
+                </a:tc>
+                <a:tc>
+                  <a:txBody>
+                    <a:bodyPr vert="horz" lIns="91440" tIns="45720" rIns="91440" bIns="45720" anchor="ctr" anchorCtr="0"/>
+                    <a:p>
+                      <a:pPr marL="0" marR="0" indent="0" algn="ctr" latinLnBrk="0">
+                        <a:lnSpc>
+                          <a:spcPct val="130000"/>
+                        </a:lnSpc>
+                        <a:spcBef>
+                          <a:spcPts val="0"/>
+                        </a:spcBef>
+                        <a:spcAft>
+                          <a:spcPts val="0"/>
+                        </a:spcAft>
+                        <a:defRPr/>
+                      </a:pPr>
+                      <a:r>
+                        <a:rPr lang="ko-KR" altLang="en-US" sz="1800" b="0" kern="0" spc="-60">
+                          <a:solidFill>
+                            <a:srgbClr val="000000"/>
+                          </a:solidFill>
+                          <a:effectLst/>
+                          <a:latin typeface="+mj-lt"/>
+                          <a:ea typeface="함초롬바탕"/>
+                        </a:rPr>
+                        <a:t>검증 및 토의</a:t>
+                      </a:r>
+                      <a:endParaRPr lang="ko-KR" altLang="en-US" sz="1800" b="0" kern="0" spc="-60">
+                        <a:solidFill>
+                          <a:srgbClr val="000000"/>
+                        </a:solidFill>
+                        <a:effectLst/>
+                        <a:latin typeface="+mj-lt"/>
+                      </a:endParaRPr>
+                    </a:p>
+                  </a:txBody>
+                  <a:tcPr marL="91440" marR="91440" anchor="ctr">
+                    <a:lnL w="3556" cap="flat" cmpd="sng" algn="ctr">
+                      <a:solidFill>
+                        <a:srgbClr val="000000"/>
+                      </a:solidFill>
+                      <a:prstDash val="solid"/>
+                      <a:round/>
+                      <a:headEnd w="med" len="med"/>
+                      <a:tailEnd w="med" len="med"/>
+                    </a:lnL>
+                    <a:lnR w="3556" cap="flat" cmpd="sng" algn="ctr">
+                      <a:solidFill>
+                        <a:srgbClr val="000000"/>
+                      </a:solidFill>
+                      <a:prstDash val="solid"/>
+                      <a:round/>
+                      <a:headEnd w="med" len="med"/>
+                      <a:tailEnd w="med" len="med"/>
+                    </a:lnR>
+                    <a:lnT w="3556" cap="flat" cmpd="sng" algn="ctr">
+                      <a:solidFill>
+                        <a:srgbClr val="000000"/>
+                      </a:solidFill>
+                      <a:prstDash val="solid"/>
+                      <a:round/>
+                      <a:headEnd w="med" len="med"/>
+                      <a:tailEnd w="med" len="med"/>
+                    </a:lnT>
+                    <a:lnB w="3556" cap="flat" cmpd="sng" algn="ctr">
+                      <a:solidFill>
+                        <a:srgbClr val="000000"/>
+                      </a:solidFill>
+                      <a:prstDash val="solid"/>
+                      <a:round/>
+                      <a:headEnd w="med" len="med"/>
+                      <a:tailEnd w="med" len="med"/>
+                    </a:lnB>
+                  </a:tcPr>
+                </a:tc>
+                <a:tc>
+                  <a:txBody>
+                    <a:bodyPr vert="horz" lIns="91440" tIns="45720" rIns="91440" bIns="45720" anchor="ctr" anchorCtr="0"/>
+                    <a:p>
+                      <a:pPr marL="0" marR="0" indent="0" algn="ctr" latinLnBrk="0">
+                        <a:lnSpc>
+                          <a:spcPct val="130000"/>
+                        </a:lnSpc>
+                        <a:spcBef>
+                          <a:spcPts val="0"/>
+                        </a:spcBef>
+                        <a:spcAft>
+                          <a:spcPts val="0"/>
+                        </a:spcAft>
+                        <a:defRPr/>
+                      </a:pPr>
+                      <a:endParaRPr lang="ko-KR" altLang="en-US" sz="1800" b="0" kern="0" spc="-60">
+                        <a:solidFill>
+                          <a:srgbClr val="000000"/>
+                        </a:solidFill>
+                        <a:effectLst/>
+                        <a:latin typeface="+mj-lt"/>
+                      </a:endParaRPr>
+                    </a:p>
+                  </a:txBody>
+                  <a:tcPr marL="91440" marR="91440" anchor="ctr">
+                    <a:lnL w="3556" cap="flat" cmpd="sng" algn="ctr">
+                      <a:solidFill>
+                        <a:srgbClr val="000000"/>
+                      </a:solidFill>
+                      <a:prstDash val="solid"/>
+                      <a:round/>
+                      <a:headEnd w="med" len="med"/>
+                      <a:tailEnd w="med" len="med"/>
+                    </a:lnL>
+                    <a:lnR w="3556" cap="flat" cmpd="sng" algn="ctr">
+                      <a:solidFill>
+                        <a:srgbClr val="000000"/>
+                      </a:solidFill>
+                      <a:prstDash val="solid"/>
+                      <a:round/>
+                      <a:headEnd w="med" len="med"/>
+                      <a:tailEnd w="med" len="med"/>
+                    </a:lnR>
+                    <a:lnT w="3556" cap="flat" cmpd="sng" algn="ctr">
+                      <a:solidFill>
+                        <a:srgbClr val="000000"/>
+                      </a:solidFill>
+                      <a:prstDash val="solid"/>
+                      <a:round/>
+                      <a:headEnd w="med" len="med"/>
+                      <a:tailEnd w="med" len="med"/>
+                    </a:lnT>
+                    <a:lnB w="3556" cap="flat" cmpd="sng" algn="ctr">
+                      <a:solidFill>
+                        <a:srgbClr val="000000"/>
+                      </a:solidFill>
+                      <a:prstDash val="solid"/>
+                      <a:round/>
+                      <a:headEnd w="med" len="med"/>
+                      <a:tailEnd w="med" len="med"/>
+                    </a:lnB>
+                  </a:tcPr>
+                </a:tc>
+              </a:tr>
+              <a:tr h="511740">
+                <a:tc vMerge="1">
+                  <a:txBody>
+                    <a:bodyPr/>
+                    <a:p>
+                      <a:pPr latinLnBrk="1">
+                        <a:defRPr/>
+                      </a:pPr>
+                      <a:endParaRPr lang="ko-KR" altLang="en-US"/>
+                    </a:p>
+                  </a:txBody>
+                  <a:tcPr marL="91440" marR="91440"/>
+                </a:tc>
+                <a:tc>
+                  <a:txBody>
+                    <a:bodyPr vert="horz" lIns="91440" tIns="45720" rIns="91440" bIns="45720" anchor="ctr" anchorCtr="0"/>
+                    <a:p>
+                      <a:pPr marL="0" marR="0" indent="0" algn="ctr" latinLnBrk="0">
+                        <a:lnSpc>
+                          <a:spcPct val="130000"/>
+                        </a:lnSpc>
+                        <a:spcBef>
+                          <a:spcPts val="0"/>
+                        </a:spcBef>
+                        <a:spcAft>
+                          <a:spcPts val="0"/>
+                        </a:spcAft>
+                        <a:defRPr/>
+                      </a:pPr>
+                      <a:endParaRPr lang="ko-KR" altLang="en-US"/>
                     </a:p>
                   </a:txBody>
                   <a:tcPr marL="91440" marR="91440" anchor="ctr">
@@ -8950,7 +8819,7 @@
             </a:pPr>
             <a:r>
               <a:rPr lang="ko-KR" altLang="en-US"/>
-              <a:t>파일 헥사코드 분석 프로그램</a:t>
+              <a:t>파일 바이너리 데이터 분석 프로그램</a:t>
             </a:r>
             <a:endParaRPr lang="ko-KR" altLang="en-US"/>
           </a:p>

</xml_diff>

<commit_message>
add idea wearable analyzing tool cloud forensic tool
</commit_message>
<xml_diff>
--- a/2021_Summer/jp.hong/Project_BnD_jph.pptx
+++ b/2021_Summer/jp.hong/Project_BnD_jph.pptx
@@ -2,29 +2,32 @@
 <file path=ppt/presentation.xml><?xml version="1.0" encoding="utf-8"?>
 <p:presentation xmlns:r="http://schemas.openxmlformats.org/officeDocument/2006/relationships" xmlns:c="http://schemas.openxmlformats.org/drawingml/2006/chart" xmlns:a="http://schemas.openxmlformats.org/drawingml/2006/main" xmlns:dgm="http://schemas.openxmlformats.org/drawingml/2006/diagram" xmlns:dsp="http://schemas.microsoft.com/office/drawing/2008/diagram" xmlns:p="http://schemas.openxmlformats.org/presentationml/2006/main">
   <p:sldMasterIdLst>
-    <p:sldMasterId id="2147483661" r:id="rId1"/>
+    <p:sldMasterId id="2147483683" r:id="rId1"/>
   </p:sldMasterIdLst>
   <p:sldIdLst>
     <p:sldId id="261" r:id="rId2"/>
     <p:sldId id="303" r:id="rId3"/>
     <p:sldId id="287" r:id="rId4"/>
-    <p:sldId id="305" r:id="rId5"/>
-    <p:sldId id="319" r:id="rId6"/>
-    <p:sldId id="320" r:id="rId7"/>
-    <p:sldId id="318" r:id="rId8"/>
-    <p:sldId id="288" r:id="rId9"/>
-    <p:sldId id="289" r:id="rId10"/>
-    <p:sldId id="297" r:id="rId11"/>
-    <p:sldId id="290" r:id="rId12"/>
-    <p:sldId id="298" r:id="rId13"/>
-    <p:sldId id="291" r:id="rId14"/>
-    <p:sldId id="299" r:id="rId15"/>
-    <p:sldId id="292" r:id="rId16"/>
-    <p:sldId id="300" r:id="rId17"/>
-    <p:sldId id="306" r:id="rId18"/>
-    <p:sldId id="307" r:id="rId19"/>
-    <p:sldId id="294" r:id="rId20"/>
-    <p:sldId id="302" r:id="rId21"/>
+    <p:sldId id="318" r:id="rId5"/>
+    <p:sldId id="305" r:id="rId6"/>
+    <p:sldId id="322" r:id="rId7"/>
+    <p:sldId id="321" r:id="rId8"/>
+    <p:sldId id="323" r:id="rId9"/>
+    <p:sldId id="324" r:id="rId10"/>
+    <p:sldId id="288" r:id="rId11"/>
+    <p:sldId id="325" r:id="rId12"/>
+    <p:sldId id="289" r:id="rId13"/>
+    <p:sldId id="297" r:id="rId14"/>
+    <p:sldId id="290" r:id="rId15"/>
+    <p:sldId id="298" r:id="rId16"/>
+    <p:sldId id="291" r:id="rId17"/>
+    <p:sldId id="299" r:id="rId18"/>
+    <p:sldId id="292" r:id="rId19"/>
+    <p:sldId id="300" r:id="rId20"/>
+    <p:sldId id="306" r:id="rId21"/>
+    <p:sldId id="307" r:id="rId22"/>
+    <p:sldId id="294" r:id="rId23"/>
+    <p:sldId id="302" r:id="rId24"/>
   </p:sldIdLst>
   <p:sldSz cx="12192000" cy="6858000"/>
   <p:notesSz cx="7104063" cy="10234613"/>
@@ -4180,6 +4183,265 @@
           <a:chExt cx="0" cy="0"/>
         </a:xfrm>
       </p:grpSpPr>
+      <p:sp>
+        <p:nvSpPr>
+          <p:cNvPr id="10" name="직사각형 9"/>
+          <p:cNvSpPr/>
+          <p:nvPr/>
+        </p:nvSpPr>
+        <p:spPr>
+          <a:xfrm>
+            <a:off x="-1" y="2398426"/>
+            <a:ext cx="12192001" cy="1338109"/>
+          </a:xfrm>
+          <a:prstGeom prst="rect">
+            <a:avLst/>
+          </a:prstGeom>
+          <a:solidFill>
+            <a:schemeClr val="accent1">
+              <a:lumMod val="75000"/>
+            </a:schemeClr>
+          </a:solidFill>
+          <a:ln>
+            <a:noFill/>
+          </a:ln>
+        </p:spPr>
+        <p:style>
+          <a:lnRef idx="2">
+            <a:schemeClr val="accent1">
+              <a:shade val="50000"/>
+            </a:schemeClr>
+          </a:lnRef>
+          <a:fillRef idx="1">
+            <a:schemeClr val="accent1"/>
+          </a:fillRef>
+          <a:effectRef idx="0">
+            <a:schemeClr val="accent1"/>
+          </a:effectRef>
+          <a:fontRef idx="minor">
+            <a:schemeClr val="lt1"/>
+          </a:fontRef>
+        </p:style>
+        <p:txBody>
+          <a:bodyPr anchor="ctr"/>
+          <a:lstStyle/>
+          <a:p>
+            <a:pPr algn="ctr">
+              <a:defRPr/>
+            </a:pPr>
+            <a:endParaRPr kumimoji="1" lang="ko-KR" altLang="en-US"/>
+          </a:p>
+        </p:txBody>
+      </p:sp>
+      <p:sp>
+        <p:nvSpPr>
+          <p:cNvPr id="12" name="부제목 2"/>
+          <p:cNvSpPr txBox="1"/>
+          <p:nvPr/>
+        </p:nvSpPr>
+        <p:spPr>
+          <a:xfrm>
+            <a:off x="1" y="2608234"/>
+            <a:ext cx="12192000" cy="754314"/>
+          </a:xfrm>
+          <a:prstGeom prst="rect">
+            <a:avLst/>
+          </a:prstGeom>
+        </p:spPr>
+        <p:txBody>
+          <a:bodyPr vert="horz" lIns="91440" tIns="45720" rIns="91440" bIns="45720" anchor="ctr">
+            <a:noAutofit/>
+          </a:bodyPr>
+          <a:lstStyle>
+            <a:lvl1pPr marL="0" indent="0" algn="ctr" defTabSz="914423" rtl="0" eaLnBrk="1" latinLnBrk="1" hangingPunct="1">
+              <a:lnSpc>
+                <a:spcPct val="90000"/>
+              </a:lnSpc>
+              <a:spcBef>
+                <a:spcPts val="1001"/>
+              </a:spcBef>
+              <a:buFont typeface="Arial"/>
+              <a:buNone/>
+              <a:defRPr sz="2400" kern="1200">
+                <a:solidFill>
+                  <a:schemeClr val="tx1"/>
+                </a:solidFill>
+                <a:latin typeface="+mn-lt"/>
+                <a:ea typeface="+mn-ea"/>
+                <a:cs typeface="+mn-cs"/>
+              </a:defRPr>
+            </a:lvl1pPr>
+            <a:lvl2pPr marL="457211" indent="0" algn="ctr" defTabSz="914423" rtl="0" eaLnBrk="1" latinLnBrk="1" hangingPunct="1">
+              <a:lnSpc>
+                <a:spcPct val="90000"/>
+              </a:lnSpc>
+              <a:spcBef>
+                <a:spcPts val="500"/>
+              </a:spcBef>
+              <a:buFont typeface="Arial"/>
+              <a:buNone/>
+              <a:defRPr sz="2000" kern="1200">
+                <a:solidFill>
+                  <a:schemeClr val="tx1"/>
+                </a:solidFill>
+                <a:latin typeface="+mn-lt"/>
+                <a:ea typeface="+mn-ea"/>
+                <a:cs typeface="+mn-cs"/>
+              </a:defRPr>
+            </a:lvl2pPr>
+            <a:lvl3pPr marL="914423" indent="0" algn="ctr" defTabSz="914423" rtl="0" eaLnBrk="1" latinLnBrk="1" hangingPunct="1">
+              <a:lnSpc>
+                <a:spcPct val="90000"/>
+              </a:lnSpc>
+              <a:spcBef>
+                <a:spcPts val="500"/>
+              </a:spcBef>
+              <a:buFont typeface="Arial"/>
+              <a:buNone/>
+              <a:defRPr sz="1801" kern="1200">
+                <a:solidFill>
+                  <a:schemeClr val="tx1"/>
+                </a:solidFill>
+                <a:latin typeface="+mn-lt"/>
+                <a:ea typeface="+mn-ea"/>
+                <a:cs typeface="+mn-cs"/>
+              </a:defRPr>
+            </a:lvl3pPr>
+            <a:lvl4pPr marL="1371634" indent="0" algn="ctr" defTabSz="914423" rtl="0" eaLnBrk="1" latinLnBrk="1" hangingPunct="1">
+              <a:lnSpc>
+                <a:spcPct val="90000"/>
+              </a:lnSpc>
+              <a:spcBef>
+                <a:spcPts val="500"/>
+              </a:spcBef>
+              <a:buFont typeface="Arial"/>
+              <a:buNone/>
+              <a:defRPr sz="1600" kern="1200">
+                <a:solidFill>
+                  <a:schemeClr val="tx1"/>
+                </a:solidFill>
+                <a:latin typeface="+mn-lt"/>
+                <a:ea typeface="+mn-ea"/>
+                <a:cs typeface="+mn-cs"/>
+              </a:defRPr>
+            </a:lvl4pPr>
+            <a:lvl5pPr marL="1828846" indent="0" algn="ctr" defTabSz="914423" rtl="0" eaLnBrk="1" latinLnBrk="1" hangingPunct="1">
+              <a:lnSpc>
+                <a:spcPct val="90000"/>
+              </a:lnSpc>
+              <a:spcBef>
+                <a:spcPts val="500"/>
+              </a:spcBef>
+              <a:buFont typeface="Arial"/>
+              <a:buNone/>
+              <a:defRPr sz="1600" kern="1200">
+                <a:solidFill>
+                  <a:schemeClr val="tx1"/>
+                </a:solidFill>
+                <a:latin typeface="+mn-lt"/>
+                <a:ea typeface="+mn-ea"/>
+                <a:cs typeface="+mn-cs"/>
+              </a:defRPr>
+            </a:lvl5pPr>
+            <a:lvl6pPr marL="2286057" indent="0" algn="ctr" defTabSz="914423" rtl="0" eaLnBrk="1" latinLnBrk="1" hangingPunct="1">
+              <a:lnSpc>
+                <a:spcPct val="90000"/>
+              </a:lnSpc>
+              <a:spcBef>
+                <a:spcPts val="500"/>
+              </a:spcBef>
+              <a:buFont typeface="Arial"/>
+              <a:buNone/>
+              <a:defRPr sz="1600" kern="1200">
+                <a:solidFill>
+                  <a:schemeClr val="tx1"/>
+                </a:solidFill>
+                <a:latin typeface="+mn-lt"/>
+                <a:ea typeface="+mn-ea"/>
+                <a:cs typeface="+mn-cs"/>
+              </a:defRPr>
+            </a:lvl6pPr>
+            <a:lvl7pPr marL="2743269" indent="0" algn="ctr" defTabSz="914423" rtl="0" eaLnBrk="1" latinLnBrk="1" hangingPunct="1">
+              <a:lnSpc>
+                <a:spcPct val="90000"/>
+              </a:lnSpc>
+              <a:spcBef>
+                <a:spcPts val="500"/>
+              </a:spcBef>
+              <a:buFont typeface="Arial"/>
+              <a:buNone/>
+              <a:defRPr sz="1600" kern="1200">
+                <a:solidFill>
+                  <a:schemeClr val="tx1"/>
+                </a:solidFill>
+                <a:latin typeface="+mn-lt"/>
+                <a:ea typeface="+mn-ea"/>
+                <a:cs typeface="+mn-cs"/>
+              </a:defRPr>
+            </a:lvl7pPr>
+            <a:lvl8pPr marL="3200480" indent="0" algn="ctr" defTabSz="914423" rtl="0" eaLnBrk="1" latinLnBrk="1" hangingPunct="1">
+              <a:lnSpc>
+                <a:spcPct val="90000"/>
+              </a:lnSpc>
+              <a:spcBef>
+                <a:spcPts val="500"/>
+              </a:spcBef>
+              <a:buFont typeface="Arial"/>
+              <a:buNone/>
+              <a:defRPr sz="1600" kern="1200">
+                <a:solidFill>
+                  <a:schemeClr val="tx1"/>
+                </a:solidFill>
+                <a:latin typeface="+mn-lt"/>
+                <a:ea typeface="+mn-ea"/>
+                <a:cs typeface="+mn-cs"/>
+              </a:defRPr>
+            </a:lvl8pPr>
+            <a:lvl9pPr marL="3657691" indent="0" algn="ctr" defTabSz="914423" rtl="0" eaLnBrk="1" latinLnBrk="1" hangingPunct="1">
+              <a:lnSpc>
+                <a:spcPct val="90000"/>
+              </a:lnSpc>
+              <a:spcBef>
+                <a:spcPts val="500"/>
+              </a:spcBef>
+              <a:buFont typeface="Arial"/>
+              <a:buNone/>
+              <a:defRPr sz="1600" kern="1200">
+                <a:solidFill>
+                  <a:schemeClr val="tx1"/>
+                </a:solidFill>
+                <a:latin typeface="+mn-lt"/>
+                <a:ea typeface="+mn-ea"/>
+                <a:cs typeface="+mn-cs"/>
+              </a:defRPr>
+            </a:lvl9pPr>
+          </a:lstStyle>
+          <a:p>
+            <a:pPr lvl="0">
+              <a:defRPr/>
+            </a:pPr>
+            <a:r>
+              <a:rPr lang="ko-KR" altLang="en-US" sz="4800">
+                <a:solidFill>
+                  <a:schemeClr val="bg1"/>
+                </a:solidFill>
+                <a:latin typeface="+mj-lt"/>
+                <a:ea typeface="맑은 고딕"/>
+                <a:cs typeface="맑은 고딕"/>
+              </a:rPr>
+              <a:t>요구사항 정의</a:t>
+            </a:r>
+            <a:endParaRPr lang="ko-KR" altLang="en-US" sz="4800">
+              <a:solidFill>
+                <a:schemeClr val="bg1"/>
+              </a:solidFill>
+              <a:latin typeface="+mj-lt"/>
+              <a:ea typeface="맑은 고딕"/>
+              <a:cs typeface="맑은 고딕"/>
+            </a:endParaRPr>
+          </a:p>
+        </p:txBody>
+      </p:sp>
     </p:spTree>
   </p:cSld>
   <p:clrMapOvr>
@@ -4197,6 +4459,211 @@
 </file>
 
 <file path=ppt/slides/slide11.xml><?xml version="1.0" encoding="utf-8"?>
+<p:sld xmlns:r="http://schemas.openxmlformats.org/officeDocument/2006/relationships" xmlns:c="http://schemas.openxmlformats.org/drawingml/2006/chart" xmlns:a="http://schemas.openxmlformats.org/drawingml/2006/main" xmlns:dgm="http://schemas.openxmlformats.org/drawingml/2006/diagram" xmlns:dsp="http://schemas.microsoft.com/office/drawing/2008/diagram" xmlns:p="http://schemas.openxmlformats.org/presentationml/2006/main">
+  <p:cSld>
+    <p:spTree>
+      <p:nvGrpSpPr>
+        <p:cNvPr id="1" name=""/>
+        <p:cNvGrpSpPr/>
+        <p:nvPr/>
+      </p:nvGrpSpPr>
+      <p:grpSpPr>
+        <a:xfrm>
+          <a:off x="0" y="0"/>
+          <a:ext cx="0" cy="0"/>
+          <a:chOff x="0" y="0"/>
+          <a:chExt cx="0" cy="0"/>
+        </a:xfrm>
+      </p:grpSpPr>
+      <p:sp>
+        <p:nvSpPr>
+          <p:cNvPr id="4" name="직사각형 9"/>
+          <p:cNvSpPr/>
+          <p:nvPr/>
+        </p:nvSpPr>
+        <p:spPr>
+          <a:xfrm>
+            <a:off x="-1" y="0"/>
+            <a:ext cx="12192001" cy="1338109"/>
+          </a:xfrm>
+          <a:prstGeom prst="rect">
+            <a:avLst/>
+          </a:prstGeom>
+          <a:solidFill>
+            <a:schemeClr val="accent1">
+              <a:lumMod val="75000"/>
+            </a:schemeClr>
+          </a:solidFill>
+          <a:ln>
+            <a:noFill/>
+          </a:ln>
+        </p:spPr>
+        <p:style>
+          <a:lnRef idx="2">
+            <a:schemeClr val="accent1">
+              <a:shade val="50000"/>
+            </a:schemeClr>
+          </a:lnRef>
+          <a:fillRef idx="1">
+            <a:schemeClr val="accent1"/>
+          </a:fillRef>
+          <a:effectRef idx="0">
+            <a:schemeClr val="accent1"/>
+          </a:effectRef>
+          <a:fontRef idx="minor">
+            <a:schemeClr val="lt1"/>
+          </a:fontRef>
+        </p:style>
+        <p:txBody>
+          <a:bodyPr anchor="ctr"/>
+          <a:lstStyle/>
+          <a:p>
+            <a:pPr>
+              <a:defRPr/>
+            </a:pPr>
+            <a:r>
+              <a:rPr kumimoji="1" lang="en-US" altLang="ko-KR" sz="4800"/>
+              <a:t>1.</a:t>
+            </a:r>
+            <a:r>
+              <a:rPr kumimoji="1" lang="ko-KR" altLang="en-US" sz="4800"/>
+              <a:t> 아이디어 도출</a:t>
+            </a:r>
+            <a:endParaRPr kumimoji="1" lang="ko-KR" altLang="en-US" sz="4800"/>
+          </a:p>
+        </p:txBody>
+      </p:sp>
+      <p:sp>
+        <p:nvSpPr>
+          <p:cNvPr id="5" name="내용 개체 틀 4"/>
+          <p:cNvSpPr>
+            <a:spLocks noGrp="1"/>
+          </p:cNvSpPr>
+          <p:nvPr>
+            <p:ph idx="1"/>
+          </p:nvPr>
+        </p:nvSpPr>
+        <p:spPr>
+          <a:xfrm>
+            <a:off x="0" y="1561042"/>
+            <a:ext cx="12192000" cy="5296957"/>
+          </a:xfrm>
+        </p:spPr>
+        <p:txBody>
+          <a:bodyPr vert="horz" lIns="91440" tIns="45720" rIns="91440" bIns="45720">
+            <a:normAutofit lnSpcReduction="10000"/>
+          </a:bodyPr>
+          <a:lstStyle/>
+          <a:p>
+            <a:pPr lvl="0">
+              <a:defRPr/>
+            </a:pPr>
+            <a:r>
+              <a:rPr lang="ko-KR" altLang="en-US"/>
+              <a:t>클라우드 포렌식 툴</a:t>
+            </a:r>
+            <a:endParaRPr lang="ko-KR" altLang="en-US"/>
+          </a:p>
+          <a:p>
+            <a:pPr lvl="0">
+              <a:defRPr/>
+            </a:pPr>
+            <a:endParaRPr lang="ko-KR" altLang="en-US"/>
+          </a:p>
+          <a:p>
+            <a:pPr marL="0" lvl="0" indent="0">
+              <a:buNone/>
+              <a:defRPr/>
+            </a:pPr>
+            <a:r>
+              <a:rPr lang="en-US" altLang="ko-KR"/>
+              <a:t> </a:t>
+            </a:r>
+            <a:r>
+              <a:rPr lang="ko-KR" altLang="en-US"/>
+              <a:t> </a:t>
+            </a:r>
+            <a:r>
+              <a:rPr lang="en-US" altLang="ko-KR"/>
+              <a:t>-</a:t>
+            </a:r>
+            <a:r>
+              <a:rPr lang="ko-KR" altLang="en-US"/>
+              <a:t> 계정의 동기화 기능은 뛰어난 접근성과 편의성을 제공하며 이러한 특징으로 클라우드 서비스의 이용 증가</a:t>
+            </a:r>
+            <a:endParaRPr lang="ko-KR" altLang="en-US"/>
+          </a:p>
+          <a:p>
+            <a:pPr marL="0" lvl="0" indent="0">
+              <a:buNone/>
+              <a:defRPr/>
+            </a:pPr>
+            <a:endParaRPr lang="ko-KR" altLang="en-US"/>
+          </a:p>
+          <a:p>
+            <a:pPr marL="0" lvl="0" indent="0">
+              <a:buNone/>
+              <a:defRPr/>
+            </a:pPr>
+            <a:r>
+              <a:rPr lang="ko-KR" altLang="en-US"/>
+              <a:t> </a:t>
+            </a:r>
+            <a:r>
+              <a:rPr lang="en-US" altLang="ko-KR"/>
+              <a:t>-</a:t>
+            </a:r>
+            <a:r>
+              <a:rPr lang="ko-KR" altLang="en-US"/>
+              <a:t> 포렌식 조사과정시 파일이 해당기기에서 생성된 것인지 또는 외부기기로부터 동기화 된 것인지에 대해 명확히 해야 하는 어려움 존재</a:t>
+            </a:r>
+            <a:endParaRPr lang="ko-KR" altLang="en-US"/>
+          </a:p>
+          <a:p>
+            <a:pPr marL="0" lvl="0" indent="0">
+              <a:buNone/>
+              <a:defRPr/>
+            </a:pPr>
+            <a:endParaRPr lang="ko-KR" altLang="en-US"/>
+          </a:p>
+          <a:p>
+            <a:pPr marL="0" lvl="0" indent="0">
+              <a:buNone/>
+              <a:defRPr/>
+            </a:pPr>
+            <a:r>
+              <a:rPr lang="ko-KR" altLang="en-US"/>
+              <a:t> </a:t>
+            </a:r>
+            <a:r>
+              <a:rPr lang="en-US" altLang="ko-KR"/>
+              <a:t>-</a:t>
+            </a:r>
+            <a:r>
+              <a:rPr lang="ko-KR" altLang="en-US"/>
+              <a:t> </a:t>
+            </a:r>
+            <a:endParaRPr lang="ko-KR" altLang="en-US"/>
+          </a:p>
+        </p:txBody>
+      </p:sp>
+    </p:spTree>
+  </p:cSld>
+  <p:clrMapOvr>
+    <a:masterClrMapping/>
+  </p:clrMapOvr>
+  <mc:AlternateContent xmlns:mc="http://schemas.openxmlformats.org/markup-compatibility/2006">
+    <mc:Choice xmlns:p14="http://schemas.microsoft.com/office/powerpoint/2010/main" Requires="p14">
+      <p:transition xmlns:mc="http://schemas.openxmlformats.org/markup-compatibility/2006" xmlns:p14="http://schemas.microsoft.com/office/powerpoint/2010/main" mc:Ignorable="p14" p14:dur="500"/>
+    </mc:Choice>
+    <mc:Fallback>
+      <p:transition/>
+    </mc:Fallback>
+  </mc:AlternateContent>
+</p:sld>
+</file>
+
+<file path=ppt/slides/slide12.xml><?xml version="1.0" encoding="utf-8"?>
 <p:sld xmlns:a="http://schemas.openxmlformats.org/drawingml/2006/main" xmlns:r="http://schemas.openxmlformats.org/officeDocument/2006/relationships" xmlns:p="http://schemas.openxmlformats.org/presentationml/2006/main">
   <p:cSld>
     <p:spTree>
@@ -4456,7 +4923,7 @@
                 <a:ea typeface="맑은 고딕" charset="-127"/>
                 <a:cs typeface="맑은 고딕" charset="-127"/>
               </a:rPr>
-              <a:t>기능 모듈 설계</a:t>
+              <a:t>계획 및 일정 수립</a:t>
             </a:r>
           </a:p>
         </p:txBody>
@@ -4464,7 +4931,7 @@
     </p:spTree>
     <p:extLst>
       <p:ext uri="{BB962C8B-B14F-4D97-AF65-F5344CB8AC3E}">
-        <p14:creationId xmlns:p14="http://schemas.microsoft.com/office/powerpoint/2010/main" val="3636615241"/>
+        <p14:creationId xmlns:p14="http://schemas.microsoft.com/office/powerpoint/2010/main" val="641642769"/>
       </p:ext>
     </p:extLst>
   </p:cSld>
@@ -4474,8 +4941,8 @@
 </p:sld>
 </file>
 
-<file path=ppt/slides/slide12.xml><?xml version="1.0" encoding="utf-8"?>
-<p:sld xmlns:a="http://schemas.openxmlformats.org/drawingml/2006/main" xmlns:r="http://schemas.openxmlformats.org/officeDocument/2006/relationships" xmlns:p="http://schemas.openxmlformats.org/presentationml/2006/main">
+<file path=ppt/slides/slide13.xml><?xml version="1.0" encoding="utf-8"?>
+<p:sld xmlns:r="http://schemas.openxmlformats.org/officeDocument/2006/relationships" xmlns:c="http://schemas.openxmlformats.org/drawingml/2006/chart" xmlns:a="http://schemas.openxmlformats.org/drawingml/2006/main" xmlns:dgm="http://schemas.openxmlformats.org/drawingml/2006/diagram" xmlns:dsp="http://schemas.microsoft.com/office/drawing/2008/diagram" xmlns:p="http://schemas.openxmlformats.org/presentationml/2006/main">
   <p:cSld>
     <p:spTree>
       <p:nvGrpSpPr>
@@ -4491,93 +4958,23 @@
           <a:chExt cx="0" cy="0"/>
         </a:xfrm>
       </p:grpSpPr>
-      <p:sp>
-        <p:nvSpPr>
-          <p:cNvPr id="2" name="제목 1">
-            <a:extLst>
-              <a:ext uri="{FF2B5EF4-FFF2-40B4-BE49-F238E27FC236}">
-                <a16:creationId xmlns:a16="http://schemas.microsoft.com/office/drawing/2014/main" id="{9A1A2E3C-2FD9-439C-87BD-8AE3B27F8C97}"/>
-              </a:ext>
-            </a:extLst>
-          </p:cNvPr>
-          <p:cNvSpPr>
-            <a:spLocks noGrp="1"/>
-          </p:cNvSpPr>
-          <p:nvPr>
-            <p:ph type="title"/>
-          </p:nvPr>
-        </p:nvSpPr>
-        <p:spPr/>
-        <p:txBody>
-          <a:bodyPr/>
-          <a:lstStyle/>
-          <a:p>
-            <a:endParaRPr lang="ko-KR" altLang="en-US"/>
-          </a:p>
-        </p:txBody>
-      </p:sp>
-      <p:sp>
-        <p:nvSpPr>
-          <p:cNvPr id="3" name="내용 개체 틀 2">
-            <a:extLst>
-              <a:ext uri="{FF2B5EF4-FFF2-40B4-BE49-F238E27FC236}">
-                <a16:creationId xmlns:a16="http://schemas.microsoft.com/office/drawing/2014/main" id="{58DC695E-BF5C-4F1A-860C-8BD272E977AA}"/>
-              </a:ext>
-            </a:extLst>
-          </p:cNvPr>
-          <p:cNvSpPr>
-            <a:spLocks noGrp="1"/>
-          </p:cNvSpPr>
-          <p:nvPr>
-            <p:ph idx="1"/>
-          </p:nvPr>
-        </p:nvSpPr>
-        <p:spPr/>
-        <p:txBody>
-          <a:bodyPr/>
-          <a:lstStyle/>
-          <a:p>
-            <a:r>
-              <a:rPr lang="ko-KR" altLang="en-US" dirty="0"/>
-              <a:t>기능정의를 한다</a:t>
-            </a:r>
-            <a:endParaRPr lang="en-US" altLang="ko-KR" dirty="0"/>
-          </a:p>
-          <a:p>
-            <a:r>
-              <a:rPr lang="ko-KR" altLang="en-US" dirty="0"/>
-              <a:t>정의 한 기능에 대해 </a:t>
-            </a:r>
-            <a:r>
-              <a:rPr lang="en-US" altLang="ko-KR" dirty="0"/>
-              <a:t>Flow</a:t>
-            </a:r>
-            <a:r>
-              <a:rPr lang="ko-KR" altLang="en-US" dirty="0"/>
-              <a:t>를 작성한다</a:t>
-            </a:r>
-            <a:r>
-              <a:rPr lang="en-US" altLang="ko-KR" dirty="0"/>
-              <a:t>.</a:t>
-            </a:r>
-            <a:endParaRPr lang="ko-KR" altLang="en-US" dirty="0"/>
-          </a:p>
-        </p:txBody>
-      </p:sp>
     </p:spTree>
-    <p:extLst>
-      <p:ext uri="{BB962C8B-B14F-4D97-AF65-F5344CB8AC3E}">
-        <p14:creationId xmlns:p14="http://schemas.microsoft.com/office/powerpoint/2010/main" val="3772914977"/>
-      </p:ext>
-    </p:extLst>
   </p:cSld>
   <p:clrMapOvr>
     <a:masterClrMapping/>
   </p:clrMapOvr>
+  <mc:AlternateContent xmlns:mc="http://schemas.openxmlformats.org/markup-compatibility/2006">
+    <mc:Choice xmlns:p14="http://schemas.microsoft.com/office/powerpoint/2010/main" Requires="p14">
+      <p:transition xmlns:mc="http://schemas.openxmlformats.org/markup-compatibility/2006" xmlns:p14="http://schemas.microsoft.com/office/powerpoint/2010/main" mc:Ignorable="p14" p14:dur="500"/>
+    </mc:Choice>
+    <mc:Fallback>
+      <p:transition/>
+    </mc:Fallback>
+  </mc:AlternateContent>
 </p:sld>
 </file>
 
-<file path=ppt/slides/slide13.xml><?xml version="1.0" encoding="utf-8"?>
+<file path=ppt/slides/slide14.xml><?xml version="1.0" encoding="utf-8"?>
 <p:sld xmlns:a="http://schemas.openxmlformats.org/drawingml/2006/main" xmlns:r="http://schemas.openxmlformats.org/officeDocument/2006/relationships" xmlns:p="http://schemas.openxmlformats.org/presentationml/2006/main">
   <p:cSld>
     <p:spTree>
@@ -4837,56 +5234,15 @@
                 <a:ea typeface="맑은 고딕" charset="-127"/>
                 <a:cs typeface="맑은 고딕" charset="-127"/>
               </a:rPr>
-              <a:t>기능 검토 </a:t>
-            </a:r>
-            <a:r>
-              <a:rPr lang="en-US" altLang="ko-KR" sz="4800" dirty="0">
-                <a:solidFill>
-                  <a:schemeClr val="bg1"/>
-                </a:solidFill>
-                <a:latin typeface="+mj-lt"/>
-                <a:ea typeface="맑은 고딕" charset="-127"/>
-                <a:cs typeface="맑은 고딕" charset="-127"/>
-              </a:rPr>
-              <a:t>(</a:t>
-            </a:r>
-            <a:r>
-              <a:rPr lang="ko-KR" altLang="en-US" sz="4800" dirty="0">
-                <a:solidFill>
-                  <a:schemeClr val="bg1"/>
-                </a:solidFill>
-                <a:latin typeface="+mj-lt"/>
-                <a:ea typeface="맑은 고딕" charset="-127"/>
-                <a:cs typeface="맑은 고딕" charset="-127"/>
-              </a:rPr>
-              <a:t>근거자료 및 샘플코드</a:t>
-            </a:r>
-            <a:r>
-              <a:rPr lang="en-US" altLang="ko-KR" sz="4800" dirty="0">
-                <a:solidFill>
-                  <a:schemeClr val="bg1"/>
-                </a:solidFill>
-                <a:latin typeface="+mj-lt"/>
-                <a:ea typeface="맑은 고딕" charset="-127"/>
-                <a:cs typeface="맑은 고딕" charset="-127"/>
-              </a:rPr>
-              <a:t>)</a:t>
-            </a:r>
-            <a:endParaRPr lang="ko-KR" altLang="en-US" sz="4800" dirty="0">
-              <a:solidFill>
-                <a:schemeClr val="bg1"/>
-              </a:solidFill>
-              <a:latin typeface="+mj-lt"/>
-              <a:ea typeface="맑은 고딕" charset="-127"/>
-              <a:cs typeface="맑은 고딕" charset="-127"/>
-            </a:endParaRPr>
+              <a:t>기능 모듈 설계</a:t>
+            </a:r>
           </a:p>
         </p:txBody>
       </p:sp>
     </p:spTree>
     <p:extLst>
       <p:ext uri="{BB962C8B-B14F-4D97-AF65-F5344CB8AC3E}">
-        <p14:creationId xmlns:p14="http://schemas.microsoft.com/office/powerpoint/2010/main" val="2800779971"/>
+        <p14:creationId xmlns:p14="http://schemas.microsoft.com/office/powerpoint/2010/main" val="3636615241"/>
       </p:ext>
     </p:extLst>
   </p:cSld>
@@ -4896,7 +5252,7 @@
 </p:sld>
 </file>
 
-<file path=ppt/slides/slide14.xml><?xml version="1.0" encoding="utf-8"?>
+<file path=ppt/slides/slide15.xml><?xml version="1.0" encoding="utf-8"?>
 <p:sld xmlns:a="http://schemas.openxmlformats.org/drawingml/2006/main" xmlns:r="http://schemas.openxmlformats.org/officeDocument/2006/relationships" xmlns:p="http://schemas.openxmlformats.org/presentationml/2006/main">
   <p:cSld>
     <p:spTree>
@@ -4918,7 +5274,7 @@
           <p:cNvPr id="2" name="제목 1">
             <a:extLst>
               <a:ext uri="{FF2B5EF4-FFF2-40B4-BE49-F238E27FC236}">
-                <a16:creationId xmlns:a16="http://schemas.microsoft.com/office/drawing/2014/main" id="{CD32A4A8-C5FD-473F-A41F-A660400BC448}"/>
+                <a16:creationId xmlns:a16="http://schemas.microsoft.com/office/drawing/2014/main" id="{9A1A2E3C-2FD9-439C-87BD-8AE3B27F8C97}"/>
               </a:ext>
             </a:extLst>
           </p:cNvPr>
@@ -4943,7 +5299,7 @@
           <p:cNvPr id="3" name="내용 개체 틀 2">
             <a:extLst>
               <a:ext uri="{FF2B5EF4-FFF2-40B4-BE49-F238E27FC236}">
-                <a16:creationId xmlns:a16="http://schemas.microsoft.com/office/drawing/2014/main" id="{FC688E77-0112-474B-BD84-18F7FC4240C7}"/>
+                <a16:creationId xmlns:a16="http://schemas.microsoft.com/office/drawing/2014/main" id="{58DC695E-BF5C-4F1A-860C-8BD272E977AA}"/>
               </a:ext>
             </a:extLst>
           </p:cNvPr>
@@ -4961,17 +5317,22 @@
           <a:p>
             <a:r>
               <a:rPr lang="ko-KR" altLang="en-US" dirty="0"/>
-              <a:t>기능 구현에 필요한 기술을 알아본다</a:t>
+              <a:t>기능정의를 한다</a:t>
             </a:r>
             <a:endParaRPr lang="en-US" altLang="ko-KR" dirty="0"/>
           </a:p>
           <a:p>
-            <a:endParaRPr lang="en-US" altLang="ko-KR" dirty="0"/>
-          </a:p>
-          <a:p>
             <a:r>
               <a:rPr lang="ko-KR" altLang="en-US" dirty="0"/>
-              <a:t>샘플 코드를 수집한다</a:t>
+              <a:t>정의 한 기능에 대해 </a:t>
+            </a:r>
+            <a:r>
+              <a:rPr lang="en-US" altLang="ko-KR" dirty="0"/>
+              <a:t>Flow</a:t>
+            </a:r>
+            <a:r>
+              <a:rPr lang="ko-KR" altLang="en-US" dirty="0"/>
+              <a:t>를 작성한다</a:t>
             </a:r>
             <a:r>
               <a:rPr lang="en-US" altLang="ko-KR" dirty="0"/>
@@ -4984,7 +5345,7 @@
     </p:spTree>
     <p:extLst>
       <p:ext uri="{BB962C8B-B14F-4D97-AF65-F5344CB8AC3E}">
-        <p14:creationId xmlns:p14="http://schemas.microsoft.com/office/powerpoint/2010/main" val="414149680"/>
+        <p14:creationId xmlns:p14="http://schemas.microsoft.com/office/powerpoint/2010/main" val="3772914977"/>
       </p:ext>
     </p:extLst>
   </p:cSld>
@@ -4994,7 +5355,7 @@
 </p:sld>
 </file>
 
-<file path=ppt/slides/slide15.xml><?xml version="1.0" encoding="utf-8"?>
+<file path=ppt/slides/slide16.xml><?xml version="1.0" encoding="utf-8"?>
 <p:sld xmlns:a="http://schemas.openxmlformats.org/drawingml/2006/main" xmlns:r="http://schemas.openxmlformats.org/officeDocument/2006/relationships" xmlns:p="http://schemas.openxmlformats.org/presentationml/2006/main">
   <p:cSld>
     <p:spTree>
@@ -5254,15 +5615,56 @@
                 <a:ea typeface="맑은 고딕" charset="-127"/>
                 <a:cs typeface="맑은 고딕" charset="-127"/>
               </a:rPr>
-              <a:t>스토리보드 제작</a:t>
-            </a:r>
+              <a:t>기능 검토 </a:t>
+            </a:r>
+            <a:r>
+              <a:rPr lang="en-US" altLang="ko-KR" sz="4800" dirty="0">
+                <a:solidFill>
+                  <a:schemeClr val="bg1"/>
+                </a:solidFill>
+                <a:latin typeface="+mj-lt"/>
+                <a:ea typeface="맑은 고딕" charset="-127"/>
+                <a:cs typeface="맑은 고딕" charset="-127"/>
+              </a:rPr>
+              <a:t>(</a:t>
+            </a:r>
+            <a:r>
+              <a:rPr lang="ko-KR" altLang="en-US" sz="4800" dirty="0">
+                <a:solidFill>
+                  <a:schemeClr val="bg1"/>
+                </a:solidFill>
+                <a:latin typeface="+mj-lt"/>
+                <a:ea typeface="맑은 고딕" charset="-127"/>
+                <a:cs typeface="맑은 고딕" charset="-127"/>
+              </a:rPr>
+              <a:t>근거자료 및 샘플코드</a:t>
+            </a:r>
+            <a:r>
+              <a:rPr lang="en-US" altLang="ko-KR" sz="4800" dirty="0">
+                <a:solidFill>
+                  <a:schemeClr val="bg1"/>
+                </a:solidFill>
+                <a:latin typeface="+mj-lt"/>
+                <a:ea typeface="맑은 고딕" charset="-127"/>
+                <a:cs typeface="맑은 고딕" charset="-127"/>
+              </a:rPr>
+              <a:t>)</a:t>
+            </a:r>
+            <a:endParaRPr lang="ko-KR" altLang="en-US" sz="4800" dirty="0">
+              <a:solidFill>
+                <a:schemeClr val="bg1"/>
+              </a:solidFill>
+              <a:latin typeface="+mj-lt"/>
+              <a:ea typeface="맑은 고딕" charset="-127"/>
+              <a:cs typeface="맑은 고딕" charset="-127"/>
+            </a:endParaRPr>
           </a:p>
         </p:txBody>
       </p:sp>
     </p:spTree>
     <p:extLst>
       <p:ext uri="{BB962C8B-B14F-4D97-AF65-F5344CB8AC3E}">
-        <p14:creationId xmlns:p14="http://schemas.microsoft.com/office/powerpoint/2010/main" val="4131486605"/>
+        <p14:creationId xmlns:p14="http://schemas.microsoft.com/office/powerpoint/2010/main" val="2800779971"/>
       </p:ext>
     </p:extLst>
   </p:cSld>
@@ -5272,7 +5674,7 @@
 </p:sld>
 </file>
 
-<file path=ppt/slides/slide16.xml><?xml version="1.0" encoding="utf-8"?>
+<file path=ppt/slides/slide17.xml><?xml version="1.0" encoding="utf-8"?>
 <p:sld xmlns:a="http://schemas.openxmlformats.org/drawingml/2006/main" xmlns:r="http://schemas.openxmlformats.org/officeDocument/2006/relationships" xmlns:p="http://schemas.openxmlformats.org/presentationml/2006/main">
   <p:cSld>
     <p:spTree>
@@ -5294,7 +5696,7 @@
           <p:cNvPr id="2" name="제목 1">
             <a:extLst>
               <a:ext uri="{FF2B5EF4-FFF2-40B4-BE49-F238E27FC236}">
-                <a16:creationId xmlns:a16="http://schemas.microsoft.com/office/drawing/2014/main" id="{FEF97B69-9031-4A28-901F-246C46549083}"/>
+                <a16:creationId xmlns:a16="http://schemas.microsoft.com/office/drawing/2014/main" id="{CD32A4A8-C5FD-473F-A41F-A660400BC448}"/>
               </a:ext>
             </a:extLst>
           </p:cNvPr>
@@ -5319,7 +5721,7 @@
           <p:cNvPr id="3" name="내용 개체 틀 2">
             <a:extLst>
               <a:ext uri="{FF2B5EF4-FFF2-40B4-BE49-F238E27FC236}">
-                <a16:creationId xmlns:a16="http://schemas.microsoft.com/office/drawing/2014/main" id="{7B537D8F-5982-4653-B96A-BB8B9CAB7064}"/>
+                <a16:creationId xmlns:a16="http://schemas.microsoft.com/office/drawing/2014/main" id="{FC688E77-0112-474B-BD84-18F7FC4240C7}"/>
               </a:ext>
             </a:extLst>
           </p:cNvPr>
@@ -5337,7 +5739,7 @@
           <a:p>
             <a:r>
               <a:rPr lang="ko-KR" altLang="en-US" dirty="0"/>
-              <a:t>기능 구현에 대한 디자인 구상</a:t>
+              <a:t>기능 구현에 필요한 기술을 알아본다</a:t>
             </a:r>
             <a:endParaRPr lang="en-US" altLang="ko-KR" dirty="0"/>
           </a:p>
@@ -5347,7 +5749,7 @@
           <a:p>
             <a:r>
               <a:rPr lang="ko-KR" altLang="en-US" dirty="0"/>
-              <a:t>디자인에 따른 동작을 기술하고 연계 한다</a:t>
+              <a:t>샘플 코드를 수집한다</a:t>
             </a:r>
             <a:r>
               <a:rPr lang="en-US" altLang="ko-KR" dirty="0"/>
@@ -5360,7 +5762,7 @@
     </p:spTree>
     <p:extLst>
       <p:ext uri="{BB962C8B-B14F-4D97-AF65-F5344CB8AC3E}">
-        <p14:creationId xmlns:p14="http://schemas.microsoft.com/office/powerpoint/2010/main" val="1723942396"/>
+        <p14:creationId xmlns:p14="http://schemas.microsoft.com/office/powerpoint/2010/main" val="414149680"/>
       </p:ext>
     </p:extLst>
   </p:cSld>
@@ -5370,7 +5772,7 @@
 </p:sld>
 </file>
 
-<file path=ppt/slides/slide17.xml><?xml version="1.0" encoding="utf-8"?>
+<file path=ppt/slides/slide18.xml><?xml version="1.0" encoding="utf-8"?>
 <p:sld xmlns:a="http://schemas.openxmlformats.org/drawingml/2006/main" xmlns:r="http://schemas.openxmlformats.org/officeDocument/2006/relationships" xmlns:p="http://schemas.openxmlformats.org/presentationml/2006/main">
   <p:cSld>
     <p:spTree>
@@ -5630,7 +6032,7 @@
                 <a:ea typeface="맑은 고딕" charset="-127"/>
                 <a:cs typeface="맑은 고딕" charset="-127"/>
               </a:rPr>
-              <a:t>구현</a:t>
+              <a:t>스토리보드 제작</a:t>
             </a:r>
           </a:p>
         </p:txBody>
@@ -5638,95 +6040,7 @@
     </p:spTree>
     <p:extLst>
       <p:ext uri="{BB962C8B-B14F-4D97-AF65-F5344CB8AC3E}">
-        <p14:creationId xmlns:p14="http://schemas.microsoft.com/office/powerpoint/2010/main" val="1697315730"/>
-      </p:ext>
-    </p:extLst>
-  </p:cSld>
-  <p:clrMapOvr>
-    <a:masterClrMapping/>
-  </p:clrMapOvr>
-</p:sld>
-</file>
-
-<file path=ppt/slides/slide18.xml><?xml version="1.0" encoding="utf-8"?>
-<p:sld xmlns:a="http://schemas.openxmlformats.org/drawingml/2006/main" xmlns:r="http://schemas.openxmlformats.org/officeDocument/2006/relationships" xmlns:p="http://schemas.openxmlformats.org/presentationml/2006/main">
-  <p:cSld>
-    <p:spTree>
-      <p:nvGrpSpPr>
-        <p:cNvPr id="1" name=""/>
-        <p:cNvGrpSpPr/>
-        <p:nvPr/>
-      </p:nvGrpSpPr>
-      <p:grpSpPr>
-        <a:xfrm>
-          <a:off x="0" y="0"/>
-          <a:ext cx="0" cy="0"/>
-          <a:chOff x="0" y="0"/>
-          <a:chExt cx="0" cy="0"/>
-        </a:xfrm>
-      </p:grpSpPr>
-      <p:sp>
-        <p:nvSpPr>
-          <p:cNvPr id="2" name="제목 1">
-            <a:extLst>
-              <a:ext uri="{FF2B5EF4-FFF2-40B4-BE49-F238E27FC236}">
-                <a16:creationId xmlns:a16="http://schemas.microsoft.com/office/drawing/2014/main" id="{2135F92A-65F5-4C7A-8C04-BF5F199039F2}"/>
-              </a:ext>
-            </a:extLst>
-          </p:cNvPr>
-          <p:cNvSpPr>
-            <a:spLocks noGrp="1"/>
-          </p:cNvSpPr>
-          <p:nvPr>
-            <p:ph type="title"/>
-          </p:nvPr>
-        </p:nvSpPr>
-        <p:spPr/>
-        <p:txBody>
-          <a:bodyPr/>
-          <a:lstStyle/>
-          <a:p>
-            <a:endParaRPr lang="ko-KR" altLang="en-US"/>
-          </a:p>
-        </p:txBody>
-      </p:sp>
-      <p:sp>
-        <p:nvSpPr>
-          <p:cNvPr id="3" name="내용 개체 틀 2">
-            <a:extLst>
-              <a:ext uri="{FF2B5EF4-FFF2-40B4-BE49-F238E27FC236}">
-                <a16:creationId xmlns:a16="http://schemas.microsoft.com/office/drawing/2014/main" id="{FB21A4AE-E1C2-4042-9B9E-43F419C42235}"/>
-              </a:ext>
-            </a:extLst>
-          </p:cNvPr>
-          <p:cNvSpPr>
-            <a:spLocks noGrp="1"/>
-          </p:cNvSpPr>
-          <p:nvPr>
-            <p:ph idx="1"/>
-          </p:nvPr>
-        </p:nvSpPr>
-        <p:spPr/>
-        <p:txBody>
-          <a:bodyPr/>
-          <a:lstStyle/>
-          <a:p>
-            <a:r>
-              <a:rPr lang="ko-KR" altLang="en-US" dirty="0"/>
-              <a:t>코드를 작성하고 버그를 수정한다</a:t>
-            </a:r>
-            <a:r>
-              <a:rPr lang="en-US" altLang="ko-KR" dirty="0"/>
-              <a:t>.</a:t>
-            </a:r>
-            <a:endParaRPr lang="ko-KR" altLang="en-US" dirty="0"/>
-          </a:p>
-        </p:txBody>
-      </p:sp>
-    </p:spTree>
-    <p:extLst>
-      <p:ext uri="{BB962C8B-B14F-4D97-AF65-F5344CB8AC3E}">
-        <p14:creationId xmlns:p14="http://schemas.microsoft.com/office/powerpoint/2010/main" val="1303733429"/>
+        <p14:creationId xmlns:p14="http://schemas.microsoft.com/office/powerpoint/2010/main" val="4131486605"/>
       </p:ext>
     </p:extLst>
   </p:cSld>
@@ -5755,275 +6069,76 @@
       </p:grpSpPr>
       <p:sp>
         <p:nvSpPr>
-          <p:cNvPr id="10" name="직사각형 9"/>
-          <p:cNvSpPr/>
-          <p:nvPr/>
+          <p:cNvPr id="2" name="제목 1">
+            <a:extLst>
+              <a:ext uri="{FF2B5EF4-FFF2-40B4-BE49-F238E27FC236}">
+                <a16:creationId xmlns:a16="http://schemas.microsoft.com/office/drawing/2014/main" id="{FEF97B69-9031-4A28-901F-246C46549083}"/>
+              </a:ext>
+            </a:extLst>
+          </p:cNvPr>
+          <p:cNvSpPr>
+            <a:spLocks noGrp="1"/>
+          </p:cNvSpPr>
+          <p:nvPr>
+            <p:ph type="title"/>
+          </p:nvPr>
         </p:nvSpPr>
-        <p:spPr>
-          <a:xfrm>
-            <a:off x="-1" y="2398426"/>
-            <a:ext cx="12192001" cy="1338109"/>
-          </a:xfrm>
-          <a:prstGeom prst="rect">
-            <a:avLst/>
-          </a:prstGeom>
-          <a:solidFill>
-            <a:schemeClr val="accent1">
-              <a:lumMod val="75000"/>
-            </a:schemeClr>
-          </a:solidFill>
-          <a:ln>
-            <a:noFill/>
-          </a:ln>
-        </p:spPr>
-        <p:style>
-          <a:lnRef idx="2">
-            <a:schemeClr val="accent1">
-              <a:shade val="50000"/>
-            </a:schemeClr>
-          </a:lnRef>
-          <a:fillRef idx="1">
-            <a:schemeClr val="accent1"/>
-          </a:fillRef>
-          <a:effectRef idx="0">
-            <a:schemeClr val="accent1"/>
-          </a:effectRef>
-          <a:fontRef idx="minor">
-            <a:schemeClr val="lt1"/>
-          </a:fontRef>
-        </p:style>
+        <p:spPr/>
         <p:txBody>
-          <a:bodyPr rtlCol="0" anchor="ctr"/>
+          <a:bodyPr/>
           <a:lstStyle/>
           <a:p>
-            <a:pPr algn="ctr"/>
-            <a:endParaRPr kumimoji="1" lang="ko-KR" altLang="en-US" dirty="0"/>
+            <a:endParaRPr lang="ko-KR" altLang="en-US"/>
           </a:p>
         </p:txBody>
       </p:sp>
       <p:sp>
         <p:nvSpPr>
-          <p:cNvPr id="12" name="부제목 2"/>
-          <p:cNvSpPr txBox="1">
-            <a:spLocks/>
+          <p:cNvPr id="3" name="내용 개체 틀 2">
+            <a:extLst>
+              <a:ext uri="{FF2B5EF4-FFF2-40B4-BE49-F238E27FC236}">
+                <a16:creationId xmlns:a16="http://schemas.microsoft.com/office/drawing/2014/main" id="{7B537D8F-5982-4653-B96A-BB8B9CAB7064}"/>
+              </a:ext>
+            </a:extLst>
+          </p:cNvPr>
+          <p:cNvSpPr>
+            <a:spLocks noGrp="1"/>
           </p:cNvSpPr>
-          <p:nvPr/>
+          <p:nvPr>
+            <p:ph idx="1"/>
+          </p:nvPr>
         </p:nvSpPr>
-        <p:spPr>
-          <a:xfrm>
-            <a:off x="1" y="2608234"/>
-            <a:ext cx="12192000" cy="754314"/>
-          </a:xfrm>
-          <a:prstGeom prst="rect">
-            <a:avLst/>
-          </a:prstGeom>
-        </p:spPr>
+        <p:spPr/>
         <p:txBody>
-          <a:bodyPr vert="horz" lIns="91440" tIns="45720" rIns="91440" bIns="45720" rtlCol="0" anchor="ctr">
-            <a:noAutofit/>
-          </a:bodyPr>
-          <a:lstStyle>
-            <a:lvl1pPr marL="0" indent="0" algn="ctr" defTabSz="914423" rtl="0" eaLnBrk="1" latinLnBrk="1" hangingPunct="1">
-              <a:lnSpc>
-                <a:spcPct val="90000"/>
-              </a:lnSpc>
-              <a:spcBef>
-                <a:spcPts val="1001"/>
-              </a:spcBef>
-              <a:buFont typeface="Arial"/>
-              <a:buNone/>
-              <a:defRPr sz="2400" kern="1200">
-                <a:solidFill>
-                  <a:schemeClr val="tx1"/>
-                </a:solidFill>
-                <a:latin typeface="+mn-lt"/>
-                <a:ea typeface="+mn-ea"/>
-                <a:cs typeface="+mn-cs"/>
-              </a:defRPr>
-            </a:lvl1pPr>
-            <a:lvl2pPr marL="457211" indent="0" algn="ctr" defTabSz="914423" rtl="0" eaLnBrk="1" latinLnBrk="1" hangingPunct="1">
-              <a:lnSpc>
-                <a:spcPct val="90000"/>
-              </a:lnSpc>
-              <a:spcBef>
-                <a:spcPts val="500"/>
-              </a:spcBef>
-              <a:buFont typeface="Arial"/>
-              <a:buNone/>
-              <a:defRPr sz="2000" kern="1200">
-                <a:solidFill>
-                  <a:schemeClr val="tx1"/>
-                </a:solidFill>
-                <a:latin typeface="+mn-lt"/>
-                <a:ea typeface="+mn-ea"/>
-                <a:cs typeface="+mn-cs"/>
-              </a:defRPr>
-            </a:lvl2pPr>
-            <a:lvl3pPr marL="914423" indent="0" algn="ctr" defTabSz="914423" rtl="0" eaLnBrk="1" latinLnBrk="1" hangingPunct="1">
-              <a:lnSpc>
-                <a:spcPct val="90000"/>
-              </a:lnSpc>
-              <a:spcBef>
-                <a:spcPts val="500"/>
-              </a:spcBef>
-              <a:buFont typeface="Arial"/>
-              <a:buNone/>
-              <a:defRPr sz="1801" kern="1200">
-                <a:solidFill>
-                  <a:schemeClr val="tx1"/>
-                </a:solidFill>
-                <a:latin typeface="+mn-lt"/>
-                <a:ea typeface="+mn-ea"/>
-                <a:cs typeface="+mn-cs"/>
-              </a:defRPr>
-            </a:lvl3pPr>
-            <a:lvl4pPr marL="1371634" indent="0" algn="ctr" defTabSz="914423" rtl="0" eaLnBrk="1" latinLnBrk="1" hangingPunct="1">
-              <a:lnSpc>
-                <a:spcPct val="90000"/>
-              </a:lnSpc>
-              <a:spcBef>
-                <a:spcPts val="500"/>
-              </a:spcBef>
-              <a:buFont typeface="Arial"/>
-              <a:buNone/>
-              <a:defRPr sz="1600" kern="1200">
-                <a:solidFill>
-                  <a:schemeClr val="tx1"/>
-                </a:solidFill>
-                <a:latin typeface="+mn-lt"/>
-                <a:ea typeface="+mn-ea"/>
-                <a:cs typeface="+mn-cs"/>
-              </a:defRPr>
-            </a:lvl4pPr>
-            <a:lvl5pPr marL="1828846" indent="0" algn="ctr" defTabSz="914423" rtl="0" eaLnBrk="1" latinLnBrk="1" hangingPunct="1">
-              <a:lnSpc>
-                <a:spcPct val="90000"/>
-              </a:lnSpc>
-              <a:spcBef>
-                <a:spcPts val="500"/>
-              </a:spcBef>
-              <a:buFont typeface="Arial"/>
-              <a:buNone/>
-              <a:defRPr sz="1600" kern="1200">
-                <a:solidFill>
-                  <a:schemeClr val="tx1"/>
-                </a:solidFill>
-                <a:latin typeface="+mn-lt"/>
-                <a:ea typeface="+mn-ea"/>
-                <a:cs typeface="+mn-cs"/>
-              </a:defRPr>
-            </a:lvl5pPr>
-            <a:lvl6pPr marL="2286057" indent="0" algn="ctr" defTabSz="914423" rtl="0" eaLnBrk="1" latinLnBrk="1" hangingPunct="1">
-              <a:lnSpc>
-                <a:spcPct val="90000"/>
-              </a:lnSpc>
-              <a:spcBef>
-                <a:spcPts val="500"/>
-              </a:spcBef>
-              <a:buFont typeface="Arial"/>
-              <a:buNone/>
-              <a:defRPr sz="1600" kern="1200">
-                <a:solidFill>
-                  <a:schemeClr val="tx1"/>
-                </a:solidFill>
-                <a:latin typeface="+mn-lt"/>
-                <a:ea typeface="+mn-ea"/>
-                <a:cs typeface="+mn-cs"/>
-              </a:defRPr>
-            </a:lvl6pPr>
-            <a:lvl7pPr marL="2743269" indent="0" algn="ctr" defTabSz="914423" rtl="0" eaLnBrk="1" latinLnBrk="1" hangingPunct="1">
-              <a:lnSpc>
-                <a:spcPct val="90000"/>
-              </a:lnSpc>
-              <a:spcBef>
-                <a:spcPts val="500"/>
-              </a:spcBef>
-              <a:buFont typeface="Arial"/>
-              <a:buNone/>
-              <a:defRPr sz="1600" kern="1200">
-                <a:solidFill>
-                  <a:schemeClr val="tx1"/>
-                </a:solidFill>
-                <a:latin typeface="+mn-lt"/>
-                <a:ea typeface="+mn-ea"/>
-                <a:cs typeface="+mn-cs"/>
-              </a:defRPr>
-            </a:lvl7pPr>
-            <a:lvl8pPr marL="3200480" indent="0" algn="ctr" defTabSz="914423" rtl="0" eaLnBrk="1" latinLnBrk="1" hangingPunct="1">
-              <a:lnSpc>
-                <a:spcPct val="90000"/>
-              </a:lnSpc>
-              <a:spcBef>
-                <a:spcPts val="500"/>
-              </a:spcBef>
-              <a:buFont typeface="Arial"/>
-              <a:buNone/>
-              <a:defRPr sz="1600" kern="1200">
-                <a:solidFill>
-                  <a:schemeClr val="tx1"/>
-                </a:solidFill>
-                <a:latin typeface="+mn-lt"/>
-                <a:ea typeface="+mn-ea"/>
-                <a:cs typeface="+mn-cs"/>
-              </a:defRPr>
-            </a:lvl8pPr>
-            <a:lvl9pPr marL="3657691" indent="0" algn="ctr" defTabSz="914423" rtl="0" eaLnBrk="1" latinLnBrk="1" hangingPunct="1">
-              <a:lnSpc>
-                <a:spcPct val="90000"/>
-              </a:lnSpc>
-              <a:spcBef>
-                <a:spcPts val="500"/>
-              </a:spcBef>
-              <a:buFont typeface="Arial"/>
-              <a:buNone/>
-              <a:defRPr sz="1600" kern="1200">
-                <a:solidFill>
-                  <a:schemeClr val="tx1"/>
-                </a:solidFill>
-                <a:latin typeface="+mn-lt"/>
-                <a:ea typeface="+mn-ea"/>
-                <a:cs typeface="+mn-cs"/>
-              </a:defRPr>
-            </a:lvl9pPr>
-          </a:lstStyle>
-          <a:p>
-            <a:r>
-              <a:rPr lang="ko-KR" altLang="en-US" sz="4800" dirty="0">
-                <a:solidFill>
-                  <a:schemeClr val="bg1"/>
-                </a:solidFill>
-                <a:latin typeface="+mj-lt"/>
-                <a:ea typeface="맑은 고딕" charset="-127"/>
-                <a:cs typeface="맑은 고딕" charset="-127"/>
-              </a:rPr>
-              <a:t>제품 </a:t>
-            </a:r>
-            <a:r>
-              <a:rPr lang="en-US" altLang="ko-KR" sz="4800" dirty="0">
-                <a:solidFill>
-                  <a:schemeClr val="bg1"/>
-                </a:solidFill>
-                <a:latin typeface="+mj-lt"/>
-                <a:ea typeface="맑은 고딕" charset="-127"/>
-                <a:cs typeface="맑은 고딕" charset="-127"/>
-              </a:rPr>
-              <a:t>Review</a:t>
-            </a:r>
-            <a:endParaRPr lang="ko-KR" altLang="en-US" sz="4800" dirty="0">
-              <a:solidFill>
-                <a:schemeClr val="bg1"/>
-              </a:solidFill>
-              <a:latin typeface="+mj-lt"/>
-              <a:ea typeface="맑은 고딕" charset="-127"/>
-              <a:cs typeface="맑은 고딕" charset="-127"/>
-            </a:endParaRPr>
+          <a:bodyPr/>
+          <a:lstStyle/>
+          <a:p>
+            <a:r>
+              <a:rPr lang="ko-KR" altLang="en-US" dirty="0"/>
+              <a:t>기능 구현에 대한 디자인 구상</a:t>
+            </a:r>
+            <a:endParaRPr lang="en-US" altLang="ko-KR" dirty="0"/>
+          </a:p>
+          <a:p>
+            <a:endParaRPr lang="en-US" altLang="ko-KR" dirty="0"/>
+          </a:p>
+          <a:p>
+            <a:r>
+              <a:rPr lang="ko-KR" altLang="en-US" dirty="0"/>
+              <a:t>디자인에 따른 동작을 기술하고 연계 한다</a:t>
+            </a:r>
+            <a:r>
+              <a:rPr lang="en-US" altLang="ko-KR" dirty="0"/>
+              <a:t>.</a:t>
+            </a:r>
+            <a:endParaRPr lang="ko-KR" altLang="en-US" dirty="0"/>
           </a:p>
         </p:txBody>
       </p:sp>
     </p:spTree>
     <p:extLst>
       <p:ext uri="{BB962C8B-B14F-4D97-AF65-F5344CB8AC3E}">
-        <p14:creationId xmlns:p14="http://schemas.microsoft.com/office/powerpoint/2010/main" val="3953577241"/>
+        <p14:creationId xmlns:p14="http://schemas.microsoft.com/office/powerpoint/2010/main" val="1723942396"/>
       </p:ext>
     </p:extLst>
   </p:cSld>
@@ -8281,6 +8396,669 @@
       </p:grpSpPr>
       <p:sp>
         <p:nvSpPr>
+          <p:cNvPr id="10" name="직사각형 9"/>
+          <p:cNvSpPr/>
+          <p:nvPr/>
+        </p:nvSpPr>
+        <p:spPr>
+          <a:xfrm>
+            <a:off x="-1" y="2398426"/>
+            <a:ext cx="12192001" cy="1338109"/>
+          </a:xfrm>
+          <a:prstGeom prst="rect">
+            <a:avLst/>
+          </a:prstGeom>
+          <a:solidFill>
+            <a:schemeClr val="accent1">
+              <a:lumMod val="75000"/>
+            </a:schemeClr>
+          </a:solidFill>
+          <a:ln>
+            <a:noFill/>
+          </a:ln>
+        </p:spPr>
+        <p:style>
+          <a:lnRef idx="2">
+            <a:schemeClr val="accent1">
+              <a:shade val="50000"/>
+            </a:schemeClr>
+          </a:lnRef>
+          <a:fillRef idx="1">
+            <a:schemeClr val="accent1"/>
+          </a:fillRef>
+          <a:effectRef idx="0">
+            <a:schemeClr val="accent1"/>
+          </a:effectRef>
+          <a:fontRef idx="minor">
+            <a:schemeClr val="lt1"/>
+          </a:fontRef>
+        </p:style>
+        <p:txBody>
+          <a:bodyPr rtlCol="0" anchor="ctr"/>
+          <a:lstStyle/>
+          <a:p>
+            <a:pPr algn="ctr"/>
+            <a:endParaRPr kumimoji="1" lang="ko-KR" altLang="en-US" dirty="0"/>
+          </a:p>
+        </p:txBody>
+      </p:sp>
+      <p:sp>
+        <p:nvSpPr>
+          <p:cNvPr id="12" name="부제목 2"/>
+          <p:cNvSpPr txBox="1">
+            <a:spLocks/>
+          </p:cNvSpPr>
+          <p:nvPr/>
+        </p:nvSpPr>
+        <p:spPr>
+          <a:xfrm>
+            <a:off x="1" y="2608234"/>
+            <a:ext cx="12192000" cy="754314"/>
+          </a:xfrm>
+          <a:prstGeom prst="rect">
+            <a:avLst/>
+          </a:prstGeom>
+        </p:spPr>
+        <p:txBody>
+          <a:bodyPr vert="horz" lIns="91440" tIns="45720" rIns="91440" bIns="45720" rtlCol="0" anchor="ctr">
+            <a:noAutofit/>
+          </a:bodyPr>
+          <a:lstStyle>
+            <a:lvl1pPr marL="0" indent="0" algn="ctr" defTabSz="914423" rtl="0" eaLnBrk="1" latinLnBrk="1" hangingPunct="1">
+              <a:lnSpc>
+                <a:spcPct val="90000"/>
+              </a:lnSpc>
+              <a:spcBef>
+                <a:spcPts val="1001"/>
+              </a:spcBef>
+              <a:buFont typeface="Arial"/>
+              <a:buNone/>
+              <a:defRPr sz="2400" kern="1200">
+                <a:solidFill>
+                  <a:schemeClr val="tx1"/>
+                </a:solidFill>
+                <a:latin typeface="+mn-lt"/>
+                <a:ea typeface="+mn-ea"/>
+                <a:cs typeface="+mn-cs"/>
+              </a:defRPr>
+            </a:lvl1pPr>
+            <a:lvl2pPr marL="457211" indent="0" algn="ctr" defTabSz="914423" rtl="0" eaLnBrk="1" latinLnBrk="1" hangingPunct="1">
+              <a:lnSpc>
+                <a:spcPct val="90000"/>
+              </a:lnSpc>
+              <a:spcBef>
+                <a:spcPts val="500"/>
+              </a:spcBef>
+              <a:buFont typeface="Arial"/>
+              <a:buNone/>
+              <a:defRPr sz="2000" kern="1200">
+                <a:solidFill>
+                  <a:schemeClr val="tx1"/>
+                </a:solidFill>
+                <a:latin typeface="+mn-lt"/>
+                <a:ea typeface="+mn-ea"/>
+                <a:cs typeface="+mn-cs"/>
+              </a:defRPr>
+            </a:lvl2pPr>
+            <a:lvl3pPr marL="914423" indent="0" algn="ctr" defTabSz="914423" rtl="0" eaLnBrk="1" latinLnBrk="1" hangingPunct="1">
+              <a:lnSpc>
+                <a:spcPct val="90000"/>
+              </a:lnSpc>
+              <a:spcBef>
+                <a:spcPts val="500"/>
+              </a:spcBef>
+              <a:buFont typeface="Arial"/>
+              <a:buNone/>
+              <a:defRPr sz="1801" kern="1200">
+                <a:solidFill>
+                  <a:schemeClr val="tx1"/>
+                </a:solidFill>
+                <a:latin typeface="+mn-lt"/>
+                <a:ea typeface="+mn-ea"/>
+                <a:cs typeface="+mn-cs"/>
+              </a:defRPr>
+            </a:lvl3pPr>
+            <a:lvl4pPr marL="1371634" indent="0" algn="ctr" defTabSz="914423" rtl="0" eaLnBrk="1" latinLnBrk="1" hangingPunct="1">
+              <a:lnSpc>
+                <a:spcPct val="90000"/>
+              </a:lnSpc>
+              <a:spcBef>
+                <a:spcPts val="500"/>
+              </a:spcBef>
+              <a:buFont typeface="Arial"/>
+              <a:buNone/>
+              <a:defRPr sz="1600" kern="1200">
+                <a:solidFill>
+                  <a:schemeClr val="tx1"/>
+                </a:solidFill>
+                <a:latin typeface="+mn-lt"/>
+                <a:ea typeface="+mn-ea"/>
+                <a:cs typeface="+mn-cs"/>
+              </a:defRPr>
+            </a:lvl4pPr>
+            <a:lvl5pPr marL="1828846" indent="0" algn="ctr" defTabSz="914423" rtl="0" eaLnBrk="1" latinLnBrk="1" hangingPunct="1">
+              <a:lnSpc>
+                <a:spcPct val="90000"/>
+              </a:lnSpc>
+              <a:spcBef>
+                <a:spcPts val="500"/>
+              </a:spcBef>
+              <a:buFont typeface="Arial"/>
+              <a:buNone/>
+              <a:defRPr sz="1600" kern="1200">
+                <a:solidFill>
+                  <a:schemeClr val="tx1"/>
+                </a:solidFill>
+                <a:latin typeface="+mn-lt"/>
+                <a:ea typeface="+mn-ea"/>
+                <a:cs typeface="+mn-cs"/>
+              </a:defRPr>
+            </a:lvl5pPr>
+            <a:lvl6pPr marL="2286057" indent="0" algn="ctr" defTabSz="914423" rtl="0" eaLnBrk="1" latinLnBrk="1" hangingPunct="1">
+              <a:lnSpc>
+                <a:spcPct val="90000"/>
+              </a:lnSpc>
+              <a:spcBef>
+                <a:spcPts val="500"/>
+              </a:spcBef>
+              <a:buFont typeface="Arial"/>
+              <a:buNone/>
+              <a:defRPr sz="1600" kern="1200">
+                <a:solidFill>
+                  <a:schemeClr val="tx1"/>
+                </a:solidFill>
+                <a:latin typeface="+mn-lt"/>
+                <a:ea typeface="+mn-ea"/>
+                <a:cs typeface="+mn-cs"/>
+              </a:defRPr>
+            </a:lvl6pPr>
+            <a:lvl7pPr marL="2743269" indent="0" algn="ctr" defTabSz="914423" rtl="0" eaLnBrk="1" latinLnBrk="1" hangingPunct="1">
+              <a:lnSpc>
+                <a:spcPct val="90000"/>
+              </a:lnSpc>
+              <a:spcBef>
+                <a:spcPts val="500"/>
+              </a:spcBef>
+              <a:buFont typeface="Arial"/>
+              <a:buNone/>
+              <a:defRPr sz="1600" kern="1200">
+                <a:solidFill>
+                  <a:schemeClr val="tx1"/>
+                </a:solidFill>
+                <a:latin typeface="+mn-lt"/>
+                <a:ea typeface="+mn-ea"/>
+                <a:cs typeface="+mn-cs"/>
+              </a:defRPr>
+            </a:lvl7pPr>
+            <a:lvl8pPr marL="3200480" indent="0" algn="ctr" defTabSz="914423" rtl="0" eaLnBrk="1" latinLnBrk="1" hangingPunct="1">
+              <a:lnSpc>
+                <a:spcPct val="90000"/>
+              </a:lnSpc>
+              <a:spcBef>
+                <a:spcPts val="500"/>
+              </a:spcBef>
+              <a:buFont typeface="Arial"/>
+              <a:buNone/>
+              <a:defRPr sz="1600" kern="1200">
+                <a:solidFill>
+                  <a:schemeClr val="tx1"/>
+                </a:solidFill>
+                <a:latin typeface="+mn-lt"/>
+                <a:ea typeface="+mn-ea"/>
+                <a:cs typeface="+mn-cs"/>
+              </a:defRPr>
+            </a:lvl8pPr>
+            <a:lvl9pPr marL="3657691" indent="0" algn="ctr" defTabSz="914423" rtl="0" eaLnBrk="1" latinLnBrk="1" hangingPunct="1">
+              <a:lnSpc>
+                <a:spcPct val="90000"/>
+              </a:lnSpc>
+              <a:spcBef>
+                <a:spcPts val="500"/>
+              </a:spcBef>
+              <a:buFont typeface="Arial"/>
+              <a:buNone/>
+              <a:defRPr sz="1600" kern="1200">
+                <a:solidFill>
+                  <a:schemeClr val="tx1"/>
+                </a:solidFill>
+                <a:latin typeface="+mn-lt"/>
+                <a:ea typeface="+mn-ea"/>
+                <a:cs typeface="+mn-cs"/>
+              </a:defRPr>
+            </a:lvl9pPr>
+          </a:lstStyle>
+          <a:p>
+            <a:r>
+              <a:rPr lang="ko-KR" altLang="en-US" sz="4800" dirty="0">
+                <a:solidFill>
+                  <a:schemeClr val="bg1"/>
+                </a:solidFill>
+                <a:latin typeface="+mj-lt"/>
+                <a:ea typeface="맑은 고딕" charset="-127"/>
+                <a:cs typeface="맑은 고딕" charset="-127"/>
+              </a:rPr>
+              <a:t>구현</a:t>
+            </a:r>
+          </a:p>
+        </p:txBody>
+      </p:sp>
+    </p:spTree>
+    <p:extLst>
+      <p:ext uri="{BB962C8B-B14F-4D97-AF65-F5344CB8AC3E}">
+        <p14:creationId xmlns:p14="http://schemas.microsoft.com/office/powerpoint/2010/main" val="1697315730"/>
+      </p:ext>
+    </p:extLst>
+  </p:cSld>
+  <p:clrMapOvr>
+    <a:masterClrMapping/>
+  </p:clrMapOvr>
+</p:sld>
+</file>
+
+<file path=ppt/slides/slide21.xml><?xml version="1.0" encoding="utf-8"?>
+<p:sld xmlns:a="http://schemas.openxmlformats.org/drawingml/2006/main" xmlns:r="http://schemas.openxmlformats.org/officeDocument/2006/relationships" xmlns:p="http://schemas.openxmlformats.org/presentationml/2006/main">
+  <p:cSld>
+    <p:spTree>
+      <p:nvGrpSpPr>
+        <p:cNvPr id="1" name=""/>
+        <p:cNvGrpSpPr/>
+        <p:nvPr/>
+      </p:nvGrpSpPr>
+      <p:grpSpPr>
+        <a:xfrm>
+          <a:off x="0" y="0"/>
+          <a:ext cx="0" cy="0"/>
+          <a:chOff x="0" y="0"/>
+          <a:chExt cx="0" cy="0"/>
+        </a:xfrm>
+      </p:grpSpPr>
+      <p:sp>
+        <p:nvSpPr>
+          <p:cNvPr id="2" name="제목 1">
+            <a:extLst>
+              <a:ext uri="{FF2B5EF4-FFF2-40B4-BE49-F238E27FC236}">
+                <a16:creationId xmlns:a16="http://schemas.microsoft.com/office/drawing/2014/main" id="{2135F92A-65F5-4C7A-8C04-BF5F199039F2}"/>
+              </a:ext>
+            </a:extLst>
+          </p:cNvPr>
+          <p:cNvSpPr>
+            <a:spLocks noGrp="1"/>
+          </p:cNvSpPr>
+          <p:nvPr>
+            <p:ph type="title"/>
+          </p:nvPr>
+        </p:nvSpPr>
+        <p:spPr/>
+        <p:txBody>
+          <a:bodyPr/>
+          <a:lstStyle/>
+          <a:p>
+            <a:endParaRPr lang="ko-KR" altLang="en-US"/>
+          </a:p>
+        </p:txBody>
+      </p:sp>
+      <p:sp>
+        <p:nvSpPr>
+          <p:cNvPr id="3" name="내용 개체 틀 2">
+            <a:extLst>
+              <a:ext uri="{FF2B5EF4-FFF2-40B4-BE49-F238E27FC236}">
+                <a16:creationId xmlns:a16="http://schemas.microsoft.com/office/drawing/2014/main" id="{FB21A4AE-E1C2-4042-9B9E-43F419C42235}"/>
+              </a:ext>
+            </a:extLst>
+          </p:cNvPr>
+          <p:cNvSpPr>
+            <a:spLocks noGrp="1"/>
+          </p:cNvSpPr>
+          <p:nvPr>
+            <p:ph idx="1"/>
+          </p:nvPr>
+        </p:nvSpPr>
+        <p:spPr/>
+        <p:txBody>
+          <a:bodyPr/>
+          <a:lstStyle/>
+          <a:p>
+            <a:r>
+              <a:rPr lang="ko-KR" altLang="en-US" dirty="0"/>
+              <a:t>코드를 작성하고 버그를 수정한다</a:t>
+            </a:r>
+            <a:r>
+              <a:rPr lang="en-US" altLang="ko-KR" dirty="0"/>
+              <a:t>.</a:t>
+            </a:r>
+            <a:endParaRPr lang="ko-KR" altLang="en-US" dirty="0"/>
+          </a:p>
+        </p:txBody>
+      </p:sp>
+    </p:spTree>
+    <p:extLst>
+      <p:ext uri="{BB962C8B-B14F-4D97-AF65-F5344CB8AC3E}">
+        <p14:creationId xmlns:p14="http://schemas.microsoft.com/office/powerpoint/2010/main" val="1303733429"/>
+      </p:ext>
+    </p:extLst>
+  </p:cSld>
+  <p:clrMapOvr>
+    <a:masterClrMapping/>
+  </p:clrMapOvr>
+</p:sld>
+</file>
+
+<file path=ppt/slides/slide22.xml><?xml version="1.0" encoding="utf-8"?>
+<p:sld xmlns:a="http://schemas.openxmlformats.org/drawingml/2006/main" xmlns:r="http://schemas.openxmlformats.org/officeDocument/2006/relationships" xmlns:p="http://schemas.openxmlformats.org/presentationml/2006/main">
+  <p:cSld>
+    <p:spTree>
+      <p:nvGrpSpPr>
+        <p:cNvPr id="1" name=""/>
+        <p:cNvGrpSpPr/>
+        <p:nvPr/>
+      </p:nvGrpSpPr>
+      <p:grpSpPr>
+        <a:xfrm>
+          <a:off x="0" y="0"/>
+          <a:ext cx="0" cy="0"/>
+          <a:chOff x="0" y="0"/>
+          <a:chExt cx="0" cy="0"/>
+        </a:xfrm>
+      </p:grpSpPr>
+      <p:sp>
+        <p:nvSpPr>
+          <p:cNvPr id="10" name="직사각형 9"/>
+          <p:cNvSpPr/>
+          <p:nvPr/>
+        </p:nvSpPr>
+        <p:spPr>
+          <a:xfrm>
+            <a:off x="-1" y="2398426"/>
+            <a:ext cx="12192001" cy="1338109"/>
+          </a:xfrm>
+          <a:prstGeom prst="rect">
+            <a:avLst/>
+          </a:prstGeom>
+          <a:solidFill>
+            <a:schemeClr val="accent1">
+              <a:lumMod val="75000"/>
+            </a:schemeClr>
+          </a:solidFill>
+          <a:ln>
+            <a:noFill/>
+          </a:ln>
+        </p:spPr>
+        <p:style>
+          <a:lnRef idx="2">
+            <a:schemeClr val="accent1">
+              <a:shade val="50000"/>
+            </a:schemeClr>
+          </a:lnRef>
+          <a:fillRef idx="1">
+            <a:schemeClr val="accent1"/>
+          </a:fillRef>
+          <a:effectRef idx="0">
+            <a:schemeClr val="accent1"/>
+          </a:effectRef>
+          <a:fontRef idx="minor">
+            <a:schemeClr val="lt1"/>
+          </a:fontRef>
+        </p:style>
+        <p:txBody>
+          <a:bodyPr rtlCol="0" anchor="ctr"/>
+          <a:lstStyle/>
+          <a:p>
+            <a:pPr algn="ctr"/>
+            <a:endParaRPr kumimoji="1" lang="ko-KR" altLang="en-US" dirty="0"/>
+          </a:p>
+        </p:txBody>
+      </p:sp>
+      <p:sp>
+        <p:nvSpPr>
+          <p:cNvPr id="12" name="부제목 2"/>
+          <p:cNvSpPr txBox="1">
+            <a:spLocks/>
+          </p:cNvSpPr>
+          <p:nvPr/>
+        </p:nvSpPr>
+        <p:spPr>
+          <a:xfrm>
+            <a:off x="1" y="2608234"/>
+            <a:ext cx="12192000" cy="754314"/>
+          </a:xfrm>
+          <a:prstGeom prst="rect">
+            <a:avLst/>
+          </a:prstGeom>
+        </p:spPr>
+        <p:txBody>
+          <a:bodyPr vert="horz" lIns="91440" tIns="45720" rIns="91440" bIns="45720" rtlCol="0" anchor="ctr">
+            <a:noAutofit/>
+          </a:bodyPr>
+          <a:lstStyle>
+            <a:lvl1pPr marL="0" indent="0" algn="ctr" defTabSz="914423" rtl="0" eaLnBrk="1" latinLnBrk="1" hangingPunct="1">
+              <a:lnSpc>
+                <a:spcPct val="90000"/>
+              </a:lnSpc>
+              <a:spcBef>
+                <a:spcPts val="1001"/>
+              </a:spcBef>
+              <a:buFont typeface="Arial"/>
+              <a:buNone/>
+              <a:defRPr sz="2400" kern="1200">
+                <a:solidFill>
+                  <a:schemeClr val="tx1"/>
+                </a:solidFill>
+                <a:latin typeface="+mn-lt"/>
+                <a:ea typeface="+mn-ea"/>
+                <a:cs typeface="+mn-cs"/>
+              </a:defRPr>
+            </a:lvl1pPr>
+            <a:lvl2pPr marL="457211" indent="0" algn="ctr" defTabSz="914423" rtl="0" eaLnBrk="1" latinLnBrk="1" hangingPunct="1">
+              <a:lnSpc>
+                <a:spcPct val="90000"/>
+              </a:lnSpc>
+              <a:spcBef>
+                <a:spcPts val="500"/>
+              </a:spcBef>
+              <a:buFont typeface="Arial"/>
+              <a:buNone/>
+              <a:defRPr sz="2000" kern="1200">
+                <a:solidFill>
+                  <a:schemeClr val="tx1"/>
+                </a:solidFill>
+                <a:latin typeface="+mn-lt"/>
+                <a:ea typeface="+mn-ea"/>
+                <a:cs typeface="+mn-cs"/>
+              </a:defRPr>
+            </a:lvl2pPr>
+            <a:lvl3pPr marL="914423" indent="0" algn="ctr" defTabSz="914423" rtl="0" eaLnBrk="1" latinLnBrk="1" hangingPunct="1">
+              <a:lnSpc>
+                <a:spcPct val="90000"/>
+              </a:lnSpc>
+              <a:spcBef>
+                <a:spcPts val="500"/>
+              </a:spcBef>
+              <a:buFont typeface="Arial"/>
+              <a:buNone/>
+              <a:defRPr sz="1801" kern="1200">
+                <a:solidFill>
+                  <a:schemeClr val="tx1"/>
+                </a:solidFill>
+                <a:latin typeface="+mn-lt"/>
+                <a:ea typeface="+mn-ea"/>
+                <a:cs typeface="+mn-cs"/>
+              </a:defRPr>
+            </a:lvl3pPr>
+            <a:lvl4pPr marL="1371634" indent="0" algn="ctr" defTabSz="914423" rtl="0" eaLnBrk="1" latinLnBrk="1" hangingPunct="1">
+              <a:lnSpc>
+                <a:spcPct val="90000"/>
+              </a:lnSpc>
+              <a:spcBef>
+                <a:spcPts val="500"/>
+              </a:spcBef>
+              <a:buFont typeface="Arial"/>
+              <a:buNone/>
+              <a:defRPr sz="1600" kern="1200">
+                <a:solidFill>
+                  <a:schemeClr val="tx1"/>
+                </a:solidFill>
+                <a:latin typeface="+mn-lt"/>
+                <a:ea typeface="+mn-ea"/>
+                <a:cs typeface="+mn-cs"/>
+              </a:defRPr>
+            </a:lvl4pPr>
+            <a:lvl5pPr marL="1828846" indent="0" algn="ctr" defTabSz="914423" rtl="0" eaLnBrk="1" latinLnBrk="1" hangingPunct="1">
+              <a:lnSpc>
+                <a:spcPct val="90000"/>
+              </a:lnSpc>
+              <a:spcBef>
+                <a:spcPts val="500"/>
+              </a:spcBef>
+              <a:buFont typeface="Arial"/>
+              <a:buNone/>
+              <a:defRPr sz="1600" kern="1200">
+                <a:solidFill>
+                  <a:schemeClr val="tx1"/>
+                </a:solidFill>
+                <a:latin typeface="+mn-lt"/>
+                <a:ea typeface="+mn-ea"/>
+                <a:cs typeface="+mn-cs"/>
+              </a:defRPr>
+            </a:lvl5pPr>
+            <a:lvl6pPr marL="2286057" indent="0" algn="ctr" defTabSz="914423" rtl="0" eaLnBrk="1" latinLnBrk="1" hangingPunct="1">
+              <a:lnSpc>
+                <a:spcPct val="90000"/>
+              </a:lnSpc>
+              <a:spcBef>
+                <a:spcPts val="500"/>
+              </a:spcBef>
+              <a:buFont typeface="Arial"/>
+              <a:buNone/>
+              <a:defRPr sz="1600" kern="1200">
+                <a:solidFill>
+                  <a:schemeClr val="tx1"/>
+                </a:solidFill>
+                <a:latin typeface="+mn-lt"/>
+                <a:ea typeface="+mn-ea"/>
+                <a:cs typeface="+mn-cs"/>
+              </a:defRPr>
+            </a:lvl6pPr>
+            <a:lvl7pPr marL="2743269" indent="0" algn="ctr" defTabSz="914423" rtl="0" eaLnBrk="1" latinLnBrk="1" hangingPunct="1">
+              <a:lnSpc>
+                <a:spcPct val="90000"/>
+              </a:lnSpc>
+              <a:spcBef>
+                <a:spcPts val="500"/>
+              </a:spcBef>
+              <a:buFont typeface="Arial"/>
+              <a:buNone/>
+              <a:defRPr sz="1600" kern="1200">
+                <a:solidFill>
+                  <a:schemeClr val="tx1"/>
+                </a:solidFill>
+                <a:latin typeface="+mn-lt"/>
+                <a:ea typeface="+mn-ea"/>
+                <a:cs typeface="+mn-cs"/>
+              </a:defRPr>
+            </a:lvl7pPr>
+            <a:lvl8pPr marL="3200480" indent="0" algn="ctr" defTabSz="914423" rtl="0" eaLnBrk="1" latinLnBrk="1" hangingPunct="1">
+              <a:lnSpc>
+                <a:spcPct val="90000"/>
+              </a:lnSpc>
+              <a:spcBef>
+                <a:spcPts val="500"/>
+              </a:spcBef>
+              <a:buFont typeface="Arial"/>
+              <a:buNone/>
+              <a:defRPr sz="1600" kern="1200">
+                <a:solidFill>
+                  <a:schemeClr val="tx1"/>
+                </a:solidFill>
+                <a:latin typeface="+mn-lt"/>
+                <a:ea typeface="+mn-ea"/>
+                <a:cs typeface="+mn-cs"/>
+              </a:defRPr>
+            </a:lvl8pPr>
+            <a:lvl9pPr marL="3657691" indent="0" algn="ctr" defTabSz="914423" rtl="0" eaLnBrk="1" latinLnBrk="1" hangingPunct="1">
+              <a:lnSpc>
+                <a:spcPct val="90000"/>
+              </a:lnSpc>
+              <a:spcBef>
+                <a:spcPts val="500"/>
+              </a:spcBef>
+              <a:buFont typeface="Arial"/>
+              <a:buNone/>
+              <a:defRPr sz="1600" kern="1200">
+                <a:solidFill>
+                  <a:schemeClr val="tx1"/>
+                </a:solidFill>
+                <a:latin typeface="+mn-lt"/>
+                <a:ea typeface="+mn-ea"/>
+                <a:cs typeface="+mn-cs"/>
+              </a:defRPr>
+            </a:lvl9pPr>
+          </a:lstStyle>
+          <a:p>
+            <a:r>
+              <a:rPr lang="ko-KR" altLang="en-US" sz="4800" dirty="0">
+                <a:solidFill>
+                  <a:schemeClr val="bg1"/>
+                </a:solidFill>
+                <a:latin typeface="+mj-lt"/>
+                <a:ea typeface="맑은 고딕" charset="-127"/>
+                <a:cs typeface="맑은 고딕" charset="-127"/>
+              </a:rPr>
+              <a:t>제품 </a:t>
+            </a:r>
+            <a:r>
+              <a:rPr lang="en-US" altLang="ko-KR" sz="4800" dirty="0">
+                <a:solidFill>
+                  <a:schemeClr val="bg1"/>
+                </a:solidFill>
+                <a:latin typeface="+mj-lt"/>
+                <a:ea typeface="맑은 고딕" charset="-127"/>
+                <a:cs typeface="맑은 고딕" charset="-127"/>
+              </a:rPr>
+              <a:t>Review</a:t>
+            </a:r>
+            <a:endParaRPr lang="ko-KR" altLang="en-US" sz="4800" dirty="0">
+              <a:solidFill>
+                <a:schemeClr val="bg1"/>
+              </a:solidFill>
+              <a:latin typeface="+mj-lt"/>
+              <a:ea typeface="맑은 고딕" charset="-127"/>
+              <a:cs typeface="맑은 고딕" charset="-127"/>
+            </a:endParaRPr>
+          </a:p>
+        </p:txBody>
+      </p:sp>
+    </p:spTree>
+    <p:extLst>
+      <p:ext uri="{BB962C8B-B14F-4D97-AF65-F5344CB8AC3E}">
+        <p14:creationId xmlns:p14="http://schemas.microsoft.com/office/powerpoint/2010/main" val="3953577241"/>
+      </p:ext>
+    </p:extLst>
+  </p:cSld>
+  <p:clrMapOvr>
+    <a:masterClrMapping/>
+  </p:clrMapOvr>
+</p:sld>
+</file>
+
+<file path=ppt/slides/slide23.xml><?xml version="1.0" encoding="utf-8"?>
+<p:sld xmlns:a="http://schemas.openxmlformats.org/drawingml/2006/main" xmlns:r="http://schemas.openxmlformats.org/officeDocument/2006/relationships" xmlns:p="http://schemas.openxmlformats.org/presentationml/2006/main">
+  <p:cSld>
+    <p:spTree>
+      <p:nvGrpSpPr>
+        <p:cNvPr id="1" name=""/>
+        <p:cNvGrpSpPr/>
+        <p:nvPr/>
+      </p:nvGrpSpPr>
+      <p:grpSpPr>
+        <a:xfrm>
+          <a:off x="0" y="0"/>
+          <a:ext cx="0" cy="0"/>
+          <a:chOff x="0" y="0"/>
+          <a:chExt cx="0" cy="0"/>
+        </a:xfrm>
+      </p:grpSpPr>
+      <p:sp>
+        <p:nvSpPr>
           <p:cNvPr id="2" name="제목 1">
             <a:extLst>
               <a:ext uri="{FF2B5EF4-FFF2-40B4-BE49-F238E27FC236}">
@@ -8624,596 +9402,6 @@
 </file>
 
 <file path=ppt/slides/slide4.xml><?xml version="1.0" encoding="utf-8"?>
-<p:sld xmlns:r="http://schemas.openxmlformats.org/officeDocument/2006/relationships" xmlns:c="http://schemas.openxmlformats.org/drawingml/2006/chart" xmlns:a="http://schemas.openxmlformats.org/drawingml/2006/main" xmlns:dgm="http://schemas.openxmlformats.org/drawingml/2006/diagram" xmlns:dsp="http://schemas.microsoft.com/office/drawing/2008/diagram" xmlns:p="http://schemas.openxmlformats.org/presentationml/2006/main">
-  <p:cSld>
-    <p:spTree>
-      <p:nvGrpSpPr>
-        <p:cNvPr id="1" name=""/>
-        <p:cNvGrpSpPr/>
-        <p:nvPr/>
-      </p:nvGrpSpPr>
-      <p:grpSpPr>
-        <a:xfrm>
-          <a:off x="0" y="0"/>
-          <a:ext cx="0" cy="0"/>
-          <a:chOff x="0" y="0"/>
-          <a:chExt cx="0" cy="0"/>
-        </a:xfrm>
-      </p:grpSpPr>
-      <p:sp>
-        <p:nvSpPr>
-          <p:cNvPr id="2" name="제목 1"/>
-          <p:cNvSpPr>
-            <a:spLocks noGrp="1"/>
-          </p:cNvSpPr>
-          <p:nvPr>
-            <p:ph type="title" idx="0"/>
-          </p:nvPr>
-        </p:nvSpPr>
-        <p:spPr>
-          <a:xfrm>
-            <a:off x="838200" y="400403"/>
-            <a:ext cx="10515600" cy="1325563"/>
-          </a:xfrm>
-        </p:spPr>
-        <p:txBody>
-          <a:bodyPr/>
-          <a:lstStyle/>
-          <a:p>
-            <a:pPr lvl="0">
-              <a:defRPr/>
-            </a:pPr>
-            <a:r>
-              <a:rPr lang="ko-KR" altLang="en-US"/>
-              <a:t>아이디어 노트</a:t>
-            </a:r>
-            <a:endParaRPr lang="ko-KR" altLang="en-US"/>
-          </a:p>
-        </p:txBody>
-      </p:sp>
-      <p:sp>
-        <p:nvSpPr>
-          <p:cNvPr id="5" name="내용 개체 틀 4"/>
-          <p:cNvSpPr>
-            <a:spLocks noGrp="1"/>
-          </p:cNvSpPr>
-          <p:nvPr>
-            <p:ph idx="1"/>
-          </p:nvPr>
-        </p:nvSpPr>
-        <p:spPr/>
-        <p:txBody>
-          <a:bodyPr/>
-          <a:lstStyle/>
-          <a:p>
-            <a:pPr lvl="0">
-              <a:defRPr/>
-            </a:pPr>
-            <a:r>
-              <a:rPr lang="ko-KR" altLang="en-US"/>
-              <a:t>개발하고자 하는 아이디어에 대해 기술한다</a:t>
-            </a:r>
-            <a:r>
-              <a:rPr lang="en-US" altLang="ko-KR"/>
-              <a:t>.</a:t>
-            </a:r>
-            <a:endParaRPr lang="ko-KR" altLang="en-US"/>
-          </a:p>
-        </p:txBody>
-      </p:sp>
-    </p:spTree>
-  </p:cSld>
-  <p:clrMapOvr>
-    <a:masterClrMapping/>
-  </p:clrMapOvr>
-  <mc:AlternateContent xmlns:mc="http://schemas.openxmlformats.org/markup-compatibility/2006">
-    <mc:Choice xmlns:p14="http://schemas.microsoft.com/office/powerpoint/2010/main" Requires="p14">
-      <p:transition xmlns:mc="http://schemas.openxmlformats.org/markup-compatibility/2006" xmlns:p14="http://schemas.microsoft.com/office/powerpoint/2010/main" mc:Ignorable="p14" p14:dur="500"/>
-    </mc:Choice>
-    <mc:Fallback>
-      <p:transition/>
-    </mc:Fallback>
-  </mc:AlternateContent>
-</p:sld>
-</file>
-
-<file path=ppt/slides/slide5.xml><?xml version="1.0" encoding="utf-8"?>
-<p:sld xmlns:r="http://schemas.openxmlformats.org/officeDocument/2006/relationships" xmlns:c="http://schemas.openxmlformats.org/drawingml/2006/chart" xmlns:a="http://schemas.openxmlformats.org/drawingml/2006/main" xmlns:dgm="http://schemas.openxmlformats.org/drawingml/2006/diagram" xmlns:dsp="http://schemas.microsoft.com/office/drawing/2008/diagram" xmlns:p="http://schemas.openxmlformats.org/presentationml/2006/main">
-  <p:cSld>
-    <p:spTree>
-      <p:nvGrpSpPr>
-        <p:cNvPr id="1" name=""/>
-        <p:cNvGrpSpPr/>
-        <p:nvPr/>
-      </p:nvGrpSpPr>
-      <p:grpSpPr>
-        <a:xfrm>
-          <a:off x="0" y="0"/>
-          <a:ext cx="0" cy="0"/>
-          <a:chOff x="0" y="0"/>
-          <a:chExt cx="0" cy="0"/>
-        </a:xfrm>
-      </p:grpSpPr>
-      <p:sp>
-        <p:nvSpPr>
-          <p:cNvPr id="4" name="직사각형 9"/>
-          <p:cNvSpPr/>
-          <p:nvPr/>
-        </p:nvSpPr>
-        <p:spPr>
-          <a:xfrm>
-            <a:off x="-1" y="0"/>
-            <a:ext cx="12192001" cy="1338109"/>
-          </a:xfrm>
-          <a:prstGeom prst="rect">
-            <a:avLst/>
-          </a:prstGeom>
-          <a:solidFill>
-            <a:schemeClr val="accent1">
-              <a:lumMod val="75000"/>
-            </a:schemeClr>
-          </a:solidFill>
-          <a:ln>
-            <a:noFill/>
-          </a:ln>
-        </p:spPr>
-        <p:style>
-          <a:lnRef idx="2">
-            <a:schemeClr val="accent1">
-              <a:shade val="50000"/>
-            </a:schemeClr>
-          </a:lnRef>
-          <a:fillRef idx="1">
-            <a:schemeClr val="accent1"/>
-          </a:fillRef>
-          <a:effectRef idx="0">
-            <a:schemeClr val="accent1"/>
-          </a:effectRef>
-          <a:fontRef idx="minor">
-            <a:schemeClr val="lt1"/>
-          </a:fontRef>
-        </p:style>
-        <p:txBody>
-          <a:bodyPr anchor="ctr"/>
-          <a:lstStyle/>
-          <a:p>
-            <a:pPr>
-              <a:defRPr/>
-            </a:pPr>
-            <a:r>
-              <a:rPr kumimoji="1" lang="en-US" altLang="ko-KR" sz="4800"/>
-              <a:t>1.</a:t>
-            </a:r>
-            <a:r>
-              <a:rPr kumimoji="1" lang="ko-KR" altLang="en-US" sz="4800"/>
-              <a:t> 아이디어 도출</a:t>
-            </a:r>
-            <a:endParaRPr kumimoji="1" lang="ko-KR" altLang="en-US" sz="4800"/>
-          </a:p>
-        </p:txBody>
-      </p:sp>
-      <p:sp>
-        <p:nvSpPr>
-          <p:cNvPr id="5" name="내용 개체 틀 4"/>
-          <p:cNvSpPr>
-            <a:spLocks noGrp="1"/>
-          </p:cNvSpPr>
-          <p:nvPr>
-            <p:ph idx="1"/>
-          </p:nvPr>
-        </p:nvSpPr>
-        <p:spPr>
-          <a:xfrm>
-            <a:off x="0" y="1331736"/>
-            <a:ext cx="12192000" cy="5526263"/>
-          </a:xfrm>
-        </p:spPr>
-        <p:txBody>
-          <a:bodyPr vert="horz" lIns="91440" tIns="45720" rIns="91440" bIns="45720">
-            <a:normAutofit/>
-          </a:bodyPr>
-          <a:lstStyle/>
-          <a:p>
-            <a:pPr lvl="0">
-              <a:defRPr/>
-            </a:pPr>
-            <a:r>
-              <a:rPr lang="ko-KR" altLang="en-US"/>
-              <a:t>파일 바이너리 데이터 분석 프로그램</a:t>
-            </a:r>
-            <a:endParaRPr lang="ko-KR" altLang="en-US"/>
-          </a:p>
-          <a:p>
-            <a:pPr marL="0" lvl="0" indent="0">
-              <a:buNone/>
-              <a:defRPr/>
-            </a:pPr>
-            <a:endParaRPr lang="ko-KR" altLang="en-US"/>
-          </a:p>
-          <a:p>
-            <a:pPr marL="0" lvl="0" indent="0">
-              <a:buNone/>
-              <a:defRPr/>
-            </a:pPr>
-            <a:r>
-              <a:rPr lang="ko-KR" altLang="en-US"/>
-              <a:t> </a:t>
-            </a:r>
-            <a:r>
-              <a:rPr lang="en-US" altLang="ko-KR"/>
-              <a:t>-</a:t>
-            </a:r>
-            <a:r>
-              <a:rPr lang="ko-KR" altLang="en-US"/>
-              <a:t> 파일 구조를 분석하여 파일의 확장자</a:t>
-            </a:r>
-            <a:r>
-              <a:rPr lang="en-US" altLang="ko-KR"/>
-              <a:t>,</a:t>
-            </a:r>
-            <a:r>
-              <a:rPr lang="ko-KR" altLang="en-US"/>
-              <a:t> 파티션 타입</a:t>
-            </a:r>
-            <a:r>
-              <a:rPr lang="en-US" altLang="ko-KR"/>
-              <a:t>,</a:t>
-            </a:r>
-            <a:r>
-              <a:rPr lang="ko-KR" altLang="en-US"/>
-              <a:t> 예약 영역</a:t>
-            </a:r>
-            <a:r>
-              <a:rPr lang="en-US" altLang="ko-KR"/>
-              <a:t>,</a:t>
-            </a:r>
-            <a:r>
-              <a:rPr lang="ko-KR" altLang="en-US"/>
-              <a:t> 전체 용량 등에 대한 정보를 출력</a:t>
-            </a:r>
-            <a:endParaRPr lang="ko-KR" altLang="en-US"/>
-          </a:p>
-          <a:p>
-            <a:pPr marL="0" lvl="0" indent="0">
-              <a:buNone/>
-              <a:defRPr/>
-            </a:pPr>
-            <a:endParaRPr lang="ko-KR" altLang="en-US"/>
-          </a:p>
-          <a:p>
-            <a:pPr marL="0" lvl="0" indent="0">
-              <a:buNone/>
-              <a:defRPr/>
-            </a:pPr>
-            <a:r>
-              <a:rPr lang="ko-KR" altLang="en-US"/>
-              <a:t> </a:t>
-            </a:r>
-            <a:r>
-              <a:rPr lang="en-US" altLang="ko-KR"/>
-              <a:t>-</a:t>
-            </a:r>
-            <a:r>
-              <a:rPr lang="ko-KR" altLang="en-US"/>
-              <a:t> 파일 시스템 구조</a:t>
-            </a:r>
-            <a:r>
-              <a:rPr lang="en-US" altLang="ko-KR"/>
-              <a:t>(FAT32, NTFS)</a:t>
-            </a:r>
-            <a:r>
-              <a:rPr lang="ko-KR" altLang="en-US"/>
-              <a:t>의 종류에 따라 파일의 구조 다름</a:t>
-            </a:r>
-            <a:endParaRPr lang="ko-KR" altLang="en-US"/>
-          </a:p>
-          <a:p>
-            <a:pPr marL="0" lvl="0" indent="0">
-              <a:buNone/>
-              <a:defRPr/>
-            </a:pPr>
-            <a:endParaRPr lang="ko-KR" altLang="en-US"/>
-          </a:p>
-          <a:p>
-            <a:pPr marL="0" lvl="0" indent="0">
-              <a:buNone/>
-              <a:defRPr/>
-            </a:pPr>
-            <a:r>
-              <a:rPr lang="ko-KR" altLang="en-US"/>
-              <a:t> </a:t>
-            </a:r>
-            <a:r>
-              <a:rPr lang="en-US" altLang="ko-KR"/>
-              <a:t>-</a:t>
-            </a:r>
-            <a:r>
-              <a:rPr lang="ko-KR" altLang="en-US"/>
-              <a:t> 파일 시스템 구조를 판단하여 필요 데이터 추출하고 출력</a:t>
-            </a:r>
-            <a:endParaRPr lang="ko-KR" altLang="en-US"/>
-          </a:p>
-        </p:txBody>
-      </p:sp>
-    </p:spTree>
-  </p:cSld>
-  <p:clrMapOvr>
-    <a:masterClrMapping/>
-  </p:clrMapOvr>
-  <mc:AlternateContent xmlns:mc="http://schemas.openxmlformats.org/markup-compatibility/2006">
-    <mc:Choice xmlns:p14="http://schemas.microsoft.com/office/powerpoint/2010/main" Requires="p14">
-      <p:transition xmlns:mc="http://schemas.openxmlformats.org/markup-compatibility/2006" xmlns:p14="http://schemas.microsoft.com/office/powerpoint/2010/main" mc:Ignorable="p14" p14:dur="500"/>
-    </mc:Choice>
-    <mc:Fallback>
-      <p:transition/>
-    </mc:Fallback>
-  </mc:AlternateContent>
-</p:sld>
-</file>
-
-<file path=ppt/slides/slide6.xml><?xml version="1.0" encoding="utf-8"?>
-<p:sld xmlns:r="http://schemas.openxmlformats.org/officeDocument/2006/relationships" xmlns:c="http://schemas.openxmlformats.org/drawingml/2006/chart" xmlns:a="http://schemas.openxmlformats.org/drawingml/2006/main" xmlns:dgm="http://schemas.openxmlformats.org/drawingml/2006/diagram" xmlns:dsp="http://schemas.microsoft.com/office/drawing/2008/diagram" xmlns:p="http://schemas.openxmlformats.org/presentationml/2006/main">
-  <p:cSld>
-    <p:spTree>
-      <p:nvGrpSpPr>
-        <p:cNvPr id="1" name=""/>
-        <p:cNvGrpSpPr/>
-        <p:nvPr/>
-      </p:nvGrpSpPr>
-      <p:grpSpPr>
-        <a:xfrm>
-          <a:off x="0" y="0"/>
-          <a:ext cx="0" cy="0"/>
-          <a:chOff x="0" y="0"/>
-          <a:chExt cx="0" cy="0"/>
-        </a:xfrm>
-      </p:grpSpPr>
-      <p:sp>
-        <p:nvSpPr>
-          <p:cNvPr id="4" name="직사각형 9"/>
-          <p:cNvSpPr/>
-          <p:nvPr/>
-        </p:nvSpPr>
-        <p:spPr>
-          <a:xfrm>
-            <a:off x="-1" y="0"/>
-            <a:ext cx="12192001" cy="1338109"/>
-          </a:xfrm>
-          <a:prstGeom prst="rect">
-            <a:avLst/>
-          </a:prstGeom>
-          <a:solidFill>
-            <a:schemeClr val="accent1">
-              <a:lumMod val="75000"/>
-            </a:schemeClr>
-          </a:solidFill>
-          <a:ln>
-            <a:noFill/>
-          </a:ln>
-        </p:spPr>
-        <p:style>
-          <a:lnRef idx="2">
-            <a:schemeClr val="accent1">
-              <a:shade val="50000"/>
-            </a:schemeClr>
-          </a:lnRef>
-          <a:fillRef idx="1">
-            <a:schemeClr val="accent1"/>
-          </a:fillRef>
-          <a:effectRef idx="0">
-            <a:schemeClr val="accent1"/>
-          </a:effectRef>
-          <a:fontRef idx="minor">
-            <a:schemeClr val="lt1"/>
-          </a:fontRef>
-        </p:style>
-        <p:txBody>
-          <a:bodyPr anchor="ctr"/>
-          <a:lstStyle/>
-          <a:p>
-            <a:pPr>
-              <a:defRPr/>
-            </a:pPr>
-            <a:r>
-              <a:rPr kumimoji="1" lang="en-US" altLang="ko-KR" sz="4800"/>
-              <a:t>1.</a:t>
-            </a:r>
-            <a:r>
-              <a:rPr kumimoji="1" lang="ko-KR" altLang="en-US" sz="4800"/>
-              <a:t> 아이디어 도출</a:t>
-            </a:r>
-            <a:endParaRPr kumimoji="1" lang="ko-KR" altLang="en-US" sz="4800"/>
-          </a:p>
-        </p:txBody>
-      </p:sp>
-      <p:sp>
-        <p:nvSpPr>
-          <p:cNvPr id="5" name="내용 개체 틀 4"/>
-          <p:cNvSpPr>
-            <a:spLocks noGrp="1"/>
-          </p:cNvSpPr>
-          <p:nvPr>
-            <p:ph idx="1"/>
-          </p:nvPr>
-        </p:nvSpPr>
-        <p:spPr>
-          <a:xfrm>
-            <a:off x="0" y="1561042"/>
-            <a:ext cx="12192000" cy="5296957"/>
-          </a:xfrm>
-        </p:spPr>
-        <p:txBody>
-          <a:bodyPr vert="horz" lIns="91440" tIns="45720" rIns="91440" bIns="45720">
-            <a:normAutofit lnSpcReduction="10000"/>
-          </a:bodyPr>
-          <a:lstStyle/>
-          <a:p>
-            <a:pPr lvl="0">
-              <a:defRPr/>
-            </a:pPr>
-            <a:r>
-              <a:rPr lang="ko-KR" altLang="en-US"/>
-              <a:t>파일의 헤더와 푸터를 이용한 카빙 툴</a:t>
-            </a:r>
-            <a:endParaRPr lang="ko-KR" altLang="en-US"/>
-          </a:p>
-          <a:p>
-            <a:pPr marL="0" lvl="0" indent="0">
-              <a:buNone/>
-              <a:defRPr/>
-            </a:pPr>
-            <a:endParaRPr lang="ko-KR" altLang="en-US"/>
-          </a:p>
-          <a:p>
-            <a:pPr marL="0" lvl="0" indent="0">
-              <a:buNone/>
-              <a:defRPr/>
-            </a:pPr>
-            <a:endParaRPr lang="ko-KR" altLang="en-US"/>
-          </a:p>
-          <a:p>
-            <a:pPr marL="0" lvl="0" indent="0">
-              <a:buNone/>
-              <a:defRPr/>
-            </a:pPr>
-            <a:r>
-              <a:rPr lang="ko-KR" altLang="en-US"/>
-              <a:t> </a:t>
-            </a:r>
-            <a:r>
-              <a:rPr lang="en-US" altLang="ko-KR"/>
-              <a:t>-</a:t>
-            </a:r>
-            <a:r>
-              <a:rPr lang="ko-KR" altLang="en-US"/>
-              <a:t> 각 파일을 구분하기 위한 시그니처</a:t>
-            </a:r>
-            <a:r>
-              <a:rPr lang="en-US" altLang="ko-KR"/>
-              <a:t>,</a:t>
-            </a:r>
-            <a:r>
-              <a:rPr lang="ko-KR" altLang="en-US"/>
-              <a:t> 구조체</a:t>
-            </a:r>
-            <a:r>
-              <a:rPr lang="en-US" altLang="ko-KR"/>
-              <a:t>,</a:t>
-            </a:r>
-            <a:r>
-              <a:rPr lang="ko-KR" altLang="en-US"/>
-              <a:t> 헤더 정보등을 확인하여 파일 복구 </a:t>
-            </a:r>
-            <a:endParaRPr lang="ko-KR" altLang="en-US"/>
-          </a:p>
-          <a:p>
-            <a:pPr marL="0" lvl="0" indent="0">
-              <a:buNone/>
-              <a:defRPr/>
-            </a:pPr>
-            <a:endParaRPr lang="ko-KR" altLang="en-US"/>
-          </a:p>
-          <a:p>
-            <a:pPr marL="0" lvl="0" indent="0">
-              <a:buNone/>
-              <a:defRPr/>
-            </a:pPr>
-            <a:r>
-              <a:rPr lang="ko-KR" altLang="en-US"/>
-              <a:t> </a:t>
-            </a:r>
-            <a:r>
-              <a:rPr lang="en-US" altLang="ko-KR"/>
-              <a:t>-</a:t>
-            </a:r>
-            <a:r>
-              <a:rPr lang="ko-KR" altLang="en-US"/>
-              <a:t> 파일의 헤더와 크기를 이용한 카빙 기법</a:t>
-            </a:r>
-            <a:endParaRPr lang="ko-KR" altLang="en-US"/>
-          </a:p>
-          <a:p>
-            <a:pPr marL="0" lvl="0" indent="0">
-              <a:buNone/>
-              <a:defRPr/>
-            </a:pPr>
-            <a:r>
-              <a:rPr lang="ko-KR" altLang="en-US"/>
-              <a:t> </a:t>
-            </a:r>
-            <a:r>
-              <a:rPr lang="en-US" altLang="ko-KR"/>
-              <a:t>-</a:t>
-            </a:r>
-            <a:r>
-              <a:rPr lang="ko-KR" altLang="en-US"/>
-              <a:t> </a:t>
-            </a:r>
-            <a:r>
-              <a:rPr lang="en-US" altLang="ko-KR">
-                <a:hlinkClick r:id="rId2"/>
-              </a:rPr>
-              <a:t>https://d0ngr0thy.tistory.com/44</a:t>
-            </a:r>
-            <a:endParaRPr lang="en-US" altLang="ko-KR"/>
-          </a:p>
-          <a:p>
-            <a:pPr marL="0" lvl="0" indent="0">
-              <a:buNone/>
-              <a:defRPr/>
-            </a:pPr>
-            <a:endParaRPr lang="ko-KR" altLang="en-US"/>
-          </a:p>
-          <a:p>
-            <a:pPr marL="0" lvl="0" indent="0">
-              <a:buNone/>
-              <a:defRPr/>
-            </a:pPr>
-            <a:r>
-              <a:rPr lang="ko-KR" altLang="en-US"/>
-              <a:t> </a:t>
-            </a:r>
-            <a:r>
-              <a:rPr lang="en-US" altLang="ko-KR"/>
-              <a:t>-</a:t>
-            </a:r>
-            <a:r>
-              <a:rPr lang="ko-KR" altLang="en-US"/>
-              <a:t> 단편화된 데이터 카빙 기법 </a:t>
-            </a:r>
-            <a:r>
-              <a:rPr lang="en-US" altLang="ko-KR"/>
-              <a:t>-&gt;</a:t>
-            </a:r>
-            <a:r>
-              <a:rPr lang="ko-KR" altLang="en-US"/>
-              <a:t> 아직 완벽한 방법 </a:t>
-            </a:r>
-            <a:r>
-              <a:rPr lang="en-US" altLang="ko-KR"/>
-              <a:t>X</a:t>
-            </a:r>
-            <a:endParaRPr lang="en-US" altLang="ko-KR"/>
-          </a:p>
-        </p:txBody>
-      </p:sp>
-    </p:spTree>
-  </p:cSld>
-  <p:clrMapOvr>
-    <a:masterClrMapping/>
-  </p:clrMapOvr>
-  <mc:AlternateContent xmlns:mc="http://schemas.openxmlformats.org/markup-compatibility/2006">
-    <mc:Choice xmlns:p14="http://schemas.microsoft.com/office/powerpoint/2010/main" Requires="p14">
-      <p:transition xmlns:mc="http://schemas.openxmlformats.org/markup-compatibility/2006" xmlns:p14="http://schemas.microsoft.com/office/powerpoint/2010/main" mc:Ignorable="p14" p14:dur="500"/>
-    </mc:Choice>
-    <mc:Fallback>
-      <p:transition/>
-    </mc:Fallback>
-  </mc:AlternateContent>
-</p:sld>
-</file>
-
-<file path=ppt/slides/slide7.xml><?xml version="1.0" encoding="utf-8"?>
 <p:sld xmlns:r="http://schemas.openxmlformats.org/officeDocument/2006/relationships" xmlns:c="http://schemas.openxmlformats.org/drawingml/2006/chart" xmlns:a="http://schemas.openxmlformats.org/drawingml/2006/main" xmlns:dgm="http://schemas.openxmlformats.org/drawingml/2006/diagram" xmlns:dsp="http://schemas.microsoft.com/office/drawing/2008/diagram" xmlns:p="http://schemas.openxmlformats.org/presentationml/2006/main">
   <p:cSld>
     <p:spTree>
@@ -9895,7 +10083,7 @@
 </p:sld>
 </file>
 
-<file path=ppt/slides/slide8.xml><?xml version="1.0" encoding="utf-8"?>
+<file path=ppt/slides/slide5.xml><?xml version="1.0" encoding="utf-8"?>
 <p:sld xmlns:r="http://schemas.openxmlformats.org/officeDocument/2006/relationships" xmlns:c="http://schemas.openxmlformats.org/drawingml/2006/chart" xmlns:a="http://schemas.openxmlformats.org/drawingml/2006/main" xmlns:dgm="http://schemas.openxmlformats.org/drawingml/2006/diagram" xmlns:dsp="http://schemas.microsoft.com/office/drawing/2008/diagram" xmlns:p="http://schemas.openxmlformats.org/presentationml/2006/main">
   <p:cSld>
     <p:spTree>
@@ -9914,13 +10102,143 @@
       </p:grpSpPr>
       <p:sp>
         <p:nvSpPr>
-          <p:cNvPr id="10" name="직사각형 9"/>
+          <p:cNvPr id="2" name="제목 1"/>
+          <p:cNvSpPr>
+            <a:spLocks noGrp="1"/>
+          </p:cNvSpPr>
+          <p:nvPr>
+            <p:ph type="title" idx="0"/>
+          </p:nvPr>
+        </p:nvSpPr>
+        <p:spPr>
+          <a:xfrm>
+            <a:off x="838200" y="400403"/>
+            <a:ext cx="10515600" cy="1325563"/>
+          </a:xfrm>
+        </p:spPr>
+        <p:txBody>
+          <a:bodyPr/>
+          <a:lstStyle/>
+          <a:p>
+            <a:pPr lvl="0">
+              <a:defRPr/>
+            </a:pPr>
+            <a:r>
+              <a:rPr lang="ko-KR" altLang="en-US"/>
+              <a:t>아이디어 노트</a:t>
+            </a:r>
+            <a:endParaRPr lang="ko-KR" altLang="en-US"/>
+          </a:p>
+        </p:txBody>
+      </p:sp>
+      <p:sp>
+        <p:nvSpPr>
+          <p:cNvPr id="5" name="내용 개체 틀 4"/>
+          <p:cNvSpPr>
+            <a:spLocks noGrp="1"/>
+          </p:cNvSpPr>
+          <p:nvPr>
+            <p:ph idx="1"/>
+          </p:nvPr>
+        </p:nvSpPr>
+        <p:spPr/>
+        <p:txBody>
+          <a:bodyPr/>
+          <a:lstStyle/>
+          <a:p>
+            <a:pPr marL="0" lvl="0" indent="0">
+              <a:buNone/>
+              <a:defRPr/>
+            </a:pPr>
+            <a:r>
+              <a:rPr lang="ko-KR" altLang="en-US"/>
+              <a:t>개발하고자 하는 아이디어에 대해 기술한다</a:t>
+            </a:r>
+            <a:r>
+              <a:rPr lang="en-US" altLang="ko-KR"/>
+              <a:t>.</a:t>
+            </a:r>
+            <a:endParaRPr lang="ko-KR" altLang="en-US"/>
+          </a:p>
+          <a:p>
+            <a:pPr marL="0" lvl="0" indent="0">
+              <a:buNone/>
+              <a:defRPr/>
+            </a:pPr>
+            <a:r>
+              <a:rPr lang="ko-KR" altLang="en-US"/>
+              <a:t>목적</a:t>
+            </a:r>
+            <a:r>
+              <a:rPr lang="en-US" altLang="ko-KR"/>
+              <a:t>,</a:t>
+            </a:r>
+            <a:r>
+              <a:rPr lang="ko-KR" altLang="en-US"/>
+              <a:t> 목표</a:t>
+            </a:r>
+            <a:r>
+              <a:rPr lang="en-US" altLang="ko-KR"/>
+              <a:t>,</a:t>
+            </a:r>
+            <a:r>
+              <a:rPr lang="ko-KR" altLang="en-US"/>
+              <a:t> 기능</a:t>
+            </a:r>
+            <a:r>
+              <a:rPr lang="en-US" altLang="ko-KR"/>
+              <a:t>,</a:t>
+            </a:r>
+            <a:r>
+              <a:rPr lang="ko-KR" altLang="en-US"/>
+              <a:t> 제공할 서비스</a:t>
+            </a:r>
+            <a:endParaRPr lang="ko-KR" altLang="en-US"/>
+          </a:p>
+        </p:txBody>
+      </p:sp>
+    </p:spTree>
+  </p:cSld>
+  <p:clrMapOvr>
+    <a:masterClrMapping/>
+  </p:clrMapOvr>
+  <mc:AlternateContent xmlns:mc="http://schemas.openxmlformats.org/markup-compatibility/2006">
+    <mc:Choice xmlns:p14="http://schemas.microsoft.com/office/powerpoint/2010/main" Requires="p14">
+      <p:transition xmlns:mc="http://schemas.openxmlformats.org/markup-compatibility/2006" xmlns:p14="http://schemas.microsoft.com/office/powerpoint/2010/main" mc:Ignorable="p14" p14:dur="500"/>
+    </mc:Choice>
+    <mc:Fallback>
+      <p:transition/>
+    </mc:Fallback>
+  </mc:AlternateContent>
+</p:sld>
+</file>
+
+<file path=ppt/slides/slide6.xml><?xml version="1.0" encoding="utf-8"?>
+<p:sld xmlns:r="http://schemas.openxmlformats.org/officeDocument/2006/relationships" xmlns:c="http://schemas.openxmlformats.org/drawingml/2006/chart" xmlns:a="http://schemas.openxmlformats.org/drawingml/2006/main" xmlns:dgm="http://schemas.openxmlformats.org/drawingml/2006/diagram" xmlns:dsp="http://schemas.microsoft.com/office/drawing/2008/diagram" xmlns:p="http://schemas.openxmlformats.org/presentationml/2006/main">
+  <p:cSld>
+    <p:spTree>
+      <p:nvGrpSpPr>
+        <p:cNvPr id="1" name=""/>
+        <p:cNvGrpSpPr/>
+        <p:nvPr/>
+      </p:nvGrpSpPr>
+      <p:grpSpPr>
+        <a:xfrm>
+          <a:off x="0" y="0"/>
+          <a:ext cx="0" cy="0"/>
+          <a:chOff x="0" y="0"/>
+          <a:chExt cx="0" cy="0"/>
+        </a:xfrm>
+      </p:grpSpPr>
+      <p:sp>
+        <p:nvSpPr>
+          <p:cNvPr id="4" name="직사각형 9"/>
           <p:cNvSpPr/>
           <p:nvPr/>
         </p:nvSpPr>
         <p:spPr>
           <a:xfrm>
-            <a:off x="-1" y="2398426"/>
+            <a:off x="-1" y="0"/>
             <a:ext cx="12192001" cy="1338109"/>
           </a:xfrm>
           <a:prstGeom prst="rect">
@@ -9955,219 +10273,269 @@
           <a:bodyPr anchor="ctr"/>
           <a:lstStyle/>
           <a:p>
-            <a:pPr algn="ctr">
+            <a:pPr>
               <a:defRPr/>
             </a:pPr>
-            <a:endParaRPr kumimoji="1" lang="ko-KR" altLang="en-US"/>
+            <a:r>
+              <a:rPr kumimoji="1" lang="en-US" altLang="ko-KR" sz="4800"/>
+              <a:t>1.</a:t>
+            </a:r>
+            <a:r>
+              <a:rPr kumimoji="1" lang="ko-KR" altLang="en-US" sz="4800"/>
+              <a:t> 아이디어 도출</a:t>
+            </a:r>
+            <a:endParaRPr kumimoji="1" lang="ko-KR" altLang="en-US" sz="4800"/>
           </a:p>
         </p:txBody>
       </p:sp>
       <p:sp>
         <p:nvSpPr>
-          <p:cNvPr id="12" name="부제목 2"/>
-          <p:cNvSpPr txBox="1"/>
-          <p:nvPr/>
+          <p:cNvPr id="5" name="내용 개체 틀 4"/>
+          <p:cNvSpPr>
+            <a:spLocks noGrp="1"/>
+          </p:cNvSpPr>
+          <p:nvPr>
+            <p:ph idx="1"/>
+          </p:nvPr>
         </p:nvSpPr>
         <p:spPr>
           <a:xfrm>
-            <a:off x="1" y="2608234"/>
-            <a:ext cx="12192000" cy="754314"/>
+            <a:off x="0" y="1331736"/>
+            <a:ext cx="12192000" cy="5526263"/>
           </a:xfrm>
-          <a:prstGeom prst="rect">
-            <a:avLst/>
-          </a:prstGeom>
         </p:spPr>
         <p:txBody>
-          <a:bodyPr vert="horz" lIns="91440" tIns="45720" rIns="91440" bIns="45720" anchor="ctr">
-            <a:noAutofit/>
+          <a:bodyPr vert="horz" lIns="91440" tIns="45720" rIns="91440" bIns="45720">
+            <a:normAutofit fontScale="85000" lnSpcReduction="20000"/>
           </a:bodyPr>
-          <a:lstStyle>
-            <a:lvl1pPr marL="0" indent="0" algn="ctr" defTabSz="914423" rtl="0" eaLnBrk="1" latinLnBrk="1" hangingPunct="1">
-              <a:lnSpc>
-                <a:spcPct val="90000"/>
-              </a:lnSpc>
-              <a:spcBef>
-                <a:spcPts val="1001"/>
-              </a:spcBef>
-              <a:buFont typeface="Arial"/>
-              <a:buNone/>
-              <a:defRPr sz="2400" kern="1200">
-                <a:solidFill>
-                  <a:schemeClr val="tx1"/>
-                </a:solidFill>
-                <a:latin typeface="+mn-lt"/>
-                <a:ea typeface="+mn-ea"/>
-                <a:cs typeface="+mn-cs"/>
-              </a:defRPr>
-            </a:lvl1pPr>
-            <a:lvl2pPr marL="457211" indent="0" algn="ctr" defTabSz="914423" rtl="0" eaLnBrk="1" latinLnBrk="1" hangingPunct="1">
-              <a:lnSpc>
-                <a:spcPct val="90000"/>
-              </a:lnSpc>
-              <a:spcBef>
-                <a:spcPts val="500"/>
-              </a:spcBef>
-              <a:buFont typeface="Arial"/>
-              <a:buNone/>
-              <a:defRPr sz="2000" kern="1200">
-                <a:solidFill>
-                  <a:schemeClr val="tx1"/>
-                </a:solidFill>
-                <a:latin typeface="+mn-lt"/>
-                <a:ea typeface="+mn-ea"/>
-                <a:cs typeface="+mn-cs"/>
-              </a:defRPr>
-            </a:lvl2pPr>
-            <a:lvl3pPr marL="914423" indent="0" algn="ctr" defTabSz="914423" rtl="0" eaLnBrk="1" latinLnBrk="1" hangingPunct="1">
-              <a:lnSpc>
-                <a:spcPct val="90000"/>
-              </a:lnSpc>
-              <a:spcBef>
-                <a:spcPts val="500"/>
-              </a:spcBef>
-              <a:buFont typeface="Arial"/>
-              <a:buNone/>
-              <a:defRPr sz="1801" kern="1200">
-                <a:solidFill>
-                  <a:schemeClr val="tx1"/>
-                </a:solidFill>
-                <a:latin typeface="+mn-lt"/>
-                <a:ea typeface="+mn-ea"/>
-                <a:cs typeface="+mn-cs"/>
-              </a:defRPr>
-            </a:lvl3pPr>
-            <a:lvl4pPr marL="1371634" indent="0" algn="ctr" defTabSz="914423" rtl="0" eaLnBrk="1" latinLnBrk="1" hangingPunct="1">
-              <a:lnSpc>
-                <a:spcPct val="90000"/>
-              </a:lnSpc>
-              <a:spcBef>
-                <a:spcPts val="500"/>
-              </a:spcBef>
-              <a:buFont typeface="Arial"/>
-              <a:buNone/>
-              <a:defRPr sz="1600" kern="1200">
-                <a:solidFill>
-                  <a:schemeClr val="tx1"/>
-                </a:solidFill>
-                <a:latin typeface="+mn-lt"/>
-                <a:ea typeface="+mn-ea"/>
-                <a:cs typeface="+mn-cs"/>
-              </a:defRPr>
-            </a:lvl4pPr>
-            <a:lvl5pPr marL="1828846" indent="0" algn="ctr" defTabSz="914423" rtl="0" eaLnBrk="1" latinLnBrk="1" hangingPunct="1">
-              <a:lnSpc>
-                <a:spcPct val="90000"/>
-              </a:lnSpc>
-              <a:spcBef>
-                <a:spcPts val="500"/>
-              </a:spcBef>
-              <a:buFont typeface="Arial"/>
-              <a:buNone/>
-              <a:defRPr sz="1600" kern="1200">
-                <a:solidFill>
-                  <a:schemeClr val="tx1"/>
-                </a:solidFill>
-                <a:latin typeface="+mn-lt"/>
-                <a:ea typeface="+mn-ea"/>
-                <a:cs typeface="+mn-cs"/>
-              </a:defRPr>
-            </a:lvl5pPr>
-            <a:lvl6pPr marL="2286057" indent="0" algn="ctr" defTabSz="914423" rtl="0" eaLnBrk="1" latinLnBrk="1" hangingPunct="1">
-              <a:lnSpc>
-                <a:spcPct val="90000"/>
-              </a:lnSpc>
-              <a:spcBef>
-                <a:spcPts val="500"/>
-              </a:spcBef>
-              <a:buFont typeface="Arial"/>
-              <a:buNone/>
-              <a:defRPr sz="1600" kern="1200">
-                <a:solidFill>
-                  <a:schemeClr val="tx1"/>
-                </a:solidFill>
-                <a:latin typeface="+mn-lt"/>
-                <a:ea typeface="+mn-ea"/>
-                <a:cs typeface="+mn-cs"/>
-              </a:defRPr>
-            </a:lvl6pPr>
-            <a:lvl7pPr marL="2743269" indent="0" algn="ctr" defTabSz="914423" rtl="0" eaLnBrk="1" latinLnBrk="1" hangingPunct="1">
-              <a:lnSpc>
-                <a:spcPct val="90000"/>
-              </a:lnSpc>
-              <a:spcBef>
-                <a:spcPts val="500"/>
-              </a:spcBef>
-              <a:buFont typeface="Arial"/>
-              <a:buNone/>
-              <a:defRPr sz="1600" kern="1200">
-                <a:solidFill>
-                  <a:schemeClr val="tx1"/>
-                </a:solidFill>
-                <a:latin typeface="+mn-lt"/>
-                <a:ea typeface="+mn-ea"/>
-                <a:cs typeface="+mn-cs"/>
-              </a:defRPr>
-            </a:lvl7pPr>
-            <a:lvl8pPr marL="3200480" indent="0" algn="ctr" defTabSz="914423" rtl="0" eaLnBrk="1" latinLnBrk="1" hangingPunct="1">
-              <a:lnSpc>
-                <a:spcPct val="90000"/>
-              </a:lnSpc>
-              <a:spcBef>
-                <a:spcPts val="500"/>
-              </a:spcBef>
-              <a:buFont typeface="Arial"/>
-              <a:buNone/>
-              <a:defRPr sz="1600" kern="1200">
-                <a:solidFill>
-                  <a:schemeClr val="tx1"/>
-                </a:solidFill>
-                <a:latin typeface="+mn-lt"/>
-                <a:ea typeface="+mn-ea"/>
-                <a:cs typeface="+mn-cs"/>
-              </a:defRPr>
-            </a:lvl8pPr>
-            <a:lvl9pPr marL="3657691" indent="0" algn="ctr" defTabSz="914423" rtl="0" eaLnBrk="1" latinLnBrk="1" hangingPunct="1">
-              <a:lnSpc>
-                <a:spcPct val="90000"/>
-              </a:lnSpc>
-              <a:spcBef>
-                <a:spcPts val="500"/>
-              </a:spcBef>
-              <a:buFont typeface="Arial"/>
-              <a:buNone/>
-              <a:defRPr sz="1600" kern="1200">
-                <a:solidFill>
-                  <a:schemeClr val="tx1"/>
-                </a:solidFill>
-                <a:latin typeface="+mn-lt"/>
-                <a:ea typeface="+mn-ea"/>
-                <a:cs typeface="+mn-cs"/>
-              </a:defRPr>
-            </a:lvl9pPr>
-          </a:lstStyle>
+          <a:lstStyle/>
           <a:p>
             <a:pPr lvl="0">
               <a:defRPr/>
             </a:pPr>
-            <a:r>
-              <a:rPr lang="ko-KR" altLang="en-US" sz="4800">
-                <a:solidFill>
-                  <a:schemeClr val="bg1"/>
-                </a:solidFill>
-                <a:latin typeface="+mj-lt"/>
-                <a:ea typeface="맑은 고딕"/>
-                <a:cs typeface="맑은 고딕"/>
+            <a:endParaRPr lang="ko-KR" altLang="en-US"/>
+          </a:p>
+          <a:p>
+            <a:pPr lvl="0">
+              <a:defRPr/>
+            </a:pPr>
+            <a:r>
+              <a:rPr lang="ko-KR" altLang="en-US"/>
+              <a:t>바이너리 파일 데이터 분석 프로그램</a:t>
+            </a:r>
+            <a:endParaRPr lang="ko-KR" altLang="en-US"/>
+          </a:p>
+          <a:p>
+            <a:pPr lvl="0">
+              <a:defRPr/>
+            </a:pPr>
+            <a:r>
+              <a:rPr lang="ko-KR" altLang="en-US"/>
+              <a:t>바이너리 파일을 분석하여 디스크의 특성을 추출</a:t>
+            </a:r>
+            <a:endParaRPr lang="ko-KR" altLang="en-US"/>
+          </a:p>
+          <a:p>
+            <a:pPr marL="0" lvl="0" indent="0">
+              <a:buNone/>
+              <a:defRPr/>
+            </a:pPr>
+            <a:r>
+              <a:rPr lang="ko-KR" altLang="en-US"/>
+              <a:t> </a:t>
+            </a:r>
+            <a:r>
+              <a:rPr lang="en-US" altLang="ko-KR"/>
+              <a:t>-</a:t>
+            </a:r>
+            <a:r>
+              <a:rPr lang="ko-KR" altLang="en-US"/>
+              <a:t> 파일 타입</a:t>
+            </a:r>
+            <a:r>
+              <a:rPr lang="en-US" altLang="ko-KR"/>
+              <a:t>,</a:t>
+            </a:r>
+            <a:r>
+              <a:rPr lang="ko-KR" altLang="en-US"/>
+              <a:t> 파티션 타입</a:t>
+            </a:r>
+            <a:r>
+              <a:rPr lang="en-US" altLang="ko-KR"/>
+              <a:t>,</a:t>
+            </a:r>
+            <a:r>
+              <a:rPr lang="ko-KR" altLang="en-US"/>
+              <a:t> 예약 영역</a:t>
+            </a:r>
+            <a:r>
+              <a:rPr lang="en-US" altLang="ko-KR"/>
+              <a:t>,</a:t>
+            </a:r>
+            <a:r>
+              <a:rPr lang="ko-KR" altLang="en-US"/>
+              <a:t> 용량 등등</a:t>
+            </a:r>
+            <a:endParaRPr lang="ko-KR" altLang="en-US"/>
+          </a:p>
+          <a:p>
+            <a:pPr marL="0" lvl="0" indent="0">
+              <a:buNone/>
+              <a:defRPr/>
+            </a:pPr>
+            <a:endParaRPr lang="ko-KR" altLang="en-US"/>
+          </a:p>
+          <a:p>
+            <a:pPr lvl="0">
+              <a:defRPr/>
+            </a:pPr>
+            <a:r>
+              <a:rPr lang="ko-KR" altLang="en-US"/>
+              <a:t>파일 시스템에 따라 바이너리 파일의 구조에 따른 분석 방법 확장</a:t>
+            </a:r>
+            <a:endParaRPr lang="ko-KR" altLang="en-US"/>
+          </a:p>
+          <a:p>
+            <a:pPr marL="0" lvl="0" indent="0">
+              <a:buNone/>
+              <a:defRPr/>
+            </a:pPr>
+            <a:r>
+              <a:rPr lang="ko-KR" altLang="en-US"/>
+              <a:t> </a:t>
+            </a:r>
+            <a:r>
+              <a:rPr lang="en-US" altLang="ko-KR"/>
+              <a:t>-</a:t>
+            </a:r>
+            <a:r>
+              <a:rPr lang="ko-KR" altLang="en-US"/>
+              <a:t> </a:t>
+            </a:r>
+            <a:r>
+              <a:rPr lang="en-US" altLang="ko-KR"/>
+              <a:t>FAT32, NTFS, exFAT, HFS, refs</a:t>
+            </a:r>
+            <a:endParaRPr lang="en-US" altLang="ko-KR"/>
+          </a:p>
+          <a:p>
+            <a:pPr marL="0" lvl="0" indent="0">
+              <a:buNone/>
+              <a:defRPr/>
+            </a:pPr>
+            <a:endParaRPr lang="en-US" altLang="ko-KR"/>
+          </a:p>
+          <a:p>
+            <a:pPr lvl="0">
+              <a:defRPr/>
+            </a:pPr>
+            <a:r>
+              <a:rPr lang="ko-KR" altLang="en-US"/>
+              <a:t>바이너리 파일 분석을 통한 카빙</a:t>
+            </a:r>
+            <a:endParaRPr lang="ko-KR" altLang="en-US"/>
+          </a:p>
+          <a:p>
+            <a:pPr marL="0" lvl="0" indent="0">
+              <a:buNone/>
+              <a:defRPr/>
+            </a:pPr>
+            <a:r>
+              <a:rPr lang="ko-KR" altLang="en-US"/>
+              <a:t> </a:t>
+            </a:r>
+            <a:r>
+              <a:rPr lang="en-US" altLang="ko-KR"/>
+              <a:t>-</a:t>
+            </a:r>
+            <a:r>
+              <a:rPr lang="ko-KR" altLang="en-US"/>
+              <a:t> 기법에 따라 장단점을 확인 후 기능 적용</a:t>
+            </a:r>
+            <a:endParaRPr lang="ko-KR" altLang="en-US"/>
+          </a:p>
+          <a:p>
+            <a:pPr marL="0" lvl="0" indent="0">
+              <a:buNone/>
+              <a:defRPr/>
+            </a:pPr>
+            <a:r>
+              <a:rPr lang="ko-KR" altLang="en-US"/>
+              <a:t> </a:t>
+            </a:r>
+            <a:r>
+              <a:rPr lang="en-US" altLang="ko-KR"/>
+              <a:t>-</a:t>
+            </a:r>
+            <a:r>
+              <a:rPr lang="ko-KR" altLang="en-US"/>
+              <a:t> 시그니처 기반 카빙</a:t>
+            </a:r>
+            <a:r>
+              <a:rPr lang="en-US" altLang="ko-KR"/>
+              <a:t>,</a:t>
+            </a:r>
+            <a:r>
+              <a:rPr lang="ko-KR" altLang="en-US"/>
+              <a:t> 램 슬랙 카빙</a:t>
+            </a:r>
+            <a:r>
+              <a:rPr lang="en-US" altLang="ko-KR"/>
+              <a:t>,</a:t>
+            </a:r>
+            <a:r>
+              <a:rPr lang="ko-KR" altLang="en-US"/>
+              <a:t> 파일 구조체 카빙</a:t>
+            </a:r>
+            <a:r>
+              <a:rPr lang="en-US" altLang="ko-KR"/>
+              <a:t>,</a:t>
+            </a:r>
+            <a:r>
+              <a:rPr lang="ko-KR" altLang="en-US"/>
+              <a:t> 파일 크기 획득 방법 기반의 카</a:t>
+            </a:r>
+            <a:endParaRPr lang="ko-KR" altLang="en-US"/>
+          </a:p>
+          <a:p>
+            <a:pPr marL="0" lvl="0" indent="0">
+              <a:buNone/>
+              <a:defRPr/>
+            </a:pPr>
+            <a:r>
+              <a:rPr lang="ko-KR" altLang="en-US"/>
+              <a:t>   빙, 파일 구조 검증 방법 기반의 카빙</a:t>
+            </a:r>
+            <a:endParaRPr lang="ko-KR" altLang="en-US"/>
+          </a:p>
+          <a:p>
+            <a:pPr marL="0" lvl="0" indent="0">
+              <a:buNone/>
+              <a:defRPr/>
+            </a:pPr>
+            <a:endParaRPr lang="ko-KR" altLang="en-US">
+              <a:hlinkClick r:id="rId2"/>
+            </a:endParaRPr>
+          </a:p>
+          <a:p>
+            <a:pPr marL="0" lvl="0" indent="0">
+              <a:buNone/>
+              <a:defRPr/>
+            </a:pPr>
+            <a:r>
+              <a:rPr lang="en-US" altLang="ko-KR">
+                <a:hlinkClick r:id="rId2"/>
               </a:rPr>
-              <a:t>요구사항 정의</a:t>
-            </a:r>
-            <a:endParaRPr lang="ko-KR" altLang="en-US" sz="4800">
-              <a:solidFill>
-                <a:schemeClr val="bg1"/>
-              </a:solidFill>
-              <a:latin typeface="+mj-lt"/>
-              <a:ea typeface="맑은 고딕"/>
-              <a:cs typeface="맑은 고딕"/>
-            </a:endParaRPr>
+              <a:t>https://d0ngr0thy.tistory.com/44</a:t>
+            </a:r>
+            <a:endParaRPr lang="en-US" altLang="ko-KR"/>
+          </a:p>
+          <a:p>
+            <a:pPr marL="0" lvl="0" indent="0">
+              <a:buNone/>
+              <a:defRPr/>
+            </a:pPr>
+            <a:endParaRPr lang="ko-KR" altLang="en-US"/>
           </a:p>
         </p:txBody>
       </p:sp>
@@ -10187,8 +10555,8 @@
 </p:sld>
 </file>
 
-<file path=ppt/slides/slide9.xml><?xml version="1.0" encoding="utf-8"?>
-<p:sld xmlns:a="http://schemas.openxmlformats.org/drawingml/2006/main" xmlns:r="http://schemas.openxmlformats.org/officeDocument/2006/relationships" xmlns:p="http://schemas.openxmlformats.org/presentationml/2006/main">
+<file path=ppt/slides/slide7.xml><?xml version="1.0" encoding="utf-8"?>
+<p:sld xmlns:r="http://schemas.openxmlformats.org/officeDocument/2006/relationships" xmlns:c="http://schemas.openxmlformats.org/drawingml/2006/chart" xmlns:a="http://schemas.openxmlformats.org/drawingml/2006/main" xmlns:dgm="http://schemas.openxmlformats.org/drawingml/2006/diagram" xmlns:dsp="http://schemas.microsoft.com/office/drawing/2008/diagram" xmlns:p="http://schemas.openxmlformats.org/presentationml/2006/main">
   <p:cSld>
     <p:spTree>
       <p:nvGrpSpPr>
@@ -10206,13 +10574,13 @@
       </p:grpSpPr>
       <p:sp>
         <p:nvSpPr>
-          <p:cNvPr id="10" name="직사각형 9"/>
+          <p:cNvPr id="4" name="직사각형 9"/>
           <p:cNvSpPr/>
           <p:nvPr/>
         </p:nvSpPr>
         <p:spPr>
           <a:xfrm>
-            <a:off x="-1" y="2398426"/>
+            <a:off x="-1" y="0"/>
             <a:ext cx="12192001" cy="1338109"/>
           </a:xfrm>
           <a:prstGeom prst="rect">
@@ -10244,224 +10612,731 @@
           </a:fontRef>
         </p:style>
         <p:txBody>
-          <a:bodyPr rtlCol="0" anchor="ctr"/>
+          <a:bodyPr anchor="ctr"/>
           <a:lstStyle/>
           <a:p>
-            <a:pPr algn="ctr"/>
-            <a:endParaRPr kumimoji="1" lang="ko-KR" altLang="en-US" dirty="0"/>
+            <a:pPr>
+              <a:defRPr/>
+            </a:pPr>
+            <a:r>
+              <a:rPr kumimoji="1" lang="en-US" altLang="ko-KR" sz="4800"/>
+              <a:t>1.</a:t>
+            </a:r>
+            <a:r>
+              <a:rPr kumimoji="1" lang="ko-KR" altLang="en-US" sz="4800"/>
+              <a:t> 아이디어 도출</a:t>
+            </a:r>
+            <a:endParaRPr kumimoji="1" lang="ko-KR" altLang="en-US" sz="4800"/>
           </a:p>
         </p:txBody>
       </p:sp>
       <p:sp>
         <p:nvSpPr>
-          <p:cNvPr id="12" name="부제목 2"/>
-          <p:cNvSpPr txBox="1">
-            <a:spLocks/>
+          <p:cNvPr id="5" name="내용 개체 틀 4"/>
+          <p:cNvSpPr>
+            <a:spLocks noGrp="1"/>
           </p:cNvSpPr>
+          <p:nvPr>
+            <p:ph idx="1"/>
+          </p:nvPr>
+        </p:nvSpPr>
+        <p:spPr>
+          <a:xfrm>
+            <a:off x="0" y="1561042"/>
+            <a:ext cx="12192000" cy="5296957"/>
+          </a:xfrm>
+        </p:spPr>
+        <p:txBody>
+          <a:bodyPr vert="horz" lIns="91440" tIns="45720" rIns="91440" bIns="45720">
+            <a:normAutofit fontScale="85000" lnSpcReduction="20000"/>
+          </a:bodyPr>
+          <a:lstStyle/>
+          <a:p>
+            <a:pPr lvl="0">
+              <a:defRPr/>
+            </a:pPr>
+            <a:r>
+              <a:rPr lang="en-US" altLang="ko-KR"/>
+              <a:t>USB</a:t>
+            </a:r>
+            <a:r>
+              <a:rPr lang="ko-KR" altLang="en-US"/>
+              <a:t> 복구 툴</a:t>
+            </a:r>
+            <a:endParaRPr lang="ko-KR" altLang="en-US"/>
+          </a:p>
+          <a:p>
+            <a:pPr marL="0" lvl="0" indent="0">
+              <a:buNone/>
+              <a:defRPr/>
+            </a:pPr>
+            <a:endParaRPr lang="ko-KR" altLang="en-US"/>
+          </a:p>
+          <a:p>
+            <a:pPr marL="0" lvl="0" indent="0">
+              <a:buNone/>
+              <a:defRPr/>
+            </a:pPr>
+            <a:r>
+              <a:rPr lang="ko-KR" altLang="en-US"/>
+              <a:t> </a:t>
+            </a:r>
+            <a:r>
+              <a:rPr lang="en-US" altLang="ko-KR"/>
+              <a:t>-</a:t>
+            </a:r>
+            <a:r>
+              <a:rPr lang="ko-KR" altLang="en-US"/>
+              <a:t> </a:t>
+            </a:r>
+            <a:endParaRPr lang="ko-KR" altLang="en-US"/>
+          </a:p>
+          <a:p>
+            <a:pPr marL="0" lvl="0" indent="0">
+              <a:buNone/>
+              <a:defRPr/>
+            </a:pPr>
+            <a:endParaRPr lang="ko-KR" altLang="en-US"/>
+          </a:p>
+          <a:p>
+            <a:pPr marL="0" lvl="0" indent="0">
+              <a:buNone/>
+              <a:defRPr/>
+            </a:pPr>
+            <a:r>
+              <a:rPr lang="ko-KR" altLang="en-US"/>
+              <a:t> </a:t>
+            </a:r>
+            <a:r>
+              <a:rPr lang="en-US" altLang="ko-KR"/>
+              <a:t>-</a:t>
+            </a:r>
+            <a:r>
+              <a:rPr lang="ko-KR" altLang="en-US"/>
+              <a:t> </a:t>
+            </a:r>
+            <a:r>
+              <a:rPr lang="en-US" altLang="ko-KR"/>
+              <a:t>M</a:t>
+            </a:r>
+            <a:r>
+              <a:rPr lang="ko-KR" altLang="en-US"/>
+              <a:t>BR 영역에 존재하는 파티션 테이블이 손상된 상태의 저장매체에서 파티션 테이블을 복구하여 파일시스템 안의 데이터를 복구</a:t>
+            </a:r>
+            <a:endParaRPr lang="ko-KR" altLang="en-US"/>
+          </a:p>
+          <a:p>
+            <a:pPr marL="0" lvl="0" indent="0">
+              <a:buNone/>
+              <a:defRPr/>
+            </a:pPr>
+            <a:endParaRPr lang="en-US" altLang="ko-KR"/>
+          </a:p>
+          <a:p>
+            <a:pPr marL="0" lvl="0" indent="0">
+              <a:buNone/>
+              <a:defRPr/>
+            </a:pPr>
+            <a:r>
+              <a:rPr lang="ko-KR" altLang="en-US"/>
+              <a:t> </a:t>
+            </a:r>
+            <a:r>
+              <a:rPr lang="en-US" altLang="ko-KR"/>
+              <a:t>-</a:t>
+            </a:r>
+            <a:r>
+              <a:rPr lang="ko-KR" altLang="en-US"/>
+              <a:t> 메타데이터가 삭제되지 않은 경우 복구 가능</a:t>
+            </a:r>
+            <a:endParaRPr lang="ko-KR" altLang="en-US"/>
+          </a:p>
+          <a:p>
+            <a:pPr marL="0" lvl="0" indent="0">
+              <a:buNone/>
+              <a:defRPr/>
+            </a:pPr>
+            <a:endParaRPr lang="en-US" altLang="ko-KR"/>
+          </a:p>
+          <a:p>
+            <a:pPr marL="0" lvl="0" indent="0">
+              <a:buNone/>
+              <a:defRPr/>
+            </a:pPr>
+            <a:r>
+              <a:rPr lang="ko-KR" altLang="en-US"/>
+              <a:t> </a:t>
+            </a:r>
+            <a:r>
+              <a:rPr lang="en-US" altLang="ko-KR"/>
+              <a:t>-</a:t>
+            </a:r>
+            <a:r>
+              <a:rPr lang="ko-KR" altLang="en-US"/>
+              <a:t> Data Area에서 지워진 Directory Entry에서 지워지기 전에 해당 파일이 사용하던 </a:t>
+            </a:r>
+            <a:endParaRPr lang="ko-KR" altLang="en-US"/>
+          </a:p>
+          <a:p>
+            <a:pPr marL="0" lvl="0" indent="0">
+              <a:buNone/>
+              <a:defRPr/>
+            </a:pPr>
+            <a:r>
+              <a:rPr lang="ko-KR" altLang="en-US"/>
+              <a:t>클러스터 번호를 확인 그 후 FAT Area에 확인한 클러스터 번호에 맞는 FAT Entry와 연결 </a:t>
+            </a:r>
+            <a:endParaRPr lang="ko-KR" altLang="en-US"/>
+          </a:p>
+          <a:p>
+            <a:pPr marL="0" lvl="0" indent="0">
+              <a:buNone/>
+              <a:defRPr/>
+            </a:pPr>
+            <a:r>
+              <a:rPr lang="ko-KR" altLang="en-US"/>
+              <a:t>시켜주고 마지막으로 Directory Entry의  NAME항목에서 0xE5로 되어있는 부분을 수정</a:t>
+            </a:r>
+            <a:endParaRPr lang="ko-KR" altLang="en-US"/>
+          </a:p>
+          <a:p>
+            <a:pPr marL="0" lvl="0" indent="0">
+              <a:buNone/>
+              <a:defRPr/>
+            </a:pPr>
+            <a:endParaRPr lang="ko-KR" altLang="en-US"/>
+          </a:p>
+        </p:txBody>
+      </p:sp>
+    </p:spTree>
+  </p:cSld>
+  <p:clrMapOvr>
+    <a:masterClrMapping/>
+  </p:clrMapOvr>
+  <mc:AlternateContent xmlns:mc="http://schemas.openxmlformats.org/markup-compatibility/2006">
+    <mc:Choice xmlns:p14="http://schemas.microsoft.com/office/powerpoint/2010/main" Requires="p14">
+      <p:transition xmlns:mc="http://schemas.openxmlformats.org/markup-compatibility/2006" xmlns:p14="http://schemas.microsoft.com/office/powerpoint/2010/main" mc:Ignorable="p14" p14:dur="500"/>
+    </mc:Choice>
+    <mc:Fallback>
+      <p:transition/>
+    </mc:Fallback>
+  </mc:AlternateContent>
+</p:sld>
+</file>
+
+<file path=ppt/slides/slide8.xml><?xml version="1.0" encoding="utf-8"?>
+<p:sld xmlns:r="http://schemas.openxmlformats.org/officeDocument/2006/relationships" xmlns:c="http://schemas.openxmlformats.org/drawingml/2006/chart" xmlns:a="http://schemas.openxmlformats.org/drawingml/2006/main" xmlns:dgm="http://schemas.openxmlformats.org/drawingml/2006/diagram" xmlns:dsp="http://schemas.microsoft.com/office/drawing/2008/diagram" xmlns:p="http://schemas.openxmlformats.org/presentationml/2006/main">
+  <p:cSld>
+    <p:spTree>
+      <p:nvGrpSpPr>
+        <p:cNvPr id="1" name=""/>
+        <p:cNvGrpSpPr/>
+        <p:nvPr/>
+      </p:nvGrpSpPr>
+      <p:grpSpPr>
+        <a:xfrm>
+          <a:off x="0" y="0"/>
+          <a:ext cx="0" cy="0"/>
+          <a:chOff x="0" y="0"/>
+          <a:chExt cx="0" cy="0"/>
+        </a:xfrm>
+      </p:grpSpPr>
+      <p:sp>
+        <p:nvSpPr>
+          <p:cNvPr id="4" name="직사각형 9"/>
+          <p:cNvSpPr/>
           <p:nvPr/>
         </p:nvSpPr>
         <p:spPr>
           <a:xfrm>
-            <a:off x="1" y="2608234"/>
-            <a:ext cx="12192000" cy="754314"/>
+            <a:off x="-1" y="0"/>
+            <a:ext cx="12192001" cy="1338109"/>
           </a:xfrm>
           <a:prstGeom prst="rect">
             <a:avLst/>
           </a:prstGeom>
+          <a:solidFill>
+            <a:schemeClr val="accent1">
+              <a:lumMod val="75000"/>
+            </a:schemeClr>
+          </a:solidFill>
+          <a:ln>
+            <a:noFill/>
+          </a:ln>
+        </p:spPr>
+        <p:style>
+          <a:lnRef idx="2">
+            <a:schemeClr val="accent1">
+              <a:shade val="50000"/>
+            </a:schemeClr>
+          </a:lnRef>
+          <a:fillRef idx="1">
+            <a:schemeClr val="accent1"/>
+          </a:fillRef>
+          <a:effectRef idx="0">
+            <a:schemeClr val="accent1"/>
+          </a:effectRef>
+          <a:fontRef idx="minor">
+            <a:schemeClr val="lt1"/>
+          </a:fontRef>
+        </p:style>
+        <p:txBody>
+          <a:bodyPr anchor="ctr"/>
+          <a:lstStyle/>
+          <a:p>
+            <a:pPr>
+              <a:defRPr/>
+            </a:pPr>
+            <a:r>
+              <a:rPr kumimoji="1" lang="en-US" altLang="ko-KR" sz="4800"/>
+              <a:t>1.</a:t>
+            </a:r>
+            <a:r>
+              <a:rPr kumimoji="1" lang="ko-KR" altLang="en-US" sz="4800"/>
+              <a:t> 아이디어 도출</a:t>
+            </a:r>
+            <a:endParaRPr kumimoji="1" lang="ko-KR" altLang="en-US" sz="4800"/>
+          </a:p>
+        </p:txBody>
+      </p:sp>
+      <p:sp>
+        <p:nvSpPr>
+          <p:cNvPr id="5" name="내용 개체 틀 4"/>
+          <p:cNvSpPr>
+            <a:spLocks noGrp="1"/>
+          </p:cNvSpPr>
+          <p:nvPr>
+            <p:ph idx="1"/>
+          </p:nvPr>
+        </p:nvSpPr>
+        <p:spPr>
+          <a:xfrm>
+            <a:off x="0" y="1561042"/>
+            <a:ext cx="12192000" cy="5296957"/>
+          </a:xfrm>
         </p:spPr>
         <p:txBody>
-          <a:bodyPr vert="horz" lIns="91440" tIns="45720" rIns="91440" bIns="45720" rtlCol="0" anchor="ctr">
-            <a:noAutofit/>
+          <a:bodyPr vert="horz" lIns="91440" tIns="45720" rIns="91440" bIns="45720">
+            <a:normAutofit lnSpcReduction="10000"/>
           </a:bodyPr>
-          <a:lstStyle>
-            <a:lvl1pPr marL="0" indent="0" algn="ctr" defTabSz="914423" rtl="0" eaLnBrk="1" latinLnBrk="1" hangingPunct="1">
-              <a:lnSpc>
-                <a:spcPct val="90000"/>
-              </a:lnSpc>
-              <a:spcBef>
-                <a:spcPts val="1001"/>
-              </a:spcBef>
-              <a:buFont typeface="Arial"/>
-              <a:buNone/>
-              <a:defRPr sz="2400" kern="1200">
-                <a:solidFill>
-                  <a:schemeClr val="tx1"/>
-                </a:solidFill>
-                <a:latin typeface="+mn-lt"/>
-                <a:ea typeface="+mn-ea"/>
-                <a:cs typeface="+mn-cs"/>
-              </a:defRPr>
-            </a:lvl1pPr>
-            <a:lvl2pPr marL="457211" indent="0" algn="ctr" defTabSz="914423" rtl="0" eaLnBrk="1" latinLnBrk="1" hangingPunct="1">
-              <a:lnSpc>
-                <a:spcPct val="90000"/>
-              </a:lnSpc>
-              <a:spcBef>
-                <a:spcPts val="500"/>
-              </a:spcBef>
-              <a:buFont typeface="Arial"/>
-              <a:buNone/>
-              <a:defRPr sz="2000" kern="1200">
-                <a:solidFill>
-                  <a:schemeClr val="tx1"/>
-                </a:solidFill>
-                <a:latin typeface="+mn-lt"/>
-                <a:ea typeface="+mn-ea"/>
-                <a:cs typeface="+mn-cs"/>
-              </a:defRPr>
-            </a:lvl2pPr>
-            <a:lvl3pPr marL="914423" indent="0" algn="ctr" defTabSz="914423" rtl="0" eaLnBrk="1" latinLnBrk="1" hangingPunct="1">
-              <a:lnSpc>
-                <a:spcPct val="90000"/>
-              </a:lnSpc>
-              <a:spcBef>
-                <a:spcPts val="500"/>
-              </a:spcBef>
-              <a:buFont typeface="Arial"/>
-              <a:buNone/>
-              <a:defRPr sz="1801" kern="1200">
-                <a:solidFill>
-                  <a:schemeClr val="tx1"/>
-                </a:solidFill>
-                <a:latin typeface="+mn-lt"/>
-                <a:ea typeface="+mn-ea"/>
-                <a:cs typeface="+mn-cs"/>
-              </a:defRPr>
-            </a:lvl3pPr>
-            <a:lvl4pPr marL="1371634" indent="0" algn="ctr" defTabSz="914423" rtl="0" eaLnBrk="1" latinLnBrk="1" hangingPunct="1">
-              <a:lnSpc>
-                <a:spcPct val="90000"/>
-              </a:lnSpc>
-              <a:spcBef>
-                <a:spcPts val="500"/>
-              </a:spcBef>
-              <a:buFont typeface="Arial"/>
-              <a:buNone/>
-              <a:defRPr sz="1600" kern="1200">
-                <a:solidFill>
-                  <a:schemeClr val="tx1"/>
-                </a:solidFill>
-                <a:latin typeface="+mn-lt"/>
-                <a:ea typeface="+mn-ea"/>
-                <a:cs typeface="+mn-cs"/>
-              </a:defRPr>
-            </a:lvl4pPr>
-            <a:lvl5pPr marL="1828846" indent="0" algn="ctr" defTabSz="914423" rtl="0" eaLnBrk="1" latinLnBrk="1" hangingPunct="1">
-              <a:lnSpc>
-                <a:spcPct val="90000"/>
-              </a:lnSpc>
-              <a:spcBef>
-                <a:spcPts val="500"/>
-              </a:spcBef>
-              <a:buFont typeface="Arial"/>
-              <a:buNone/>
-              <a:defRPr sz="1600" kern="1200">
-                <a:solidFill>
-                  <a:schemeClr val="tx1"/>
-                </a:solidFill>
-                <a:latin typeface="+mn-lt"/>
-                <a:ea typeface="+mn-ea"/>
-                <a:cs typeface="+mn-cs"/>
-              </a:defRPr>
-            </a:lvl5pPr>
-            <a:lvl6pPr marL="2286057" indent="0" algn="ctr" defTabSz="914423" rtl="0" eaLnBrk="1" latinLnBrk="1" hangingPunct="1">
-              <a:lnSpc>
-                <a:spcPct val="90000"/>
-              </a:lnSpc>
-              <a:spcBef>
-                <a:spcPts val="500"/>
-              </a:spcBef>
-              <a:buFont typeface="Arial"/>
-              <a:buNone/>
-              <a:defRPr sz="1600" kern="1200">
-                <a:solidFill>
-                  <a:schemeClr val="tx1"/>
-                </a:solidFill>
-                <a:latin typeface="+mn-lt"/>
-                <a:ea typeface="+mn-ea"/>
-                <a:cs typeface="+mn-cs"/>
-              </a:defRPr>
-            </a:lvl6pPr>
-            <a:lvl7pPr marL="2743269" indent="0" algn="ctr" defTabSz="914423" rtl="0" eaLnBrk="1" latinLnBrk="1" hangingPunct="1">
-              <a:lnSpc>
-                <a:spcPct val="90000"/>
-              </a:lnSpc>
-              <a:spcBef>
-                <a:spcPts val="500"/>
-              </a:spcBef>
-              <a:buFont typeface="Arial"/>
-              <a:buNone/>
-              <a:defRPr sz="1600" kern="1200">
-                <a:solidFill>
-                  <a:schemeClr val="tx1"/>
-                </a:solidFill>
-                <a:latin typeface="+mn-lt"/>
-                <a:ea typeface="+mn-ea"/>
-                <a:cs typeface="+mn-cs"/>
-              </a:defRPr>
-            </a:lvl7pPr>
-            <a:lvl8pPr marL="3200480" indent="0" algn="ctr" defTabSz="914423" rtl="0" eaLnBrk="1" latinLnBrk="1" hangingPunct="1">
-              <a:lnSpc>
-                <a:spcPct val="90000"/>
-              </a:lnSpc>
-              <a:spcBef>
-                <a:spcPts val="500"/>
-              </a:spcBef>
-              <a:buFont typeface="Arial"/>
-              <a:buNone/>
-              <a:defRPr sz="1600" kern="1200">
-                <a:solidFill>
-                  <a:schemeClr val="tx1"/>
-                </a:solidFill>
-                <a:latin typeface="+mn-lt"/>
-                <a:ea typeface="+mn-ea"/>
-                <a:cs typeface="+mn-cs"/>
-              </a:defRPr>
-            </a:lvl8pPr>
-            <a:lvl9pPr marL="3657691" indent="0" algn="ctr" defTabSz="914423" rtl="0" eaLnBrk="1" latinLnBrk="1" hangingPunct="1">
-              <a:lnSpc>
-                <a:spcPct val="90000"/>
-              </a:lnSpc>
-              <a:spcBef>
-                <a:spcPts val="500"/>
-              </a:spcBef>
-              <a:buFont typeface="Arial"/>
-              <a:buNone/>
-              <a:defRPr sz="1600" kern="1200">
-                <a:solidFill>
-                  <a:schemeClr val="tx1"/>
-                </a:solidFill>
-                <a:latin typeface="+mn-lt"/>
-                <a:ea typeface="+mn-ea"/>
-                <a:cs typeface="+mn-cs"/>
-              </a:defRPr>
-            </a:lvl9pPr>
-          </a:lstStyle>
-          <a:p>
-            <a:r>
-              <a:rPr lang="ko-KR" altLang="en-US" sz="4800" dirty="0">
-                <a:solidFill>
-                  <a:schemeClr val="bg1"/>
-                </a:solidFill>
-                <a:latin typeface="+mj-lt"/>
-                <a:ea typeface="맑은 고딕" charset="-127"/>
-                <a:cs typeface="맑은 고딕" charset="-127"/>
-              </a:rPr>
-              <a:t>계획 및 일정 수립</a:t>
-            </a:r>
+          <a:lstStyle/>
+          <a:p>
+            <a:pPr lvl="0">
+              <a:defRPr/>
+            </a:pPr>
+            <a:r>
+              <a:rPr lang="ko-KR" altLang="en-US"/>
+              <a:t>웨어러블 기기 분석 툴</a:t>
+            </a:r>
+            <a:endParaRPr lang="ko-KR" altLang="en-US"/>
+          </a:p>
+          <a:p>
+            <a:pPr lvl="0">
+              <a:defRPr/>
+            </a:pPr>
+            <a:endParaRPr lang="ko-KR" altLang="en-US"/>
+          </a:p>
+          <a:p>
+            <a:pPr marL="0" lvl="0" indent="0">
+              <a:buNone/>
+              <a:defRPr/>
+            </a:pPr>
+            <a:r>
+              <a:rPr lang="en-US" altLang="ko-KR"/>
+              <a:t> -</a:t>
+            </a:r>
+            <a:r>
+              <a:rPr lang="ko-KR" altLang="en-US"/>
+              <a:t> 웨어러블 기기는</a:t>
+            </a:r>
+            <a:r>
+              <a:rPr lang="en-US" altLang="ko-KR"/>
+              <a:t> </a:t>
+            </a:r>
+            <a:r>
+              <a:rPr lang="ko-KR" altLang="en-US"/>
+              <a:t>항상 착용중이고</a:t>
+            </a:r>
+            <a:r>
+              <a:rPr lang="en-US" altLang="ko-KR"/>
+              <a:t>,</a:t>
+            </a:r>
+            <a:r>
+              <a:rPr lang="ko-KR" altLang="en-US"/>
+              <a:t> 많은 양의 개인식별</a:t>
+            </a:r>
+            <a:r>
+              <a:rPr lang="en-US" altLang="ko-KR"/>
+              <a:t>,</a:t>
+            </a:r>
+            <a:r>
+              <a:rPr lang="ko-KR" altLang="en-US"/>
+              <a:t> 생체적</a:t>
+            </a:r>
+            <a:r>
+              <a:rPr lang="en-US" altLang="ko-KR"/>
+              <a:t>,</a:t>
+            </a:r>
+            <a:r>
+              <a:rPr lang="ko-KR" altLang="en-US"/>
+              <a:t> 지역적 데이터를 포함</a:t>
+            </a:r>
+            <a:endParaRPr lang="ko-KR" altLang="en-US"/>
+          </a:p>
+          <a:p>
+            <a:pPr marL="0" lvl="0" indent="0">
+              <a:buNone/>
+              <a:defRPr/>
+            </a:pPr>
+            <a:endParaRPr lang="ko-KR" altLang="en-US"/>
+          </a:p>
+          <a:p>
+            <a:pPr marL="0" lvl="0" indent="0">
+              <a:buNone/>
+              <a:defRPr/>
+            </a:pPr>
+            <a:r>
+              <a:rPr lang="ko-KR" altLang="en-US"/>
+              <a:t> </a:t>
+            </a:r>
+            <a:r>
+              <a:rPr lang="en-US" altLang="ko-KR"/>
+              <a:t>-</a:t>
+            </a:r>
+            <a:r>
+              <a:rPr lang="ko-KR" altLang="en-US"/>
+              <a:t> 이러한 기기들은 범죄수사에 큰 증거물이 될 수 있음</a:t>
+            </a:r>
+            <a:endParaRPr lang="ko-KR" altLang="en-US"/>
+          </a:p>
+          <a:p>
+            <a:pPr marL="0" lvl="0" indent="0">
+              <a:buNone/>
+              <a:defRPr/>
+            </a:pPr>
+            <a:endParaRPr lang="ko-KR" altLang="en-US"/>
+          </a:p>
+          <a:p>
+            <a:pPr marL="0" lvl="0" indent="0">
+              <a:buNone/>
+              <a:defRPr/>
+            </a:pPr>
+            <a:r>
+              <a:rPr lang="ko-KR" altLang="en-US"/>
+              <a:t> </a:t>
+            </a:r>
+            <a:r>
+              <a:rPr lang="en-US" altLang="ko-KR"/>
+              <a:t>-</a:t>
+            </a:r>
+            <a:r>
+              <a:rPr lang="ko-KR" altLang="en-US"/>
+              <a:t> 기기의 다양성</a:t>
+            </a:r>
+            <a:r>
+              <a:rPr lang="en-US" altLang="ko-KR"/>
+              <a:t>,</a:t>
+            </a:r>
+            <a:r>
+              <a:rPr lang="ko-KR" altLang="en-US"/>
+              <a:t> 기기의 빠른 발전</a:t>
+            </a:r>
+            <a:r>
+              <a:rPr lang="en-US" altLang="ko-KR"/>
+              <a:t>,</a:t>
+            </a:r>
+            <a:r>
+              <a:rPr lang="ko-KR" altLang="en-US"/>
+              <a:t> 데이터의 다양성</a:t>
+            </a:r>
+            <a:r>
+              <a:rPr lang="en-US" altLang="ko-KR"/>
+              <a:t>,</a:t>
+            </a:r>
+            <a:r>
+              <a:rPr lang="ko-KR" altLang="en-US"/>
+              <a:t> 보안적 특징</a:t>
+            </a:r>
+            <a:r>
+              <a:rPr lang="en-US" altLang="ko-KR"/>
+              <a:t>,</a:t>
+            </a:r>
+            <a:r>
+              <a:rPr lang="ko-KR" altLang="en-US"/>
+              <a:t> 안티포렌식 메커니즘 등의 이유로 분석에 어려움이 존재</a:t>
+            </a:r>
+            <a:endParaRPr lang="ko-KR" altLang="en-US"/>
+          </a:p>
+          <a:p>
+            <a:pPr marL="0" lvl="0" indent="0">
+              <a:buNone/>
+              <a:defRPr/>
+            </a:pPr>
+            <a:endParaRPr lang="ko-KR" altLang="en-US"/>
+          </a:p>
+          <a:p>
+            <a:pPr marL="0" lvl="0" indent="0">
+              <a:buNone/>
+              <a:defRPr/>
+            </a:pPr>
+            <a:r>
+              <a:rPr lang="ko-KR" altLang="en-US"/>
+              <a:t> </a:t>
+            </a:r>
+            <a:r>
+              <a:rPr lang="en-US" altLang="ko-KR"/>
+              <a:t>-</a:t>
+            </a:r>
+            <a:r>
+              <a:rPr lang="ko-KR" altLang="en-US"/>
+              <a:t> 위치정보</a:t>
+            </a:r>
+            <a:r>
+              <a:rPr lang="en-US" altLang="ko-KR"/>
+              <a:t>,</a:t>
+            </a:r>
+            <a:r>
+              <a:rPr lang="ko-KR" altLang="en-US"/>
+              <a:t> 메신저 사용 기록 및 내용</a:t>
+            </a:r>
+            <a:r>
+              <a:rPr lang="en-US" altLang="ko-KR"/>
+              <a:t>,</a:t>
+            </a:r>
+            <a:r>
+              <a:rPr lang="ko-KR" altLang="en-US"/>
+              <a:t>  페어링 된 기기의 </a:t>
+            </a:r>
+            <a:r>
+              <a:rPr lang="en-US" altLang="ko-KR"/>
+              <a:t>MAC</a:t>
+            </a:r>
+            <a:r>
+              <a:rPr lang="ko-KR" altLang="en-US"/>
+              <a:t>주소 등을 분석하여 제공</a:t>
+            </a:r>
+            <a:endParaRPr lang="ko-KR" altLang="en-US"/>
           </a:p>
         </p:txBody>
       </p:sp>
     </p:spTree>
-    <p:extLst>
-      <p:ext uri="{BB962C8B-B14F-4D97-AF65-F5344CB8AC3E}">
-        <p14:creationId xmlns:p14="http://schemas.microsoft.com/office/powerpoint/2010/main" val="641642769"/>
-      </p:ext>
-    </p:extLst>
   </p:cSld>
   <p:clrMapOvr>
     <a:masterClrMapping/>
   </p:clrMapOvr>
+  <mc:AlternateContent xmlns:mc="http://schemas.openxmlformats.org/markup-compatibility/2006">
+    <mc:Choice xmlns:p14="http://schemas.microsoft.com/office/powerpoint/2010/main" Requires="p14">
+      <p:transition xmlns:mc="http://schemas.openxmlformats.org/markup-compatibility/2006" xmlns:p14="http://schemas.microsoft.com/office/powerpoint/2010/main" mc:Ignorable="p14" p14:dur="500"/>
+    </mc:Choice>
+    <mc:Fallback>
+      <p:transition/>
+    </mc:Fallback>
+  </mc:AlternateContent>
+</p:sld>
+</file>
+
+<file path=ppt/slides/slide9.xml><?xml version="1.0" encoding="utf-8"?>
+<p:sld xmlns:r="http://schemas.openxmlformats.org/officeDocument/2006/relationships" xmlns:c="http://schemas.openxmlformats.org/drawingml/2006/chart" xmlns:a="http://schemas.openxmlformats.org/drawingml/2006/main" xmlns:dgm="http://schemas.openxmlformats.org/drawingml/2006/diagram" xmlns:dsp="http://schemas.microsoft.com/office/drawing/2008/diagram" xmlns:p="http://schemas.openxmlformats.org/presentationml/2006/main">
+  <p:cSld>
+    <p:spTree>
+      <p:nvGrpSpPr>
+        <p:cNvPr id="1" name=""/>
+        <p:cNvGrpSpPr/>
+        <p:nvPr/>
+      </p:nvGrpSpPr>
+      <p:grpSpPr>
+        <a:xfrm>
+          <a:off x="0" y="0"/>
+          <a:ext cx="0" cy="0"/>
+          <a:chOff x="0" y="0"/>
+          <a:chExt cx="0" cy="0"/>
+        </a:xfrm>
+      </p:grpSpPr>
+      <p:sp>
+        <p:nvSpPr>
+          <p:cNvPr id="4" name="직사각형 9"/>
+          <p:cNvSpPr/>
+          <p:nvPr/>
+        </p:nvSpPr>
+        <p:spPr>
+          <a:xfrm>
+            <a:off x="-1" y="0"/>
+            <a:ext cx="12192001" cy="1338109"/>
+          </a:xfrm>
+          <a:prstGeom prst="rect">
+            <a:avLst/>
+          </a:prstGeom>
+          <a:solidFill>
+            <a:schemeClr val="accent1">
+              <a:lumMod val="75000"/>
+            </a:schemeClr>
+          </a:solidFill>
+          <a:ln>
+            <a:noFill/>
+          </a:ln>
+        </p:spPr>
+        <p:style>
+          <a:lnRef idx="2">
+            <a:schemeClr val="accent1">
+              <a:shade val="50000"/>
+            </a:schemeClr>
+          </a:lnRef>
+          <a:fillRef idx="1">
+            <a:schemeClr val="accent1"/>
+          </a:fillRef>
+          <a:effectRef idx="0">
+            <a:schemeClr val="accent1"/>
+          </a:effectRef>
+          <a:fontRef idx="minor">
+            <a:schemeClr val="lt1"/>
+          </a:fontRef>
+        </p:style>
+        <p:txBody>
+          <a:bodyPr anchor="ctr"/>
+          <a:lstStyle/>
+          <a:p>
+            <a:pPr>
+              <a:defRPr/>
+            </a:pPr>
+            <a:r>
+              <a:rPr kumimoji="1" lang="en-US" altLang="ko-KR" sz="4800"/>
+              <a:t>1.</a:t>
+            </a:r>
+            <a:r>
+              <a:rPr kumimoji="1" lang="ko-KR" altLang="en-US" sz="4800"/>
+              <a:t> 아이디어 도출</a:t>
+            </a:r>
+            <a:endParaRPr kumimoji="1" lang="ko-KR" altLang="en-US" sz="4800"/>
+          </a:p>
+        </p:txBody>
+      </p:sp>
+      <p:sp>
+        <p:nvSpPr>
+          <p:cNvPr id="5" name="내용 개체 틀 4"/>
+          <p:cNvSpPr>
+            <a:spLocks noGrp="1"/>
+          </p:cNvSpPr>
+          <p:nvPr>
+            <p:ph idx="1"/>
+          </p:nvPr>
+        </p:nvSpPr>
+        <p:spPr>
+          <a:xfrm>
+            <a:off x="0" y="1561042"/>
+            <a:ext cx="12192000" cy="5296957"/>
+          </a:xfrm>
+        </p:spPr>
+        <p:txBody>
+          <a:bodyPr vert="horz" lIns="91440" tIns="45720" rIns="91440" bIns="45720">
+            <a:normAutofit lnSpcReduction="10000"/>
+          </a:bodyPr>
+          <a:lstStyle/>
+          <a:p>
+            <a:pPr lvl="0">
+              <a:defRPr/>
+            </a:pPr>
+            <a:r>
+              <a:rPr lang="ko-KR" altLang="en-US"/>
+              <a:t>클라우드 포렌식 툴</a:t>
+            </a:r>
+            <a:endParaRPr lang="ko-KR" altLang="en-US"/>
+          </a:p>
+          <a:p>
+            <a:pPr lvl="0">
+              <a:defRPr/>
+            </a:pPr>
+            <a:endParaRPr lang="ko-KR" altLang="en-US"/>
+          </a:p>
+          <a:p>
+            <a:pPr marL="0" lvl="0" indent="0">
+              <a:buNone/>
+              <a:defRPr/>
+            </a:pPr>
+            <a:r>
+              <a:rPr lang="en-US" altLang="ko-KR"/>
+              <a:t> </a:t>
+            </a:r>
+            <a:r>
+              <a:rPr lang="ko-KR" altLang="en-US"/>
+              <a:t> </a:t>
+            </a:r>
+            <a:r>
+              <a:rPr lang="en-US" altLang="ko-KR"/>
+              <a:t>-</a:t>
+            </a:r>
+            <a:r>
+              <a:rPr lang="ko-KR" altLang="en-US"/>
+              <a:t> 계정의 동기화 기능은 뛰어난 접근성과 편의성을 제공하며 이러한 특징으로 클라우드 서비스의 이용 증가</a:t>
+            </a:r>
+            <a:endParaRPr lang="ko-KR" altLang="en-US"/>
+          </a:p>
+          <a:p>
+            <a:pPr marL="0" lvl="0" indent="0">
+              <a:buNone/>
+              <a:defRPr/>
+            </a:pPr>
+            <a:endParaRPr lang="ko-KR" altLang="en-US"/>
+          </a:p>
+          <a:p>
+            <a:pPr marL="0" lvl="0" indent="0">
+              <a:buNone/>
+              <a:defRPr/>
+            </a:pPr>
+            <a:r>
+              <a:rPr lang="ko-KR" altLang="en-US"/>
+              <a:t> </a:t>
+            </a:r>
+            <a:r>
+              <a:rPr lang="en-US" altLang="ko-KR"/>
+              <a:t>-</a:t>
+            </a:r>
+            <a:r>
+              <a:rPr lang="ko-KR" altLang="en-US"/>
+              <a:t> 포렌식 조사과정시 파일이 해당기기에서 생성된 것인지 또는 외부기기로부터 동기화 된 것인지에 대해 명확히 해야 하는 어려움 존재</a:t>
+            </a:r>
+            <a:endParaRPr lang="ko-KR" altLang="en-US"/>
+          </a:p>
+          <a:p>
+            <a:pPr marL="0" lvl="0" indent="0">
+              <a:buNone/>
+              <a:defRPr/>
+            </a:pPr>
+            <a:endParaRPr lang="ko-KR" altLang="en-US"/>
+          </a:p>
+          <a:p>
+            <a:pPr marL="0" lvl="0" indent="0">
+              <a:buNone/>
+              <a:defRPr/>
+            </a:pPr>
+            <a:r>
+              <a:rPr lang="ko-KR" altLang="en-US"/>
+              <a:t> </a:t>
+            </a:r>
+            <a:r>
+              <a:rPr lang="en-US" altLang="ko-KR"/>
+              <a:t>-</a:t>
+            </a:r>
+            <a:r>
+              <a:rPr lang="ko-KR" altLang="en-US"/>
+              <a:t> </a:t>
+            </a:r>
+            <a:endParaRPr lang="ko-KR" altLang="en-US"/>
+          </a:p>
+        </p:txBody>
+      </p:sp>
+    </p:spTree>
+  </p:cSld>
+  <p:clrMapOvr>
+    <a:masterClrMapping/>
+  </p:clrMapOvr>
+  <mc:AlternateContent xmlns:mc="http://schemas.openxmlformats.org/markup-compatibility/2006">
+    <mc:Choice xmlns:p14="http://schemas.microsoft.com/office/powerpoint/2010/main" Requires="p14">
+      <p:transition xmlns:mc="http://schemas.openxmlformats.org/markup-compatibility/2006" xmlns:p14="http://schemas.microsoft.com/office/powerpoint/2010/main" mc:Ignorable="p14" p14:dur="500"/>
+    </mc:Choice>
+    <mc:Fallback>
+      <p:transition/>
+    </mc:Fallback>
+  </mc:AlternateContent>
 </p:sld>
 </file>
 

</xml_diff>